<commit_message>
add count UploadERP status: U (show status16toolLabelstrSameColumnCount)
</commit_message>
<xml_diff>
--- a/FrmPIE/0PackingInformationEntry.pptx
+++ b/FrmPIE/0PackingInformationEntry.pptx
@@ -5,10 +5,10 @@
     <p:sldMasterId id="2147483648" r:id="rId1"/>
   </p:sldMasterIdLst>
   <p:notesMasterIdLst>
-    <p:notesMasterId r:id="rId19"/>
+    <p:notesMasterId r:id="rId20"/>
   </p:notesMasterIdLst>
   <p:handoutMasterIdLst>
-    <p:handoutMasterId r:id="rId20"/>
+    <p:handoutMasterId r:id="rId21"/>
   </p:handoutMasterIdLst>
   <p:sldIdLst>
     <p:sldId id="256" r:id="rId2"/>
@@ -23,11 +23,12 @@
     <p:sldId id="349" r:id="rId11"/>
     <p:sldId id="351" r:id="rId12"/>
     <p:sldId id="350" r:id="rId13"/>
-    <p:sldId id="352" r:id="rId14"/>
-    <p:sldId id="353" r:id="rId15"/>
-    <p:sldId id="354" r:id="rId16"/>
-    <p:sldId id="355" r:id="rId17"/>
-    <p:sldId id="340" r:id="rId18"/>
+    <p:sldId id="356" r:id="rId14"/>
+    <p:sldId id="352" r:id="rId15"/>
+    <p:sldId id="353" r:id="rId16"/>
+    <p:sldId id="354" r:id="rId17"/>
+    <p:sldId id="355" r:id="rId18"/>
+    <p:sldId id="340" r:id="rId19"/>
   </p:sldIdLst>
   <p:sldSz cx="9144000" cy="6858000" type="screen4x3"/>
   <p:notesSz cx="6813550" cy="9945688"/>
@@ -1683,7 +1684,11 @@
         <a:p>
           <a:r>
             <a:rPr lang="en-US" altLang="en-US" dirty="0" smtClean="0"/>
-            <a:t>Carton ID Maintain</a:t>
+            <a:t>Carton ID </a:t>
+          </a:r>
+          <a:r>
+            <a:rPr lang="en-US" altLang="en-US" dirty="0" smtClean="0"/>
+            <a:t>Maintain</a:t>
           </a:r>
           <a:endParaRPr lang="zh-CN" altLang="en-US" dirty="0"/>
         </a:p>
@@ -1847,7 +1852,7 @@
       </dgm:t>
     </dgm:pt>
     <dgm:pt modelId="{056170FB-F03E-4286-A303-C14B6DB4A891}" type="pres">
-      <dgm:prSet presAssocID="{DDD3601B-FE3D-4F41-920D-DBB02F6B5415}" presName="node" presStyleLbl="node1" presStyleIdx="0" presStyleCnt="5" custLinFactNeighborX="-12100" custLinFactNeighborY="6020">
+      <dgm:prSet presAssocID="{DDD3601B-FE3D-4F41-920D-DBB02F6B5415}" presName="node" presStyleLbl="node1" presStyleIdx="0" presStyleCnt="5" custScaleX="117901" custScaleY="188018" custLinFactNeighborX="-12100" custLinFactNeighborY="6020">
         <dgm:presLayoutVars>
           <dgm:bulletEnabled val="1"/>
         </dgm:presLayoutVars>
@@ -1884,7 +1889,7 @@
       </dgm:t>
     </dgm:pt>
     <dgm:pt modelId="{52031E35-D852-4D09-8365-5DBDB80DDEEA}" type="pres">
-      <dgm:prSet presAssocID="{3D468AA5-6181-4934-9D81-DFD0F43B4CAF}" presName="node" presStyleLbl="node1" presStyleIdx="1" presStyleCnt="5">
+      <dgm:prSet presAssocID="{3D468AA5-6181-4934-9D81-DFD0F43B4CAF}" presName="node" presStyleLbl="node1" presStyleIdx="1" presStyleCnt="5" custScaleX="75292" custScaleY="207169">
         <dgm:presLayoutVars>
           <dgm:bulletEnabled val="1"/>
         </dgm:presLayoutVars>
@@ -1899,7 +1904,7 @@
       </dgm:t>
     </dgm:pt>
     <dgm:pt modelId="{48455EE6-3320-44E8-97B6-36AC8ECBED37}" type="pres">
-      <dgm:prSet presAssocID="{08DF8AE9-C060-4601-BB8F-6014208DE6F2}" presName="sibTrans" presStyleLbl="sibTrans2D1" presStyleIdx="1" presStyleCnt="4"/>
+      <dgm:prSet presAssocID="{08DF8AE9-C060-4601-BB8F-6014208DE6F2}" presName="sibTrans" presStyleLbl="sibTrans2D1" presStyleIdx="1" presStyleCnt="4" custLinFactNeighborX="10017" custLinFactNeighborY="62215"/>
       <dgm:spPr/>
       <dgm:t>
         <a:bodyPr/>
@@ -1921,7 +1926,7 @@
       </dgm:t>
     </dgm:pt>
     <dgm:pt modelId="{2304A103-58CB-4B3B-9DF0-56F3E9CA10E4}" type="pres">
-      <dgm:prSet presAssocID="{C3E73D73-E519-43F4-AA64-7DE19ECCCB98}" presName="node" presStyleLbl="node1" presStyleIdx="2" presStyleCnt="5">
+      <dgm:prSet presAssocID="{C3E73D73-E519-43F4-AA64-7DE19ECCCB98}" presName="node" presStyleLbl="node1" presStyleIdx="2" presStyleCnt="5" custScaleX="158683" custScaleY="135614" custLinFactNeighborX="-1231" custLinFactNeighborY="60086">
         <dgm:presLayoutVars>
           <dgm:bulletEnabled val="1"/>
         </dgm:presLayoutVars>
@@ -1958,7 +1963,7 @@
       </dgm:t>
     </dgm:pt>
     <dgm:pt modelId="{294C2110-C259-4203-8F8A-0ABD6DB76194}" type="pres">
-      <dgm:prSet presAssocID="{F7A1626E-E2A7-4D42-BA44-3E5030C65863}" presName="node" presStyleLbl="node1" presStyleIdx="3" presStyleCnt="5">
+      <dgm:prSet presAssocID="{F7A1626E-E2A7-4D42-BA44-3E5030C65863}" presName="node" presStyleLbl="node1" presStyleIdx="3" presStyleCnt="5" custScaleY="162298">
         <dgm:presLayoutVars>
           <dgm:bulletEnabled val="1"/>
         </dgm:presLayoutVars>
@@ -1995,7 +2000,7 @@
       </dgm:t>
     </dgm:pt>
     <dgm:pt modelId="{EADDF13B-B100-4761-89B7-516FBF7B86A7}" type="pres">
-      <dgm:prSet presAssocID="{44005B74-88FB-46F4-86C2-E6B8184CED08}" presName="node" presStyleLbl="node1" presStyleIdx="4" presStyleCnt="5">
+      <dgm:prSet presAssocID="{44005B74-88FB-46F4-86C2-E6B8184CED08}" presName="node" presStyleLbl="node1" presStyleIdx="4" presStyleCnt="5" custScaleY="162298">
         <dgm:presLayoutVars>
           <dgm:bulletEnabled val="1"/>
         </dgm:presLayoutVars>
@@ -4883,7 +4888,7 @@
             <a:fld id="{4D2C590C-463E-4F0C-9134-D7C5128A8EB4}" type="datetimeFigureOut">
               <a:rPr lang="zh-TW" altLang="en-US" smtClean="0"/>
               <a:pPr/>
-              <a:t>2014/9/16</a:t>
+              <a:t>2014/10/9</a:t>
             </a:fld>
             <a:endParaRPr lang="zh-TW" altLang="en-US"/>
           </a:p>
@@ -4979,7 +4984,7 @@
             <a:fld id="{A8BD75ED-5E07-4F67-8C98-12BA1B9B61CE}" type="datetimeFigureOut">
               <a:rPr lang="zh-CN" altLang="en-US" smtClean="0"/>
               <a:pPr/>
-              <a:t>09/16/2014</a:t>
+              <a:t>10/09/2014</a:t>
             </a:fld>
             <a:endParaRPr lang="zh-CN" altLang="en-US" dirty="0"/>
           </a:p>
@@ -5314,7 +5319,7 @@
             <a:fld id="{A8B38BC6-A07A-4D04-A852-6C2ACEAE2FB5}" type="datetime1">
               <a:rPr lang="zh-CN" altLang="en-US" smtClean="0"/>
               <a:pPr/>
-              <a:t>09/16/2014</a:t>
+              <a:t>10/09/2014</a:t>
             </a:fld>
             <a:endParaRPr lang="zh-CN" altLang="en-US" dirty="0"/>
           </a:p>
@@ -5534,7 +5539,7 @@
             <a:fld id="{35A7AC81-696A-4C2A-B918-515844A88C4A}" type="datetime1">
               <a:rPr lang="zh-TW" altLang="en-US" smtClean="0"/>
               <a:pPr/>
-              <a:t>2014/9/16</a:t>
+              <a:t>2014/10/9</a:t>
             </a:fld>
             <a:endParaRPr lang="zh-CN" altLang="en-US"/>
           </a:p>
@@ -5701,7 +5706,7 @@
             <a:fld id="{3A66168E-DF05-4F16-9321-82EF6F7D3409}" type="datetime1">
               <a:rPr lang="zh-TW" altLang="en-US" smtClean="0"/>
               <a:pPr/>
-              <a:t>2014/9/16</a:t>
+              <a:t>2014/10/9</a:t>
             </a:fld>
             <a:endParaRPr lang="zh-CN" altLang="en-US"/>
           </a:p>
@@ -5878,7 +5883,7 @@
             <a:fld id="{292BB50C-E58E-4536-ABBE-FDAF06E55820}" type="datetime1">
               <a:rPr lang="zh-TW" altLang="en-US" smtClean="0"/>
               <a:pPr/>
-              <a:t>2014/9/16</a:t>
+              <a:t>2014/10/9</a:t>
             </a:fld>
             <a:endParaRPr lang="zh-CN" altLang="en-US"/>
           </a:p>
@@ -6022,7 +6027,7 @@
             <a:fld id="{BCDD0958-C144-4E3D-A8F5-AAEDA8C9D550}" type="datetime1">
               <a:rPr lang="zh-TW" altLang="en-US" smtClean="0"/>
               <a:pPr/>
-              <a:t>2014/9/16</a:t>
+              <a:t>2014/10/9</a:t>
             </a:fld>
             <a:endParaRPr lang="zh-CN" altLang="en-US"/>
           </a:p>
@@ -6288,7 +6293,7 @@
             <a:fld id="{C167E0BE-EAE3-45A7-A5A7-57157AC01174}" type="datetime1">
               <a:rPr lang="zh-TW" altLang="en-US" smtClean="0"/>
               <a:pPr/>
-              <a:t>2014/9/16</a:t>
+              <a:t>2014/10/9</a:t>
             </a:fld>
             <a:endParaRPr lang="zh-CN" altLang="en-US"/>
           </a:p>
@@ -6573,7 +6578,7 @@
             <a:fld id="{6AC3B814-8B0B-49DD-90D0-D679CAA248BF}" type="datetime1">
               <a:rPr lang="zh-TW" altLang="en-US" smtClean="0"/>
               <a:pPr/>
-              <a:t>2014/9/16</a:t>
+              <a:t>2014/10/9</a:t>
             </a:fld>
             <a:endParaRPr lang="zh-CN" altLang="en-US"/>
           </a:p>
@@ -6992,7 +6997,7 @@
             <a:fld id="{BF7ED2E8-9E3A-4757-81B5-4DB84D908ACD}" type="datetime1">
               <a:rPr lang="zh-TW" altLang="en-US" smtClean="0"/>
               <a:pPr/>
-              <a:t>2014/9/16</a:t>
+              <a:t>2014/10/9</a:t>
             </a:fld>
             <a:endParaRPr lang="zh-CN" altLang="en-US"/>
           </a:p>
@@ -7107,7 +7112,7 @@
             <a:fld id="{472DB839-8415-4D10-81B3-48A58C5324C2}" type="datetime1">
               <a:rPr lang="zh-TW" altLang="en-US" smtClean="0"/>
               <a:pPr/>
-              <a:t>2014/9/16</a:t>
+              <a:t>2014/10/9</a:t>
             </a:fld>
             <a:endParaRPr lang="zh-CN" altLang="en-US"/>
           </a:p>
@@ -7199,7 +7204,7 @@
             <a:fld id="{6144F512-14EF-46B4-9E70-9E1E0786683C}" type="datetime1">
               <a:rPr lang="zh-TW" altLang="en-US" smtClean="0"/>
               <a:pPr/>
-              <a:t>2014/9/16</a:t>
+              <a:t>2014/10/9</a:t>
             </a:fld>
             <a:endParaRPr lang="zh-CN" altLang="en-US"/>
           </a:p>
@@ -7473,7 +7478,7 @@
             <a:fld id="{B91D2291-1907-4432-B355-638067851FEC}" type="datetime1">
               <a:rPr lang="zh-TW" altLang="en-US" smtClean="0"/>
               <a:pPr/>
-              <a:t>2014/9/16</a:t>
+              <a:t>2014/10/9</a:t>
             </a:fld>
             <a:endParaRPr lang="zh-CN" altLang="en-US"/>
           </a:p>
@@ -7723,7 +7728,7 @@
             <a:fld id="{3CE2A9AE-EA9E-4495-BEFD-EBC4472D3C52}" type="datetime1">
               <a:rPr lang="zh-TW" altLang="en-US" smtClean="0"/>
               <a:pPr/>
-              <a:t>2014/9/16</a:t>
+              <a:t>2014/10/9</a:t>
             </a:fld>
             <a:endParaRPr lang="zh-CN" altLang="en-US"/>
           </a:p>
@@ -7933,7 +7938,7 @@
             <a:fld id="{8A63E226-BC2D-40EF-90E6-0476DBDDD628}" type="datetime1">
               <a:rPr lang="zh-TW" altLang="en-US" smtClean="0"/>
               <a:pPr/>
-              <a:t>2014/9/16</a:t>
+              <a:t>2014/10/9</a:t>
             </a:fld>
             <a:endParaRPr lang="zh-CN" altLang="en-US" dirty="0"/>
           </a:p>
@@ -8547,7 +8552,7 @@
             <a:fld id="{7D36EE62-A1CD-4859-A084-11A1BEE6A9C3}" type="datetime1">
               <a:rPr lang="zh-TW" altLang="en-US" smtClean="0"/>
               <a:pPr/>
-              <a:t>2014/9/16</a:t>
+              <a:t>2014/10/9</a:t>
             </a:fld>
             <a:endParaRPr lang="zh-CN" altLang="en-US"/>
           </a:p>
@@ -8626,7 +8631,7 @@
             <a:fld id="{BCDD0958-C144-4E3D-A8F5-AAEDA8C9D550}" type="datetime1">
               <a:rPr lang="zh-TW" altLang="en-US" smtClean="0"/>
               <a:pPr/>
-              <a:t>2014/9/16</a:t>
+              <a:t>2014/10/9</a:t>
             </a:fld>
             <a:endParaRPr lang="zh-CN" altLang="en-US"/>
           </a:p>
@@ -8735,7 +8740,7 @@
             <a:fld id="{BCDD0958-C144-4E3D-A8F5-AAEDA8C9D550}" type="datetime1">
               <a:rPr lang="zh-TW" altLang="en-US" smtClean="0"/>
               <a:pPr/>
-              <a:t>2014/9/16</a:t>
+              <a:t>2014/10/9</a:t>
             </a:fld>
             <a:endParaRPr lang="zh-CN" altLang="en-US"/>
           </a:p>
@@ -8890,7 +8895,7 @@
             <a:fld id="{BCDD0958-C144-4E3D-A8F5-AAEDA8C9D550}" type="datetime1">
               <a:rPr lang="zh-TW" altLang="en-US" smtClean="0"/>
               <a:pPr/>
-              <a:t>2014/9/16</a:t>
+              <a:t>2014/10/9</a:t>
             </a:fld>
             <a:endParaRPr lang="zh-CN" altLang="en-US"/>
           </a:p>
@@ -9007,7 +9012,7 @@
             <a:fld id="{BCDD0958-C144-4E3D-A8F5-AAEDA8C9D550}" type="datetime1">
               <a:rPr lang="zh-TW" altLang="en-US" smtClean="0"/>
               <a:pPr/>
-              <a:t>2014/9/16</a:t>
+              <a:t>2014/10/9</a:t>
             </a:fld>
             <a:endParaRPr lang="zh-CN" altLang="en-US"/>
           </a:p>
@@ -9050,40 +9055,120 @@
         <p:spPr/>
         <p:txBody>
           <a:bodyPr>
-            <a:normAutofit/>
+            <a:normAutofit fontScale="90000"/>
           </a:bodyPr>
           <a:lstStyle/>
           <a:p>
-            <a:pPr lvl="0"/>
+            <a:pPr lvl="0" defTabSz="711200">
+              <a:lnSpc>
+                <a:spcPct val="90000"/>
+              </a:lnSpc>
+              <a:spcAft>
+                <a:spcPct val="35000"/>
+              </a:spcAft>
+            </a:pPr>
             <a:r>
               <a:rPr lang="en-US" altLang="en-US" dirty="0" smtClean="0"/>
-              <a:t>3. Print Carton Label</a:t>
+              <a:t>MFG/PRO (ERP)</a:t>
             </a:r>
-            <a:endParaRPr lang="zh-CN" altLang="en-US" dirty="0"/>
+            <a:br>
+              <a:rPr lang="en-US" altLang="en-US" dirty="0" smtClean="0"/>
+            </a:br>
+            <a:r>
+              <a:rPr lang="en-US" altLang="zh-CN" sz="3100" dirty="0" smtClean="0">
+                <a:solidFill>
+                  <a:srgbClr val="FF0000"/>
+                </a:solidFill>
+              </a:rPr>
+              <a:t>Check (OCR)/Book IN(OCR)</a:t>
+            </a:r>
+            <a:r>
+              <a:rPr lang="zh-CN" altLang="en-US" sz="3100" dirty="0" smtClean="0">
+                <a:solidFill>
+                  <a:srgbClr val="FF0000"/>
+                </a:solidFill>
+              </a:rPr>
+              <a:t/>
+            </a:r>
+            <a:br>
+              <a:rPr lang="zh-CN" altLang="en-US" sz="3100" dirty="0" smtClean="0">
+                <a:solidFill>
+                  <a:srgbClr val="FF0000"/>
+                </a:solidFill>
+              </a:rPr>
+            </a:br>
+            <a:endParaRPr lang="zh-CN" altLang="en-US" sz="3100" dirty="0">
+              <a:solidFill>
+                <a:srgbClr val="FF0000"/>
+              </a:solidFill>
+            </a:endParaRPr>
           </a:p>
         </p:txBody>
       </p:sp>
       <p:pic>
         <p:nvPicPr>
-          <p:cNvPr id="8" name="内容占位符 7" descr="3. Print Carton Label.png"/>
+          <p:cNvPr id="1027" name="Picture 3"/>
           <p:cNvPicPr>
-            <a:picLocks noGrp="1" noChangeAspect="1"/>
+            <a:picLocks noChangeAspect="1" noChangeArrowheads="1"/>
           </p:cNvPicPr>
-          <p:nvPr>
-            <p:ph idx="1"/>
-          </p:nvPr>
+          <p:nvPr/>
         </p:nvPicPr>
         <p:blipFill>
           <a:blip r:embed="rId2"/>
+          <a:srcRect/>
           <a:stretch>
             <a:fillRect/>
           </a:stretch>
         </p:blipFill>
-        <p:spPr>
+        <p:spPr bwMode="auto">
           <a:xfrm>
-            <a:off x="519415" y="1600200"/>
-            <a:ext cx="7735282" cy="4525963"/>
+            <a:off x="1081113" y="1142984"/>
+            <a:ext cx="7134225" cy="2390775"/>
           </a:xfrm>
+          <a:prstGeom prst="rect">
+            <a:avLst/>
+          </a:prstGeom>
+          <a:noFill/>
+          <a:ln w="9525">
+            <a:noFill/>
+            <a:miter lim="800000"/>
+            <a:headEnd/>
+            <a:tailEnd/>
+          </a:ln>
+          <a:effectLst/>
+        </p:spPr>
+      </p:pic>
+      <p:pic>
+        <p:nvPicPr>
+          <p:cNvPr id="1028" name="Picture 4"/>
+          <p:cNvPicPr>
+            <a:picLocks noChangeAspect="1" noChangeArrowheads="1"/>
+          </p:cNvPicPr>
+          <p:nvPr/>
+        </p:nvPicPr>
+        <p:blipFill>
+          <a:blip r:embed="rId3"/>
+          <a:srcRect/>
+          <a:stretch>
+            <a:fillRect/>
+          </a:stretch>
+        </p:blipFill>
+        <p:spPr bwMode="auto">
+          <a:xfrm>
+            <a:off x="1071538" y="3857628"/>
+            <a:ext cx="7215238" cy="2295525"/>
+          </a:xfrm>
+          <a:prstGeom prst="rect">
+            <a:avLst/>
+          </a:prstGeom>
+          <a:noFill/>
+          <a:ln w="9525">
+            <a:noFill/>
+            <a:miter lim="800000"/>
+            <a:headEnd/>
+            <a:tailEnd/>
+          </a:ln>
+          <a:effectLst/>
         </p:spPr>
       </p:pic>
     </p:spTree>
@@ -9091,13 +9176,6 @@
   <p:clrMapOvr>
     <a:masterClrMapping/>
   </p:clrMapOvr>
-  <p:timing>
-    <p:tnLst>
-      <p:par>
-        <p:cTn id="1" dur="indefinite" restart="never" nodeType="tmRoot"/>
-      </p:par>
-    </p:tnLst>
-  </p:timing>
 </p:sld>
 </file>
 
@@ -9118,9 +9196,83 @@
           <a:chExt cx="0" cy="0"/>
         </a:xfrm>
       </p:grpSpPr>
+      <p:sp>
+        <p:nvSpPr>
+          <p:cNvPr id="3" name="日期占位符 2"/>
+          <p:cNvSpPr>
+            <a:spLocks noGrp="1"/>
+          </p:cNvSpPr>
+          <p:nvPr>
+            <p:ph type="dt" sz="half" idx="10"/>
+          </p:nvPr>
+        </p:nvSpPr>
+        <p:spPr/>
+        <p:txBody>
+          <a:bodyPr/>
+          <a:lstStyle/>
+          <a:p>
+            <a:fld id="{BCDD0958-C144-4E3D-A8F5-AAEDA8C9D550}" type="datetime1">
+              <a:rPr lang="zh-TW" altLang="en-US" smtClean="0"/>
+              <a:pPr/>
+              <a:t>2014/10/9</a:t>
+            </a:fld>
+            <a:endParaRPr lang="zh-CN" altLang="en-US"/>
+          </a:p>
+        </p:txBody>
+      </p:sp>
+      <p:sp>
+        <p:nvSpPr>
+          <p:cNvPr id="4" name="灯片编号占位符 3"/>
+          <p:cNvSpPr>
+            <a:spLocks noGrp="1"/>
+          </p:cNvSpPr>
+          <p:nvPr>
+            <p:ph type="sldNum" sz="quarter" idx="12"/>
+          </p:nvPr>
+        </p:nvSpPr>
+        <p:spPr/>
+        <p:txBody>
+          <a:bodyPr/>
+          <a:lstStyle/>
+          <a:p>
+            <a:fld id="{28874C86-8C61-448A-906E-93CD94C69BE8}" type="slidenum">
+              <a:rPr lang="zh-CN" altLang="en-US" smtClean="0"/>
+              <a:pPr/>
+              <a:t>14</a:t>
+            </a:fld>
+            <a:endParaRPr lang="zh-CN" altLang="en-US" dirty="0"/>
+          </a:p>
+        </p:txBody>
+      </p:sp>
+      <p:sp>
+        <p:nvSpPr>
+          <p:cNvPr id="5" name="标题 4"/>
+          <p:cNvSpPr>
+            <a:spLocks noGrp="1"/>
+          </p:cNvSpPr>
+          <p:nvPr>
+            <p:ph type="title"/>
+          </p:nvPr>
+        </p:nvSpPr>
+        <p:spPr/>
+        <p:txBody>
+          <a:bodyPr>
+            <a:normAutofit/>
+          </a:bodyPr>
+          <a:lstStyle/>
+          <a:p>
+            <a:pPr lvl="0"/>
+            <a:r>
+              <a:rPr lang="en-US" altLang="en-US" dirty="0" smtClean="0"/>
+              <a:t>3. Print Carton Label</a:t>
+            </a:r>
+            <a:endParaRPr lang="zh-CN" altLang="en-US" dirty="0"/>
+          </a:p>
+        </p:txBody>
+      </p:sp>
       <p:pic>
         <p:nvPicPr>
-          <p:cNvPr id="6" name="内容占位符 5" descr="4. Scan Carton Label.png"/>
+          <p:cNvPr id="8" name="内容占位符 7" descr="3. Print Carton Label.png"/>
           <p:cNvPicPr>
             <a:picLocks noGrp="1" noChangeAspect="1"/>
           </p:cNvPicPr>
@@ -9136,89 +9288,11 @@
         </p:blipFill>
         <p:spPr>
           <a:xfrm>
-            <a:off x="693589" y="1600200"/>
-            <a:ext cx="7386934" cy="4525963"/>
+            <a:off x="519415" y="1600200"/>
+            <a:ext cx="7735282" cy="4525963"/>
           </a:xfrm>
         </p:spPr>
       </p:pic>
-      <p:sp>
-        <p:nvSpPr>
-          <p:cNvPr id="3" name="日期占位符 2"/>
-          <p:cNvSpPr>
-            <a:spLocks noGrp="1"/>
-          </p:cNvSpPr>
-          <p:nvPr>
-            <p:ph type="dt" sz="half" idx="10"/>
-          </p:nvPr>
-        </p:nvSpPr>
-        <p:spPr/>
-        <p:txBody>
-          <a:bodyPr/>
-          <a:lstStyle/>
-          <a:p>
-            <a:fld id="{BCDD0958-C144-4E3D-A8F5-AAEDA8C9D550}" type="datetime1">
-              <a:rPr lang="zh-TW" altLang="en-US" smtClean="0"/>
-              <a:pPr/>
-              <a:t>2014/9/16</a:t>
-            </a:fld>
-            <a:endParaRPr lang="zh-CN" altLang="en-US"/>
-          </a:p>
-        </p:txBody>
-      </p:sp>
-      <p:sp>
-        <p:nvSpPr>
-          <p:cNvPr id="4" name="灯片编号占位符 3"/>
-          <p:cNvSpPr>
-            <a:spLocks noGrp="1"/>
-          </p:cNvSpPr>
-          <p:nvPr>
-            <p:ph type="sldNum" sz="quarter" idx="12"/>
-          </p:nvPr>
-        </p:nvSpPr>
-        <p:spPr/>
-        <p:txBody>
-          <a:bodyPr/>
-          <a:lstStyle/>
-          <a:p>
-            <a:fld id="{28874C86-8C61-448A-906E-93CD94C69BE8}" type="slidenum">
-              <a:rPr lang="zh-CN" altLang="en-US" smtClean="0"/>
-              <a:pPr/>
-              <a:t>14</a:t>
-            </a:fld>
-            <a:endParaRPr lang="zh-CN" altLang="en-US" dirty="0"/>
-          </a:p>
-        </p:txBody>
-      </p:sp>
-      <p:sp>
-        <p:nvSpPr>
-          <p:cNvPr id="5" name="标题 4"/>
-          <p:cNvSpPr>
-            <a:spLocks noGrp="1"/>
-          </p:cNvSpPr>
-          <p:nvPr>
-            <p:ph type="title"/>
-          </p:nvPr>
-        </p:nvSpPr>
-        <p:spPr/>
-        <p:txBody>
-          <a:bodyPr>
-            <a:normAutofit/>
-          </a:bodyPr>
-          <a:lstStyle/>
-          <a:p>
-            <a:pPr lvl="0"/>
-            <a:r>
-              <a:rPr lang="en-US" altLang="zh-CN" dirty="0" smtClean="0"/>
-              <a:t>4.</a:t>
-            </a:r>
-            <a:r>
-              <a:rPr lang="en-US" altLang="en-US" dirty="0" smtClean="0"/>
-              <a:t> Scan Carton Label</a:t>
-            </a:r>
-            <a:endParaRPr lang="zh-CN" altLang="en-US" dirty="0"/>
-          </a:p>
-        </p:txBody>
-      </p:sp>
     </p:spTree>
   </p:cSld>
   <p:clrMapOvr>
@@ -9251,80 +9325,9 @@
           <a:chExt cx="0" cy="0"/>
         </a:xfrm>
       </p:grpSpPr>
-      <p:sp>
-        <p:nvSpPr>
-          <p:cNvPr id="3" name="日期占位符 2"/>
-          <p:cNvSpPr>
-            <a:spLocks noGrp="1"/>
-          </p:cNvSpPr>
-          <p:nvPr>
-            <p:ph type="dt" sz="half" idx="10"/>
-          </p:nvPr>
-        </p:nvSpPr>
-        <p:spPr/>
-        <p:txBody>
-          <a:bodyPr/>
-          <a:lstStyle/>
-          <a:p>
-            <a:fld id="{BCDD0958-C144-4E3D-A8F5-AAEDA8C9D550}" type="datetime1">
-              <a:rPr lang="zh-TW" altLang="en-US" smtClean="0"/>
-              <a:pPr/>
-              <a:t>2014/9/16</a:t>
-            </a:fld>
-            <a:endParaRPr lang="zh-CN" altLang="en-US"/>
-          </a:p>
-        </p:txBody>
-      </p:sp>
-      <p:sp>
-        <p:nvSpPr>
-          <p:cNvPr id="4" name="灯片编号占位符 3"/>
-          <p:cNvSpPr>
-            <a:spLocks noGrp="1"/>
-          </p:cNvSpPr>
-          <p:nvPr>
-            <p:ph type="sldNum" sz="quarter" idx="12"/>
-          </p:nvPr>
-        </p:nvSpPr>
-        <p:spPr/>
-        <p:txBody>
-          <a:bodyPr/>
-          <a:lstStyle/>
-          <a:p>
-            <a:fld id="{28874C86-8C61-448A-906E-93CD94C69BE8}" type="slidenum">
-              <a:rPr lang="zh-CN" altLang="en-US" smtClean="0"/>
-              <a:pPr/>
-              <a:t>15</a:t>
-            </a:fld>
-            <a:endParaRPr lang="zh-CN" altLang="en-US" dirty="0"/>
-          </a:p>
-        </p:txBody>
-      </p:sp>
-      <p:sp>
-        <p:nvSpPr>
-          <p:cNvPr id="5" name="标题 4"/>
-          <p:cNvSpPr>
-            <a:spLocks noGrp="1"/>
-          </p:cNvSpPr>
-          <p:nvPr>
-            <p:ph type="title"/>
-          </p:nvPr>
-        </p:nvSpPr>
-        <p:spPr/>
-        <p:txBody>
-          <a:bodyPr/>
-          <a:lstStyle/>
-          <a:p>
-            <a:r>
-              <a:rPr lang="it-IT" altLang="zh-CN" dirty="0" smtClean="0"/>
-              <a:t>4. 1 Scan Carton Label Maintain</a:t>
-            </a:r>
-            <a:endParaRPr lang="zh-CN" altLang="en-US" dirty="0"/>
-          </a:p>
-        </p:txBody>
-      </p:sp>
       <p:pic>
         <p:nvPicPr>
-          <p:cNvPr id="8" name="内容占位符 7" descr="4. 1 Scan Carton Label.png"/>
+          <p:cNvPr id="6" name="内容占位符 5" descr="4. Scan Carton Label.png"/>
           <p:cNvPicPr>
             <a:picLocks noGrp="1" noChangeAspect="1"/>
           </p:cNvPicPr>
@@ -9340,16 +9343,101 @@
         </p:blipFill>
         <p:spPr>
           <a:xfrm>
-            <a:off x="1337121" y="1600200"/>
-            <a:ext cx="6099871" cy="4525963"/>
+            <a:off x="693589" y="1600200"/>
+            <a:ext cx="7386934" cy="4525963"/>
           </a:xfrm>
         </p:spPr>
       </p:pic>
+      <p:sp>
+        <p:nvSpPr>
+          <p:cNvPr id="3" name="日期占位符 2"/>
+          <p:cNvSpPr>
+            <a:spLocks noGrp="1"/>
+          </p:cNvSpPr>
+          <p:nvPr>
+            <p:ph type="dt" sz="half" idx="10"/>
+          </p:nvPr>
+        </p:nvSpPr>
+        <p:spPr/>
+        <p:txBody>
+          <a:bodyPr/>
+          <a:lstStyle/>
+          <a:p>
+            <a:fld id="{BCDD0958-C144-4E3D-A8F5-AAEDA8C9D550}" type="datetime1">
+              <a:rPr lang="zh-TW" altLang="en-US" smtClean="0"/>
+              <a:pPr/>
+              <a:t>2014/10/9</a:t>
+            </a:fld>
+            <a:endParaRPr lang="zh-CN" altLang="en-US"/>
+          </a:p>
+        </p:txBody>
+      </p:sp>
+      <p:sp>
+        <p:nvSpPr>
+          <p:cNvPr id="4" name="灯片编号占位符 3"/>
+          <p:cNvSpPr>
+            <a:spLocks noGrp="1"/>
+          </p:cNvSpPr>
+          <p:nvPr>
+            <p:ph type="sldNum" sz="quarter" idx="12"/>
+          </p:nvPr>
+        </p:nvSpPr>
+        <p:spPr/>
+        <p:txBody>
+          <a:bodyPr/>
+          <a:lstStyle/>
+          <a:p>
+            <a:fld id="{28874C86-8C61-448A-906E-93CD94C69BE8}" type="slidenum">
+              <a:rPr lang="zh-CN" altLang="en-US" smtClean="0"/>
+              <a:pPr/>
+              <a:t>15</a:t>
+            </a:fld>
+            <a:endParaRPr lang="zh-CN" altLang="en-US" dirty="0"/>
+          </a:p>
+        </p:txBody>
+      </p:sp>
+      <p:sp>
+        <p:nvSpPr>
+          <p:cNvPr id="5" name="标题 4"/>
+          <p:cNvSpPr>
+            <a:spLocks noGrp="1"/>
+          </p:cNvSpPr>
+          <p:nvPr>
+            <p:ph type="title"/>
+          </p:nvPr>
+        </p:nvSpPr>
+        <p:spPr/>
+        <p:txBody>
+          <a:bodyPr>
+            <a:normAutofit/>
+          </a:bodyPr>
+          <a:lstStyle/>
+          <a:p>
+            <a:pPr lvl="0"/>
+            <a:r>
+              <a:rPr lang="en-US" altLang="zh-CN" dirty="0" smtClean="0"/>
+              <a:t>4.</a:t>
+            </a:r>
+            <a:r>
+              <a:rPr lang="en-US" altLang="en-US" dirty="0" smtClean="0"/>
+              <a:t> Scan Carton Label</a:t>
+            </a:r>
+            <a:endParaRPr lang="zh-CN" altLang="en-US" dirty="0"/>
+          </a:p>
+        </p:txBody>
+      </p:sp>
     </p:spTree>
   </p:cSld>
   <p:clrMapOvr>
     <a:masterClrMapping/>
   </p:clrMapOvr>
+  <p:timing>
+    <p:tnLst>
+      <p:par>
+        <p:cTn id="1" dur="indefinite" restart="never" nodeType="tmRoot"/>
+      </p:par>
+    </p:tnLst>
+  </p:timing>
 </p:sld>
 </file>
 
@@ -9370,9 +9458,80 @@
           <a:chExt cx="0" cy="0"/>
         </a:xfrm>
       </p:grpSpPr>
+      <p:sp>
+        <p:nvSpPr>
+          <p:cNvPr id="3" name="日期占位符 2"/>
+          <p:cNvSpPr>
+            <a:spLocks noGrp="1"/>
+          </p:cNvSpPr>
+          <p:nvPr>
+            <p:ph type="dt" sz="half" idx="10"/>
+          </p:nvPr>
+        </p:nvSpPr>
+        <p:spPr/>
+        <p:txBody>
+          <a:bodyPr/>
+          <a:lstStyle/>
+          <a:p>
+            <a:fld id="{BCDD0958-C144-4E3D-A8F5-AAEDA8C9D550}" type="datetime1">
+              <a:rPr lang="zh-TW" altLang="en-US" smtClean="0"/>
+              <a:pPr/>
+              <a:t>2014/10/9</a:t>
+            </a:fld>
+            <a:endParaRPr lang="zh-CN" altLang="en-US"/>
+          </a:p>
+        </p:txBody>
+      </p:sp>
+      <p:sp>
+        <p:nvSpPr>
+          <p:cNvPr id="4" name="灯片编号占位符 3"/>
+          <p:cNvSpPr>
+            <a:spLocks noGrp="1"/>
+          </p:cNvSpPr>
+          <p:nvPr>
+            <p:ph type="sldNum" sz="quarter" idx="12"/>
+          </p:nvPr>
+        </p:nvSpPr>
+        <p:spPr/>
+        <p:txBody>
+          <a:bodyPr/>
+          <a:lstStyle/>
+          <a:p>
+            <a:fld id="{28874C86-8C61-448A-906E-93CD94C69BE8}" type="slidenum">
+              <a:rPr lang="zh-CN" altLang="en-US" smtClean="0"/>
+              <a:pPr/>
+              <a:t>16</a:t>
+            </a:fld>
+            <a:endParaRPr lang="zh-CN" altLang="en-US" dirty="0"/>
+          </a:p>
+        </p:txBody>
+      </p:sp>
+      <p:sp>
+        <p:nvSpPr>
+          <p:cNvPr id="5" name="标题 4"/>
+          <p:cNvSpPr>
+            <a:spLocks noGrp="1"/>
+          </p:cNvSpPr>
+          <p:nvPr>
+            <p:ph type="title"/>
+          </p:nvPr>
+        </p:nvSpPr>
+        <p:spPr/>
+        <p:txBody>
+          <a:bodyPr/>
+          <a:lstStyle/>
+          <a:p>
+            <a:r>
+              <a:rPr lang="it-IT" altLang="zh-CN" dirty="0" smtClean="0"/>
+              <a:t>4. 1 Scan Carton Label Maintain</a:t>
+            </a:r>
+            <a:endParaRPr lang="zh-CN" altLang="en-US" dirty="0"/>
+          </a:p>
+        </p:txBody>
+      </p:sp>
       <p:pic>
         <p:nvPicPr>
-          <p:cNvPr id="6" name="内容占位符 5" descr="5. PI Reports.png"/>
+          <p:cNvPr id="8" name="内容占位符 7" descr="4. 1 Scan Carton Label.png"/>
           <p:cNvPicPr>
             <a:picLocks noGrp="1" noChangeAspect="1"/>
           </p:cNvPicPr>
@@ -9388,89 +9547,11 @@
         </p:blipFill>
         <p:spPr>
           <a:xfrm>
-            <a:off x="457200" y="1863720"/>
-            <a:ext cx="7859713" cy="3998923"/>
+            <a:off x="1337121" y="1600200"/>
+            <a:ext cx="6099871" cy="4525963"/>
           </a:xfrm>
         </p:spPr>
       </p:pic>
-      <p:sp>
-        <p:nvSpPr>
-          <p:cNvPr id="3" name="日期占位符 2"/>
-          <p:cNvSpPr>
-            <a:spLocks noGrp="1"/>
-          </p:cNvSpPr>
-          <p:nvPr>
-            <p:ph type="dt" sz="half" idx="10"/>
-          </p:nvPr>
-        </p:nvSpPr>
-        <p:spPr/>
-        <p:txBody>
-          <a:bodyPr/>
-          <a:lstStyle/>
-          <a:p>
-            <a:fld id="{BCDD0958-C144-4E3D-A8F5-AAEDA8C9D550}" type="datetime1">
-              <a:rPr lang="zh-TW" altLang="en-US" smtClean="0"/>
-              <a:pPr/>
-              <a:t>2014/9/16</a:t>
-            </a:fld>
-            <a:endParaRPr lang="zh-CN" altLang="en-US"/>
-          </a:p>
-        </p:txBody>
-      </p:sp>
-      <p:sp>
-        <p:nvSpPr>
-          <p:cNvPr id="4" name="灯片编号占位符 3"/>
-          <p:cNvSpPr>
-            <a:spLocks noGrp="1"/>
-          </p:cNvSpPr>
-          <p:nvPr>
-            <p:ph type="sldNum" sz="quarter" idx="12"/>
-          </p:nvPr>
-        </p:nvSpPr>
-        <p:spPr/>
-        <p:txBody>
-          <a:bodyPr/>
-          <a:lstStyle/>
-          <a:p>
-            <a:fld id="{28874C86-8C61-448A-906E-93CD94C69BE8}" type="slidenum">
-              <a:rPr lang="zh-CN" altLang="en-US" smtClean="0"/>
-              <a:pPr/>
-              <a:t>16</a:t>
-            </a:fld>
-            <a:endParaRPr lang="zh-CN" altLang="en-US" dirty="0"/>
-          </a:p>
-        </p:txBody>
-      </p:sp>
-      <p:sp>
-        <p:nvSpPr>
-          <p:cNvPr id="5" name="标题 4"/>
-          <p:cNvSpPr>
-            <a:spLocks noGrp="1"/>
-          </p:cNvSpPr>
-          <p:nvPr>
-            <p:ph type="title"/>
-          </p:nvPr>
-        </p:nvSpPr>
-        <p:spPr/>
-        <p:txBody>
-          <a:bodyPr>
-            <a:normAutofit/>
-          </a:bodyPr>
-          <a:lstStyle/>
-          <a:p>
-            <a:pPr lvl="0"/>
-            <a:r>
-              <a:rPr lang="en-US" altLang="zh-CN" dirty="0" smtClean="0"/>
-              <a:t>5.</a:t>
-            </a:r>
-            <a:r>
-              <a:rPr lang="en-US" altLang="en-US" dirty="0" smtClean="0"/>
-              <a:t> PI Reports</a:t>
-            </a:r>
-            <a:endParaRPr lang="zh-CN" altLang="en-US" dirty="0"/>
-          </a:p>
-        </p:txBody>
-      </p:sp>
     </p:spTree>
   </p:cSld>
   <p:clrMapOvr>
@@ -9496,6 +9577,132 @@
           <a:chExt cx="0" cy="0"/>
         </a:xfrm>
       </p:grpSpPr>
+      <p:pic>
+        <p:nvPicPr>
+          <p:cNvPr id="6" name="内容占位符 5" descr="5. PI Reports.png"/>
+          <p:cNvPicPr>
+            <a:picLocks noGrp="1" noChangeAspect="1"/>
+          </p:cNvPicPr>
+          <p:nvPr>
+            <p:ph idx="1"/>
+          </p:nvPr>
+        </p:nvPicPr>
+        <p:blipFill>
+          <a:blip r:embed="rId2"/>
+          <a:stretch>
+            <a:fillRect/>
+          </a:stretch>
+        </p:blipFill>
+        <p:spPr>
+          <a:xfrm>
+            <a:off x="457200" y="1863720"/>
+            <a:ext cx="7859713" cy="3998923"/>
+          </a:xfrm>
+        </p:spPr>
+      </p:pic>
+      <p:sp>
+        <p:nvSpPr>
+          <p:cNvPr id="3" name="日期占位符 2"/>
+          <p:cNvSpPr>
+            <a:spLocks noGrp="1"/>
+          </p:cNvSpPr>
+          <p:nvPr>
+            <p:ph type="dt" sz="half" idx="10"/>
+          </p:nvPr>
+        </p:nvSpPr>
+        <p:spPr/>
+        <p:txBody>
+          <a:bodyPr/>
+          <a:lstStyle/>
+          <a:p>
+            <a:fld id="{BCDD0958-C144-4E3D-A8F5-AAEDA8C9D550}" type="datetime1">
+              <a:rPr lang="zh-TW" altLang="en-US" smtClean="0"/>
+              <a:pPr/>
+              <a:t>2014/10/9</a:t>
+            </a:fld>
+            <a:endParaRPr lang="zh-CN" altLang="en-US"/>
+          </a:p>
+        </p:txBody>
+      </p:sp>
+      <p:sp>
+        <p:nvSpPr>
+          <p:cNvPr id="4" name="灯片编号占位符 3"/>
+          <p:cNvSpPr>
+            <a:spLocks noGrp="1"/>
+          </p:cNvSpPr>
+          <p:nvPr>
+            <p:ph type="sldNum" sz="quarter" idx="12"/>
+          </p:nvPr>
+        </p:nvSpPr>
+        <p:spPr/>
+        <p:txBody>
+          <a:bodyPr/>
+          <a:lstStyle/>
+          <a:p>
+            <a:fld id="{28874C86-8C61-448A-906E-93CD94C69BE8}" type="slidenum">
+              <a:rPr lang="zh-CN" altLang="en-US" smtClean="0"/>
+              <a:pPr/>
+              <a:t>17</a:t>
+            </a:fld>
+            <a:endParaRPr lang="zh-CN" altLang="en-US" dirty="0"/>
+          </a:p>
+        </p:txBody>
+      </p:sp>
+      <p:sp>
+        <p:nvSpPr>
+          <p:cNvPr id="5" name="标题 4"/>
+          <p:cNvSpPr>
+            <a:spLocks noGrp="1"/>
+          </p:cNvSpPr>
+          <p:nvPr>
+            <p:ph type="title"/>
+          </p:nvPr>
+        </p:nvSpPr>
+        <p:spPr/>
+        <p:txBody>
+          <a:bodyPr>
+            <a:normAutofit/>
+          </a:bodyPr>
+          <a:lstStyle/>
+          <a:p>
+            <a:pPr lvl="0"/>
+            <a:r>
+              <a:rPr lang="en-US" altLang="zh-CN" dirty="0" smtClean="0"/>
+              <a:t>5.</a:t>
+            </a:r>
+            <a:r>
+              <a:rPr lang="en-US" altLang="en-US" dirty="0" smtClean="0"/>
+              <a:t> PI Reports</a:t>
+            </a:r>
+            <a:endParaRPr lang="zh-CN" altLang="en-US" dirty="0"/>
+          </a:p>
+        </p:txBody>
+      </p:sp>
+    </p:spTree>
+  </p:cSld>
+  <p:clrMapOvr>
+    <a:masterClrMapping/>
+  </p:clrMapOvr>
+</p:sld>
+</file>
+
+<file path=ppt/slides/slide18.xml><?xml version="1.0" encoding="utf-8"?>
+<p:sld xmlns:a="http://schemas.openxmlformats.org/drawingml/2006/main" xmlns:r="http://schemas.openxmlformats.org/officeDocument/2006/relationships" xmlns:p="http://schemas.openxmlformats.org/presentationml/2006/main">
+  <p:cSld>
+    <p:spTree>
+      <p:nvGrpSpPr>
+        <p:cNvPr id="1" name=""/>
+        <p:cNvGrpSpPr/>
+        <p:nvPr/>
+      </p:nvGrpSpPr>
+      <p:grpSpPr>
+        <a:xfrm>
+          <a:off x="0" y="0"/>
+          <a:ext cx="0" cy="0"/>
+          <a:chOff x="0" y="0"/>
+          <a:chExt cx="0" cy="0"/>
+        </a:xfrm>
+      </p:grpSpPr>
       <p:sp>
         <p:nvSpPr>
           <p:cNvPr id="2" name="Content Placeholder 1"/>
@@ -9558,7 +9765,7 @@
             <a:fld id="{BCDD0958-C144-4E3D-A8F5-AAEDA8C9D550}" type="datetime1">
               <a:rPr lang="zh-TW" altLang="en-US" smtClean="0"/>
               <a:pPr/>
-              <a:t>2014/9/16</a:t>
+              <a:t>2014/10/9</a:t>
             </a:fld>
             <a:endParaRPr lang="zh-CN" altLang="en-US"/>
           </a:p>
@@ -9582,7 +9789,7 @@
             <a:fld id="{28874C86-8C61-448A-906E-93CD94C69BE8}" type="slidenum">
               <a:rPr lang="zh-CN" altLang="en-US" smtClean="0"/>
               <a:pPr/>
-              <a:t>17</a:t>
+              <a:t>18</a:t>
             </a:fld>
             <a:endParaRPr lang="zh-CN" altLang="en-US" dirty="0"/>
           </a:p>
@@ -9631,8 +9838,8 @@
           </p:nvPr>
         </p:nvGraphicFramePr>
         <p:xfrm>
-          <a:off x="500034" y="2428868"/>
-          <a:ext cx="7859713" cy="1828799"/>
+          <a:off x="142844" y="2428868"/>
+          <a:ext cx="8786874" cy="1828799"/>
         </p:xfrm>
         <a:graphic>
           <a:graphicData uri="http://schemas.openxmlformats.org/drawingml/2006/diagram">
@@ -9658,7 +9865,7 @@
             <a:fld id="{BCDD0958-C144-4E3D-A8F5-AAEDA8C9D550}" type="datetime1">
               <a:rPr lang="zh-TW" altLang="en-US" smtClean="0"/>
               <a:pPr/>
-              <a:t>2014/9/16</a:t>
+              <a:t>2014/10/9</a:t>
             </a:fld>
             <a:endParaRPr lang="zh-CN" altLang="en-US"/>
           </a:p>
@@ -9734,6 +9941,139 @@
           </a:p>
         </p:txBody>
       </p:sp>
+      <p:grpSp>
+        <p:nvGrpSpPr>
+          <p:cNvPr id="13" name="组合 12"/>
+          <p:cNvGrpSpPr/>
+          <p:nvPr/>
+        </p:nvGrpSpPr>
+        <p:grpSpPr>
+          <a:xfrm>
+            <a:off x="3500430" y="2214554"/>
+            <a:ext cx="1957368" cy="1003686"/>
+            <a:chOff x="3322109" y="0"/>
+            <a:chExt cx="1957368" cy="1003686"/>
+          </a:xfrm>
+        </p:grpSpPr>
+        <p:sp>
+          <p:nvSpPr>
+            <p:cNvPr id="14" name="圆角矩形 13"/>
+            <p:cNvSpPr/>
+            <p:nvPr/>
+          </p:nvSpPr>
+          <p:spPr>
+            <a:xfrm>
+              <a:off x="3322109" y="0"/>
+              <a:ext cx="1957368" cy="1003686"/>
+            </a:xfrm>
+            <a:prstGeom prst="roundRect">
+              <a:avLst>
+                <a:gd name="adj" fmla="val 10000"/>
+              </a:avLst>
+            </a:prstGeom>
+          </p:spPr>
+          <p:style>
+            <a:lnRef idx="2">
+              <a:schemeClr val="lt1">
+                <a:hueOff val="0"/>
+                <a:satOff val="0"/>
+                <a:lumOff val="0"/>
+                <a:alphaOff val="0"/>
+              </a:schemeClr>
+            </a:lnRef>
+            <a:fillRef idx="1">
+              <a:schemeClr val="accent1">
+                <a:hueOff val="0"/>
+                <a:satOff val="0"/>
+                <a:lumOff val="0"/>
+                <a:alphaOff val="0"/>
+              </a:schemeClr>
+            </a:fillRef>
+            <a:effectRef idx="0">
+              <a:schemeClr val="accent1">
+                <a:hueOff val="0"/>
+                <a:satOff val="0"/>
+                <a:lumOff val="0"/>
+                <a:alphaOff val="0"/>
+              </a:schemeClr>
+            </a:effectRef>
+            <a:fontRef idx="minor">
+              <a:schemeClr val="lt1"/>
+            </a:fontRef>
+          </p:style>
+        </p:sp>
+        <p:sp>
+          <p:nvSpPr>
+            <p:cNvPr id="15" name="圆角矩形 4"/>
+            <p:cNvSpPr/>
+            <p:nvPr/>
+          </p:nvSpPr>
+          <p:spPr>
+            <a:xfrm>
+              <a:off x="3351506" y="29397"/>
+              <a:ext cx="1898574" cy="944892"/>
+            </a:xfrm>
+            <a:prstGeom prst="rect">
+              <a:avLst/>
+            </a:prstGeom>
+          </p:spPr>
+          <p:style>
+            <a:lnRef idx="0">
+              <a:scrgbClr r="0" g="0" b="0"/>
+            </a:lnRef>
+            <a:fillRef idx="0">
+              <a:scrgbClr r="0" g="0" b="0"/>
+            </a:fillRef>
+            <a:effectRef idx="0">
+              <a:scrgbClr r="0" g="0" b="0"/>
+            </a:effectRef>
+            <a:fontRef idx="minor">
+              <a:schemeClr val="lt1"/>
+            </a:fontRef>
+          </p:style>
+          <p:txBody>
+            <a:bodyPr spcFirstLastPara="0" vert="horz" wrap="square" lIns="60960" tIns="60960" rIns="60960" bIns="60960" numCol="1" spcCol="1270" anchor="ctr" anchorCtr="0">
+              <a:noAutofit/>
+            </a:bodyPr>
+            <a:lstStyle/>
+            <a:p>
+              <a:pPr lvl="0" algn="ctr" defTabSz="711200">
+                <a:lnSpc>
+                  <a:spcPct val="90000"/>
+                </a:lnSpc>
+                <a:spcBef>
+                  <a:spcPct val="0"/>
+                </a:spcBef>
+                <a:spcAft>
+                  <a:spcPct val="35000"/>
+                </a:spcAft>
+              </a:pPr>
+              <a:r>
+                <a:rPr lang="en-US" altLang="en-US" sz="1600" dirty="0" smtClean="0"/>
+                <a:t>MFG/PRO</a:t>
+              </a:r>
+            </a:p>
+            <a:p>
+              <a:pPr lvl="0" algn="ctr" defTabSz="711200">
+                <a:lnSpc>
+                  <a:spcPct val="90000"/>
+                </a:lnSpc>
+                <a:spcBef>
+                  <a:spcPct val="0"/>
+                </a:spcBef>
+                <a:spcAft>
+                  <a:spcPct val="35000"/>
+                </a:spcAft>
+              </a:pPr>
+              <a:r>
+                <a:rPr lang="en-US" altLang="zh-CN" sz="1600" dirty="0" smtClean="0"/>
+                <a:t>Check /Book IN</a:t>
+              </a:r>
+              <a:endParaRPr lang="zh-CN" altLang="en-US" sz="1600" dirty="0"/>
+            </a:p>
+          </p:txBody>
+        </p:sp>
+      </p:grpSp>
     </p:spTree>
   </p:cSld>
   <p:clrMapOvr>
@@ -9807,7 +10147,7 @@
             <a:fld id="{BCDD0958-C144-4E3D-A8F5-AAEDA8C9D550}" type="datetime1">
               <a:rPr lang="zh-TW" altLang="en-US" smtClean="0"/>
               <a:pPr/>
-              <a:t>2014/9/16</a:t>
+              <a:t>2014/10/9</a:t>
             </a:fld>
             <a:endParaRPr lang="zh-CN" altLang="en-US"/>
           </a:p>
@@ -9919,7 +10259,7 @@
             <a:fld id="{BCDD0958-C144-4E3D-A8F5-AAEDA8C9D550}" type="datetime1">
               <a:rPr lang="zh-TW" altLang="en-US" smtClean="0"/>
               <a:pPr/>
-              <a:t>2014/9/16</a:t>
+              <a:t>2014/10/9</a:t>
             </a:fld>
             <a:endParaRPr lang="zh-CN" altLang="en-US"/>
           </a:p>
@@ -10065,7 +10405,7 @@
             <a:fld id="{BCDD0958-C144-4E3D-A8F5-AAEDA8C9D550}" type="datetime1">
               <a:rPr lang="zh-TW" altLang="en-US" smtClean="0"/>
               <a:pPr/>
-              <a:t>2014/9/16</a:t>
+              <a:t>2014/10/9</a:t>
             </a:fld>
             <a:endParaRPr lang="zh-CN" altLang="en-US"/>
           </a:p>
@@ -10194,7 +10534,7 @@
             <a:fld id="{BCDD0958-C144-4E3D-A8F5-AAEDA8C9D550}" type="datetime1">
               <a:rPr lang="zh-TW" altLang="en-US" smtClean="0"/>
               <a:pPr/>
-              <a:t>2014/9/16</a:t>
+              <a:t>2014/10/9</a:t>
             </a:fld>
             <a:endParaRPr lang="zh-CN" altLang="en-US"/>
           </a:p>
@@ -10323,7 +10663,7 @@
             <a:fld id="{BCDD0958-C144-4E3D-A8F5-AAEDA8C9D550}" type="datetime1">
               <a:rPr lang="zh-TW" altLang="en-US" smtClean="0"/>
               <a:pPr/>
-              <a:t>2014/9/16</a:t>
+              <a:t>2014/10/9</a:t>
             </a:fld>
             <a:endParaRPr lang="zh-CN" altLang="en-US"/>
           </a:p>
@@ -10452,7 +10792,7 @@
             <a:fld id="{BCDD0958-C144-4E3D-A8F5-AAEDA8C9D550}" type="datetime1">
               <a:rPr lang="zh-TW" altLang="en-US" smtClean="0"/>
               <a:pPr/>
-              <a:t>2014/9/16</a:t>
+              <a:t>2014/10/9</a:t>
             </a:fld>
             <a:endParaRPr lang="zh-CN" altLang="en-US"/>
           </a:p>
@@ -10558,7 +10898,7 @@
             <a:fld id="{BCDD0958-C144-4E3D-A8F5-AAEDA8C9D550}" type="datetime1">
               <a:rPr lang="zh-TW" altLang="en-US" smtClean="0"/>
               <a:pPr/>
-              <a:t>2014/9/16</a:t>
+              <a:t>2014/10/9</a:t>
             </a:fld>
             <a:endParaRPr lang="zh-CN" altLang="en-US"/>
           </a:p>
@@ -10615,11 +10955,7 @@
             </a:r>
             <a:r>
               <a:rPr lang="en-US" altLang="zh-CN" smtClean="0"/>
-              <a:t>New </a:t>
-            </a:r>
-            <a:r>
-              <a:rPr lang="en-US" altLang="zh-CN" smtClean="0"/>
-              <a:t>Batch ID</a:t>
+              <a:t>New Batch ID</a:t>
             </a:r>
             <a:endParaRPr lang="zh-CN" altLang="en-US" dirty="0"/>
           </a:p>

</xml_diff>

<commit_message>
fix enquire for Batch id , pi id.
</commit_message>
<xml_diff>
--- a/FrmPIE/0PackingInformationEntry.pptx
+++ b/FrmPIE/0PackingInformationEntry.pptx
@@ -5,30 +5,32 @@
     <p:sldMasterId id="2147483648" r:id="rId1"/>
   </p:sldMasterIdLst>
   <p:notesMasterIdLst>
-    <p:notesMasterId r:id="rId20"/>
+    <p:notesMasterId r:id="rId22"/>
   </p:notesMasterIdLst>
   <p:handoutMasterIdLst>
-    <p:handoutMasterId r:id="rId21"/>
+    <p:handoutMasterId r:id="rId23"/>
   </p:handoutMasterIdLst>
   <p:sldIdLst>
     <p:sldId id="256" r:id="rId2"/>
     <p:sldId id="341" r:id="rId3"/>
-    <p:sldId id="343" r:id="rId4"/>
-    <p:sldId id="344" r:id="rId5"/>
-    <p:sldId id="342" r:id="rId6"/>
-    <p:sldId id="345" r:id="rId7"/>
-    <p:sldId id="346" r:id="rId8"/>
-    <p:sldId id="347" r:id="rId9"/>
-    <p:sldId id="348" r:id="rId10"/>
-    <p:sldId id="349" r:id="rId11"/>
-    <p:sldId id="351" r:id="rId12"/>
-    <p:sldId id="350" r:id="rId13"/>
-    <p:sldId id="356" r:id="rId14"/>
-    <p:sldId id="352" r:id="rId15"/>
-    <p:sldId id="353" r:id="rId16"/>
-    <p:sldId id="354" r:id="rId17"/>
-    <p:sldId id="355" r:id="rId18"/>
-    <p:sldId id="340" r:id="rId19"/>
+    <p:sldId id="357" r:id="rId4"/>
+    <p:sldId id="358" r:id="rId5"/>
+    <p:sldId id="343" r:id="rId6"/>
+    <p:sldId id="344" r:id="rId7"/>
+    <p:sldId id="342" r:id="rId8"/>
+    <p:sldId id="345" r:id="rId9"/>
+    <p:sldId id="346" r:id="rId10"/>
+    <p:sldId id="347" r:id="rId11"/>
+    <p:sldId id="348" r:id="rId12"/>
+    <p:sldId id="349" r:id="rId13"/>
+    <p:sldId id="351" r:id="rId14"/>
+    <p:sldId id="350" r:id="rId15"/>
+    <p:sldId id="356" r:id="rId16"/>
+    <p:sldId id="352" r:id="rId17"/>
+    <p:sldId id="353" r:id="rId18"/>
+    <p:sldId id="354" r:id="rId19"/>
+    <p:sldId id="355" r:id="rId20"/>
+    <p:sldId id="340" r:id="rId21"/>
   </p:sldIdLst>
   <p:sldSz cx="9144000" cy="6858000" type="screen4x3"/>
   <p:notesSz cx="6813550" cy="9945688"/>
@@ -1684,11 +1686,7 @@
         <a:p>
           <a:r>
             <a:rPr lang="en-US" altLang="en-US" dirty="0" smtClean="0"/>
-            <a:t>Carton ID </a:t>
-          </a:r>
-          <a:r>
-            <a:rPr lang="en-US" altLang="en-US" dirty="0" smtClean="0"/>
-            <a:t>Maintain</a:t>
+            <a:t>Carton ID Maintain</a:t>
           </a:r>
           <a:endParaRPr lang="zh-CN" altLang="en-US" dirty="0"/>
         </a:p>
@@ -4888,7 +4886,7 @@
             <a:fld id="{4D2C590C-463E-4F0C-9134-D7C5128A8EB4}" type="datetimeFigureOut">
               <a:rPr lang="zh-TW" altLang="en-US" smtClean="0"/>
               <a:pPr/>
-              <a:t>2014/10/9</a:t>
+              <a:t>2014/10/10</a:t>
             </a:fld>
             <a:endParaRPr lang="zh-TW" altLang="en-US"/>
           </a:p>
@@ -4984,7 +4982,7 @@
             <a:fld id="{A8BD75ED-5E07-4F67-8C98-12BA1B9B61CE}" type="datetimeFigureOut">
               <a:rPr lang="zh-CN" altLang="en-US" smtClean="0"/>
               <a:pPr/>
-              <a:t>10/09/2014</a:t>
+              <a:t>10/10/2014</a:t>
             </a:fld>
             <a:endParaRPr lang="zh-CN" altLang="en-US" dirty="0"/>
           </a:p>
@@ -5319,7 +5317,7 @@
             <a:fld id="{A8B38BC6-A07A-4D04-A852-6C2ACEAE2FB5}" type="datetime1">
               <a:rPr lang="zh-CN" altLang="en-US" smtClean="0"/>
               <a:pPr/>
-              <a:t>10/09/2014</a:t>
+              <a:t>10/10/2014</a:t>
             </a:fld>
             <a:endParaRPr lang="zh-CN" altLang="en-US" dirty="0"/>
           </a:p>
@@ -5539,7 +5537,7 @@
             <a:fld id="{35A7AC81-696A-4C2A-B918-515844A88C4A}" type="datetime1">
               <a:rPr lang="zh-TW" altLang="en-US" smtClean="0"/>
               <a:pPr/>
-              <a:t>2014/10/9</a:t>
+              <a:t>2014/10/10</a:t>
             </a:fld>
             <a:endParaRPr lang="zh-CN" altLang="en-US"/>
           </a:p>
@@ -5706,7 +5704,7 @@
             <a:fld id="{3A66168E-DF05-4F16-9321-82EF6F7D3409}" type="datetime1">
               <a:rPr lang="zh-TW" altLang="en-US" smtClean="0"/>
               <a:pPr/>
-              <a:t>2014/10/9</a:t>
+              <a:t>2014/10/10</a:t>
             </a:fld>
             <a:endParaRPr lang="zh-CN" altLang="en-US"/>
           </a:p>
@@ -5883,7 +5881,7 @@
             <a:fld id="{292BB50C-E58E-4536-ABBE-FDAF06E55820}" type="datetime1">
               <a:rPr lang="zh-TW" altLang="en-US" smtClean="0"/>
               <a:pPr/>
-              <a:t>2014/10/9</a:t>
+              <a:t>2014/10/10</a:t>
             </a:fld>
             <a:endParaRPr lang="zh-CN" altLang="en-US"/>
           </a:p>
@@ -6027,7 +6025,7 @@
             <a:fld id="{BCDD0958-C144-4E3D-A8F5-AAEDA8C9D550}" type="datetime1">
               <a:rPr lang="zh-TW" altLang="en-US" smtClean="0"/>
               <a:pPr/>
-              <a:t>2014/10/9</a:t>
+              <a:t>2014/10/10</a:t>
             </a:fld>
             <a:endParaRPr lang="zh-CN" altLang="en-US"/>
           </a:p>
@@ -6293,7 +6291,7 @@
             <a:fld id="{C167E0BE-EAE3-45A7-A5A7-57157AC01174}" type="datetime1">
               <a:rPr lang="zh-TW" altLang="en-US" smtClean="0"/>
               <a:pPr/>
-              <a:t>2014/10/9</a:t>
+              <a:t>2014/10/10</a:t>
             </a:fld>
             <a:endParaRPr lang="zh-CN" altLang="en-US"/>
           </a:p>
@@ -6578,7 +6576,7 @@
             <a:fld id="{6AC3B814-8B0B-49DD-90D0-D679CAA248BF}" type="datetime1">
               <a:rPr lang="zh-TW" altLang="en-US" smtClean="0"/>
               <a:pPr/>
-              <a:t>2014/10/9</a:t>
+              <a:t>2014/10/10</a:t>
             </a:fld>
             <a:endParaRPr lang="zh-CN" altLang="en-US"/>
           </a:p>
@@ -6997,7 +6995,7 @@
             <a:fld id="{BF7ED2E8-9E3A-4757-81B5-4DB84D908ACD}" type="datetime1">
               <a:rPr lang="zh-TW" altLang="en-US" smtClean="0"/>
               <a:pPr/>
-              <a:t>2014/10/9</a:t>
+              <a:t>2014/10/10</a:t>
             </a:fld>
             <a:endParaRPr lang="zh-CN" altLang="en-US"/>
           </a:p>
@@ -7112,7 +7110,7 @@
             <a:fld id="{472DB839-8415-4D10-81B3-48A58C5324C2}" type="datetime1">
               <a:rPr lang="zh-TW" altLang="en-US" smtClean="0"/>
               <a:pPr/>
-              <a:t>2014/10/9</a:t>
+              <a:t>2014/10/10</a:t>
             </a:fld>
             <a:endParaRPr lang="zh-CN" altLang="en-US"/>
           </a:p>
@@ -7204,7 +7202,7 @@
             <a:fld id="{6144F512-14EF-46B4-9E70-9E1E0786683C}" type="datetime1">
               <a:rPr lang="zh-TW" altLang="en-US" smtClean="0"/>
               <a:pPr/>
-              <a:t>2014/10/9</a:t>
+              <a:t>2014/10/10</a:t>
             </a:fld>
             <a:endParaRPr lang="zh-CN" altLang="en-US"/>
           </a:p>
@@ -7478,7 +7476,7 @@
             <a:fld id="{B91D2291-1907-4432-B355-638067851FEC}" type="datetime1">
               <a:rPr lang="zh-TW" altLang="en-US" smtClean="0"/>
               <a:pPr/>
-              <a:t>2014/10/9</a:t>
+              <a:t>2014/10/10</a:t>
             </a:fld>
             <a:endParaRPr lang="zh-CN" altLang="en-US"/>
           </a:p>
@@ -7728,7 +7726,7 @@
             <a:fld id="{3CE2A9AE-EA9E-4495-BEFD-EBC4472D3C52}" type="datetime1">
               <a:rPr lang="zh-TW" altLang="en-US" smtClean="0"/>
               <a:pPr/>
-              <a:t>2014/10/9</a:t>
+              <a:t>2014/10/10</a:t>
             </a:fld>
             <a:endParaRPr lang="zh-CN" altLang="en-US"/>
           </a:p>
@@ -7938,7 +7936,7 @@
             <a:fld id="{8A63E226-BC2D-40EF-90E6-0476DBDDD628}" type="datetime1">
               <a:rPr lang="zh-TW" altLang="en-US" smtClean="0"/>
               <a:pPr/>
-              <a:t>2014/10/9</a:t>
+              <a:t>2014/10/10</a:t>
             </a:fld>
             <a:endParaRPr lang="zh-CN" altLang="en-US" dirty="0"/>
           </a:p>
@@ -8552,7 +8550,7 @@
             <a:fld id="{7D36EE62-A1CD-4859-A084-11A1BEE6A9C3}" type="datetime1">
               <a:rPr lang="zh-TW" altLang="en-US" smtClean="0"/>
               <a:pPr/>
-              <a:t>2014/10/9</a:t>
+              <a:t>2014/10/10</a:t>
             </a:fld>
             <a:endParaRPr lang="zh-CN" altLang="en-US"/>
           </a:p>
@@ -8592,7 +8590,7 @@
       </p:grpSpPr>
       <p:pic>
         <p:nvPicPr>
-          <p:cNvPr id="6" name="内容占位符 5" descr="1.2.2Add New(Edit Batch ID).png"/>
+          <p:cNvPr id="6" name="内容占位符 5" descr="1.2UploadEpackingList.png"/>
           <p:cNvPicPr>
             <a:picLocks noGrp="1" noChangeAspect="1"/>
           </p:cNvPicPr>
@@ -8608,8 +8606,8 @@
         </p:blipFill>
         <p:spPr>
           <a:xfrm>
-            <a:off x="1482005" y="1600200"/>
-            <a:ext cx="5810103" cy="4525963"/>
+            <a:off x="457200" y="1703399"/>
+            <a:ext cx="7859713" cy="4319564"/>
           </a:xfrm>
         </p:spPr>
       </p:pic>
@@ -8631,7 +8629,7 @@
             <a:fld id="{BCDD0958-C144-4E3D-A8F5-AAEDA8C9D550}" type="datetime1">
               <a:rPr lang="zh-TW" altLang="en-US" smtClean="0"/>
               <a:pPr/>
-              <a:t>2014/10/9</a:t>
+              <a:t>2014/10/10</a:t>
             </a:fld>
             <a:endParaRPr lang="zh-CN" altLang="en-US"/>
           </a:p>
@@ -8678,13 +8676,10 @@
           </a:bodyPr>
           <a:lstStyle/>
           <a:p>
+            <a:pPr lvl="0"/>
             <a:r>
               <a:rPr lang="en-US" altLang="en-US" dirty="0" smtClean="0"/>
-              <a:t>1.2.2 Edit </a:t>
-            </a:r>
-            <a:r>
-              <a:rPr lang="en-US" altLang="zh-CN" dirty="0" smtClean="0"/>
-              <a:t>Batch ID</a:t>
+              <a:t>1.2. Add New(Edit Batch ID)</a:t>
             </a:r>
             <a:endParaRPr lang="zh-CN" altLang="en-US" dirty="0"/>
           </a:p>
@@ -8740,7 +8735,7 @@
             <a:fld id="{BCDD0958-C144-4E3D-A8F5-AAEDA8C9D550}" type="datetime1">
               <a:rPr lang="zh-TW" altLang="en-US" smtClean="0"/>
               <a:pPr/>
-              <a:t>2014/10/9</a:t>
+              <a:t>2014/10/10</a:t>
             </a:fld>
             <a:endParaRPr lang="zh-CN" altLang="en-US"/>
           </a:p>
@@ -8789,11 +8784,15 @@
           <a:p>
             <a:r>
               <a:rPr lang="en-US" altLang="en-US" dirty="0" smtClean="0"/>
-              <a:t>1.2.3  Search </a:t>
+              <a:t>1.2.1 </a:t>
             </a:r>
             <a:r>
               <a:rPr lang="en-US" altLang="zh-CN" dirty="0" smtClean="0"/>
-              <a:t>Batch ID</a:t>
+              <a:t>Add a </a:t>
+            </a:r>
+            <a:r>
+              <a:rPr lang="en-US" altLang="zh-CN" smtClean="0"/>
+              <a:t>New Batch ID</a:t>
             </a:r>
             <a:endParaRPr lang="zh-CN" altLang="en-US" dirty="0"/>
           </a:p>
@@ -8801,7 +8800,7 @@
       </p:sp>
       <p:pic>
         <p:nvPicPr>
-          <p:cNvPr id="8" name="内容占位符 7" descr="1.2.3Add New(Edit Batch ID).png"/>
+          <p:cNvPr id="8" name="内容占位符 7" descr="1.2.1UploadEpackingList.png"/>
           <p:cNvPicPr>
             <a:picLocks noGrp="1" noChangeAspect="1"/>
           </p:cNvPicPr>
@@ -8817,8 +8816,8 @@
         </p:blipFill>
         <p:spPr>
           <a:xfrm>
-            <a:off x="1315867" y="1600200"/>
-            <a:ext cx="6142378" cy="4525963"/>
+            <a:off x="1206741" y="1600200"/>
+            <a:ext cx="6360631" cy="4525963"/>
           </a:xfrm>
         </p:spPr>
       </p:pic>
@@ -8856,7 +8855,7 @@
       </p:grpSpPr>
       <p:pic>
         <p:nvPicPr>
-          <p:cNvPr id="6" name="内容占位符 5" descr="2. CartonIDMaintain.png"/>
+          <p:cNvPr id="6" name="内容占位符 5" descr="1.2.2Add New(Edit Batch ID).png"/>
           <p:cNvPicPr>
             <a:picLocks noGrp="1" noChangeAspect="1"/>
           </p:cNvPicPr>
@@ -8872,8 +8871,8 @@
         </p:blipFill>
         <p:spPr>
           <a:xfrm>
-            <a:off x="597244" y="1600200"/>
-            <a:ext cx="7579625" cy="4525963"/>
+            <a:off x="1482005" y="1600200"/>
+            <a:ext cx="5810103" cy="4525963"/>
           </a:xfrm>
         </p:spPr>
       </p:pic>
@@ -8895,7 +8894,7 @@
             <a:fld id="{BCDD0958-C144-4E3D-A8F5-AAEDA8C9D550}" type="datetime1">
               <a:rPr lang="zh-TW" altLang="en-US" smtClean="0"/>
               <a:pPr/>
-              <a:t>2014/10/9</a:t>
+              <a:t>2014/10/10</a:t>
             </a:fld>
             <a:endParaRPr lang="zh-CN" altLang="en-US"/>
           </a:p>
@@ -8938,25 +8937,17 @@
         <p:spPr/>
         <p:txBody>
           <a:bodyPr>
-            <a:normAutofit fontScale="90000"/>
+            <a:normAutofit/>
           </a:bodyPr>
           <a:lstStyle/>
           <a:p>
-            <a:pPr lvl="0"/>
+            <a:r>
+              <a:rPr lang="en-US" altLang="en-US" dirty="0" smtClean="0"/>
+              <a:t>1.2.2 Edit </a:t>
+            </a:r>
             <a:r>
               <a:rPr lang="en-US" altLang="zh-CN" dirty="0" smtClean="0"/>
-              <a:t>2.</a:t>
-            </a:r>
-            <a:r>
-              <a:rPr lang="en-US" altLang="en-US" dirty="0" smtClean="0"/>
-              <a:t> Carton ID Maintain</a:t>
-            </a:r>
-            <a:br>
-              <a:rPr lang="en-US" altLang="en-US" dirty="0" smtClean="0"/>
-            </a:br>
-            <a:r>
-              <a:rPr lang="en-US" altLang="en-US" dirty="0" smtClean="0"/>
-              <a:t>(upload to ERP)</a:t>
+              <a:t>Batch ID</a:t>
             </a:r>
             <a:endParaRPr lang="zh-CN" altLang="en-US" dirty="0"/>
           </a:p>
@@ -9012,7 +9003,7 @@
             <a:fld id="{BCDD0958-C144-4E3D-A8F5-AAEDA8C9D550}" type="datetime1">
               <a:rPr lang="zh-TW" altLang="en-US" smtClean="0"/>
               <a:pPr/>
-              <a:t>2014/10/9</a:t>
+              <a:t>2014/10/10</a:t>
             </a:fld>
             <a:endParaRPr lang="zh-CN" altLang="en-US"/>
           </a:p>
@@ -9037,6 +9028,278 @@
               <a:rPr lang="zh-CN" altLang="en-US" smtClean="0"/>
               <a:pPr/>
               <a:t>13</a:t>
+            </a:fld>
+            <a:endParaRPr lang="zh-CN" altLang="en-US" dirty="0"/>
+          </a:p>
+        </p:txBody>
+      </p:sp>
+      <p:sp>
+        <p:nvSpPr>
+          <p:cNvPr id="5" name="标题 4"/>
+          <p:cNvSpPr>
+            <a:spLocks noGrp="1"/>
+          </p:cNvSpPr>
+          <p:nvPr>
+            <p:ph type="title"/>
+          </p:nvPr>
+        </p:nvSpPr>
+        <p:spPr/>
+        <p:txBody>
+          <a:bodyPr>
+            <a:normAutofit/>
+          </a:bodyPr>
+          <a:lstStyle/>
+          <a:p>
+            <a:r>
+              <a:rPr lang="en-US" altLang="en-US" dirty="0" smtClean="0"/>
+              <a:t>1.2.3  Search </a:t>
+            </a:r>
+            <a:r>
+              <a:rPr lang="en-US" altLang="zh-CN" dirty="0" smtClean="0"/>
+              <a:t>Batch ID</a:t>
+            </a:r>
+            <a:endParaRPr lang="zh-CN" altLang="en-US" dirty="0"/>
+          </a:p>
+        </p:txBody>
+      </p:sp>
+      <p:pic>
+        <p:nvPicPr>
+          <p:cNvPr id="8" name="内容占位符 7" descr="1.2.3Add New(Edit Batch ID).png"/>
+          <p:cNvPicPr>
+            <a:picLocks noGrp="1" noChangeAspect="1"/>
+          </p:cNvPicPr>
+          <p:nvPr>
+            <p:ph idx="1"/>
+          </p:nvPr>
+        </p:nvPicPr>
+        <p:blipFill>
+          <a:blip r:embed="rId2"/>
+          <a:stretch>
+            <a:fillRect/>
+          </a:stretch>
+        </p:blipFill>
+        <p:spPr>
+          <a:xfrm>
+            <a:off x="1315867" y="1600200"/>
+            <a:ext cx="6142378" cy="4525963"/>
+          </a:xfrm>
+        </p:spPr>
+      </p:pic>
+    </p:spTree>
+  </p:cSld>
+  <p:clrMapOvr>
+    <a:masterClrMapping/>
+  </p:clrMapOvr>
+  <p:timing>
+    <p:tnLst>
+      <p:par>
+        <p:cTn id="1" dur="indefinite" restart="never" nodeType="tmRoot"/>
+      </p:par>
+    </p:tnLst>
+  </p:timing>
+</p:sld>
+</file>
+
+<file path=ppt/slides/slide14.xml><?xml version="1.0" encoding="utf-8"?>
+<p:sld xmlns:a="http://schemas.openxmlformats.org/drawingml/2006/main" xmlns:r="http://schemas.openxmlformats.org/officeDocument/2006/relationships" xmlns:p="http://schemas.openxmlformats.org/presentationml/2006/main">
+  <p:cSld>
+    <p:spTree>
+      <p:nvGrpSpPr>
+        <p:cNvPr id="1" name=""/>
+        <p:cNvGrpSpPr/>
+        <p:nvPr/>
+      </p:nvGrpSpPr>
+      <p:grpSpPr>
+        <a:xfrm>
+          <a:off x="0" y="0"/>
+          <a:ext cx="0" cy="0"/>
+          <a:chOff x="0" y="0"/>
+          <a:chExt cx="0" cy="0"/>
+        </a:xfrm>
+      </p:grpSpPr>
+      <p:pic>
+        <p:nvPicPr>
+          <p:cNvPr id="6" name="内容占位符 5" descr="2. CartonIDMaintain.png"/>
+          <p:cNvPicPr>
+            <a:picLocks noGrp="1" noChangeAspect="1"/>
+          </p:cNvPicPr>
+          <p:nvPr>
+            <p:ph idx="1"/>
+          </p:nvPr>
+        </p:nvPicPr>
+        <p:blipFill>
+          <a:blip r:embed="rId2"/>
+          <a:stretch>
+            <a:fillRect/>
+          </a:stretch>
+        </p:blipFill>
+        <p:spPr>
+          <a:xfrm>
+            <a:off x="597244" y="1600200"/>
+            <a:ext cx="7579625" cy="4525963"/>
+          </a:xfrm>
+        </p:spPr>
+      </p:pic>
+      <p:sp>
+        <p:nvSpPr>
+          <p:cNvPr id="3" name="日期占位符 2"/>
+          <p:cNvSpPr>
+            <a:spLocks noGrp="1"/>
+          </p:cNvSpPr>
+          <p:nvPr>
+            <p:ph type="dt" sz="half" idx="10"/>
+          </p:nvPr>
+        </p:nvSpPr>
+        <p:spPr/>
+        <p:txBody>
+          <a:bodyPr/>
+          <a:lstStyle/>
+          <a:p>
+            <a:fld id="{BCDD0958-C144-4E3D-A8F5-AAEDA8C9D550}" type="datetime1">
+              <a:rPr lang="zh-TW" altLang="en-US" smtClean="0"/>
+              <a:pPr/>
+              <a:t>2014/10/10</a:t>
+            </a:fld>
+            <a:endParaRPr lang="zh-CN" altLang="en-US"/>
+          </a:p>
+        </p:txBody>
+      </p:sp>
+      <p:sp>
+        <p:nvSpPr>
+          <p:cNvPr id="4" name="灯片编号占位符 3"/>
+          <p:cNvSpPr>
+            <a:spLocks noGrp="1"/>
+          </p:cNvSpPr>
+          <p:nvPr>
+            <p:ph type="sldNum" sz="quarter" idx="12"/>
+          </p:nvPr>
+        </p:nvSpPr>
+        <p:spPr/>
+        <p:txBody>
+          <a:bodyPr/>
+          <a:lstStyle/>
+          <a:p>
+            <a:fld id="{28874C86-8C61-448A-906E-93CD94C69BE8}" type="slidenum">
+              <a:rPr lang="zh-CN" altLang="en-US" smtClean="0"/>
+              <a:pPr/>
+              <a:t>14</a:t>
+            </a:fld>
+            <a:endParaRPr lang="zh-CN" altLang="en-US" dirty="0"/>
+          </a:p>
+        </p:txBody>
+      </p:sp>
+      <p:sp>
+        <p:nvSpPr>
+          <p:cNvPr id="5" name="标题 4"/>
+          <p:cNvSpPr>
+            <a:spLocks noGrp="1"/>
+          </p:cNvSpPr>
+          <p:nvPr>
+            <p:ph type="title"/>
+          </p:nvPr>
+        </p:nvSpPr>
+        <p:spPr/>
+        <p:txBody>
+          <a:bodyPr>
+            <a:normAutofit fontScale="90000"/>
+          </a:bodyPr>
+          <a:lstStyle/>
+          <a:p>
+            <a:pPr lvl="0"/>
+            <a:r>
+              <a:rPr lang="en-US" altLang="zh-CN" dirty="0" smtClean="0"/>
+              <a:t>2.</a:t>
+            </a:r>
+            <a:r>
+              <a:rPr lang="en-US" altLang="en-US" dirty="0" smtClean="0"/>
+              <a:t> Carton ID Maintain</a:t>
+            </a:r>
+            <a:br>
+              <a:rPr lang="en-US" altLang="en-US" dirty="0" smtClean="0"/>
+            </a:br>
+            <a:r>
+              <a:rPr lang="en-US" altLang="en-US" dirty="0" smtClean="0"/>
+              <a:t>(upload to ERP)</a:t>
+            </a:r>
+            <a:endParaRPr lang="zh-CN" altLang="en-US" dirty="0"/>
+          </a:p>
+        </p:txBody>
+      </p:sp>
+    </p:spTree>
+  </p:cSld>
+  <p:clrMapOvr>
+    <a:masterClrMapping/>
+  </p:clrMapOvr>
+  <p:timing>
+    <p:tnLst>
+      <p:par>
+        <p:cTn id="1" dur="indefinite" restart="never" nodeType="tmRoot"/>
+      </p:par>
+    </p:tnLst>
+  </p:timing>
+</p:sld>
+</file>
+
+<file path=ppt/slides/slide15.xml><?xml version="1.0" encoding="utf-8"?>
+<p:sld xmlns:a="http://schemas.openxmlformats.org/drawingml/2006/main" xmlns:r="http://schemas.openxmlformats.org/officeDocument/2006/relationships" xmlns:p="http://schemas.openxmlformats.org/presentationml/2006/main">
+  <p:cSld>
+    <p:spTree>
+      <p:nvGrpSpPr>
+        <p:cNvPr id="1" name=""/>
+        <p:cNvGrpSpPr/>
+        <p:nvPr/>
+      </p:nvGrpSpPr>
+      <p:grpSpPr>
+        <a:xfrm>
+          <a:off x="0" y="0"/>
+          <a:ext cx="0" cy="0"/>
+          <a:chOff x="0" y="0"/>
+          <a:chExt cx="0" cy="0"/>
+        </a:xfrm>
+      </p:grpSpPr>
+      <p:sp>
+        <p:nvSpPr>
+          <p:cNvPr id="3" name="日期占位符 2"/>
+          <p:cNvSpPr>
+            <a:spLocks noGrp="1"/>
+          </p:cNvSpPr>
+          <p:nvPr>
+            <p:ph type="dt" sz="half" idx="10"/>
+          </p:nvPr>
+        </p:nvSpPr>
+        <p:spPr/>
+        <p:txBody>
+          <a:bodyPr/>
+          <a:lstStyle/>
+          <a:p>
+            <a:fld id="{BCDD0958-C144-4E3D-A8F5-AAEDA8C9D550}" type="datetime1">
+              <a:rPr lang="zh-TW" altLang="en-US" smtClean="0"/>
+              <a:pPr/>
+              <a:t>2014/10/10</a:t>
+            </a:fld>
+            <a:endParaRPr lang="zh-CN" altLang="en-US"/>
+          </a:p>
+        </p:txBody>
+      </p:sp>
+      <p:sp>
+        <p:nvSpPr>
+          <p:cNvPr id="4" name="灯片编号占位符 3"/>
+          <p:cNvSpPr>
+            <a:spLocks noGrp="1"/>
+          </p:cNvSpPr>
+          <p:nvPr>
+            <p:ph type="sldNum" sz="quarter" idx="12"/>
+          </p:nvPr>
+        </p:nvSpPr>
+        <p:spPr/>
+        <p:txBody>
+          <a:bodyPr/>
+          <a:lstStyle/>
+          <a:p>
+            <a:fld id="{28874C86-8C61-448A-906E-93CD94C69BE8}" type="slidenum">
+              <a:rPr lang="zh-CN" altLang="en-US" smtClean="0"/>
+              <a:pPr/>
+              <a:t>15</a:t>
             </a:fld>
             <a:endParaRPr lang="zh-CN" altLang="en-US" dirty="0"/>
           </a:p>
@@ -9179,7 +9442,7 @@
 </p:sld>
 </file>
 
-<file path=ppt/slides/slide14.xml><?xml version="1.0" encoding="utf-8"?>
+<file path=ppt/slides/slide16.xml><?xml version="1.0" encoding="utf-8"?>
 <p:sld xmlns:a="http://schemas.openxmlformats.org/drawingml/2006/main" xmlns:r="http://schemas.openxmlformats.org/officeDocument/2006/relationships" xmlns:p="http://schemas.openxmlformats.org/presentationml/2006/main">
   <p:cSld>
     <p:spTree>
@@ -9214,7 +9477,7 @@
             <a:fld id="{BCDD0958-C144-4E3D-A8F5-AAEDA8C9D550}" type="datetime1">
               <a:rPr lang="zh-TW" altLang="en-US" smtClean="0"/>
               <a:pPr/>
-              <a:t>2014/10/9</a:t>
+              <a:t>2014/10/10</a:t>
             </a:fld>
             <a:endParaRPr lang="zh-CN" altLang="en-US"/>
           </a:p>
@@ -9238,7 +9501,7 @@
             <a:fld id="{28874C86-8C61-448A-906E-93CD94C69BE8}" type="slidenum">
               <a:rPr lang="zh-CN" altLang="en-US" smtClean="0"/>
               <a:pPr/>
-              <a:t>14</a:t>
+              <a:t>16</a:t>
             </a:fld>
             <a:endParaRPr lang="zh-CN" altLang="en-US" dirty="0"/>
           </a:p>
@@ -9308,7 +9571,7 @@
 </p:sld>
 </file>
 
-<file path=ppt/slides/slide15.xml><?xml version="1.0" encoding="utf-8"?>
+<file path=ppt/slides/slide17.xml><?xml version="1.0" encoding="utf-8"?>
 <p:sld xmlns:a="http://schemas.openxmlformats.org/drawingml/2006/main" xmlns:r="http://schemas.openxmlformats.org/officeDocument/2006/relationships" xmlns:p="http://schemas.openxmlformats.org/presentationml/2006/main">
   <p:cSld>
     <p:spTree>
@@ -9366,7 +9629,7 @@
             <a:fld id="{BCDD0958-C144-4E3D-A8F5-AAEDA8C9D550}" type="datetime1">
               <a:rPr lang="zh-TW" altLang="en-US" smtClean="0"/>
               <a:pPr/>
-              <a:t>2014/10/9</a:t>
+              <a:t>2014/10/10</a:t>
             </a:fld>
             <a:endParaRPr lang="zh-CN" altLang="en-US"/>
           </a:p>
@@ -9390,7 +9653,7 @@
             <a:fld id="{28874C86-8C61-448A-906E-93CD94C69BE8}" type="slidenum">
               <a:rPr lang="zh-CN" altLang="en-US" smtClean="0"/>
               <a:pPr/>
-              <a:t>15</a:t>
+              <a:t>17</a:t>
             </a:fld>
             <a:endParaRPr lang="zh-CN" altLang="en-US" dirty="0"/>
           </a:p>
@@ -9441,7 +9704,7 @@
 </p:sld>
 </file>
 
-<file path=ppt/slides/slide16.xml><?xml version="1.0" encoding="utf-8"?>
+<file path=ppt/slides/slide18.xml><?xml version="1.0" encoding="utf-8"?>
 <p:sld xmlns:a="http://schemas.openxmlformats.org/drawingml/2006/main" xmlns:r="http://schemas.openxmlformats.org/officeDocument/2006/relationships" xmlns:p="http://schemas.openxmlformats.org/presentationml/2006/main">
   <p:cSld>
     <p:spTree>
@@ -9476,7 +9739,7 @@
             <a:fld id="{BCDD0958-C144-4E3D-A8F5-AAEDA8C9D550}" type="datetime1">
               <a:rPr lang="zh-TW" altLang="en-US" smtClean="0"/>
               <a:pPr/>
-              <a:t>2014/10/9</a:t>
+              <a:t>2014/10/10</a:t>
             </a:fld>
             <a:endParaRPr lang="zh-CN" altLang="en-US"/>
           </a:p>
@@ -9500,7 +9763,7 @@
             <a:fld id="{28874C86-8C61-448A-906E-93CD94C69BE8}" type="slidenum">
               <a:rPr lang="zh-CN" altLang="en-US" smtClean="0"/>
               <a:pPr/>
-              <a:t>16</a:t>
+              <a:t>18</a:t>
             </a:fld>
             <a:endParaRPr lang="zh-CN" altLang="en-US" dirty="0"/>
           </a:p>
@@ -9560,7 +9823,7 @@
 </p:sld>
 </file>
 
-<file path=ppt/slides/slide17.xml><?xml version="1.0" encoding="utf-8"?>
+<file path=ppt/slides/slide19.xml><?xml version="1.0" encoding="utf-8"?>
 <p:sld xmlns:a="http://schemas.openxmlformats.org/drawingml/2006/main" xmlns:r="http://schemas.openxmlformats.org/officeDocument/2006/relationships" xmlns:p="http://schemas.openxmlformats.org/presentationml/2006/main">
   <p:cSld>
     <p:spTree>
@@ -9618,7 +9881,7 @@
             <a:fld id="{BCDD0958-C144-4E3D-A8F5-AAEDA8C9D550}" type="datetime1">
               <a:rPr lang="zh-TW" altLang="en-US" smtClean="0"/>
               <a:pPr/>
-              <a:t>2014/10/9</a:t>
+              <a:t>2014/10/10</a:t>
             </a:fld>
             <a:endParaRPr lang="zh-CN" altLang="en-US"/>
           </a:p>
@@ -9642,7 +9905,7 @@
             <a:fld id="{28874C86-8C61-448A-906E-93CD94C69BE8}" type="slidenum">
               <a:rPr lang="zh-CN" altLang="en-US" smtClean="0"/>
               <a:pPr/>
-              <a:t>17</a:t>
+              <a:t>19</a:t>
             </a:fld>
             <a:endParaRPr lang="zh-CN" altLang="en-US" dirty="0"/>
           </a:p>
@@ -9683,130 +9946,6 @@
   <p:clrMapOvr>
     <a:masterClrMapping/>
   </p:clrMapOvr>
-</p:sld>
-</file>
-
-<file path=ppt/slides/slide18.xml><?xml version="1.0" encoding="utf-8"?>
-<p:sld xmlns:a="http://schemas.openxmlformats.org/drawingml/2006/main" xmlns:r="http://schemas.openxmlformats.org/officeDocument/2006/relationships" xmlns:p="http://schemas.openxmlformats.org/presentationml/2006/main">
-  <p:cSld>
-    <p:spTree>
-      <p:nvGrpSpPr>
-        <p:cNvPr id="1" name=""/>
-        <p:cNvGrpSpPr/>
-        <p:nvPr/>
-      </p:nvGrpSpPr>
-      <p:grpSpPr>
-        <a:xfrm>
-          <a:off x="0" y="0"/>
-          <a:ext cx="0" cy="0"/>
-          <a:chOff x="0" y="0"/>
-          <a:chExt cx="0" cy="0"/>
-        </a:xfrm>
-      </p:grpSpPr>
-      <p:sp>
-        <p:nvSpPr>
-          <p:cNvPr id="2" name="Content Placeholder 1"/>
-          <p:cNvSpPr>
-            <a:spLocks noGrp="1"/>
-          </p:cNvSpPr>
-          <p:nvPr>
-            <p:ph idx="1"/>
-          </p:nvPr>
-        </p:nvSpPr>
-        <p:spPr/>
-        <p:txBody>
-          <a:bodyPr/>
-          <a:lstStyle/>
-          <a:p>
-            <a:pPr algn="ctr">
-              <a:buNone/>
-            </a:pPr>
-            <a:endParaRPr lang="en-US" altLang="zh-CN" dirty="0" smtClean="0"/>
-          </a:p>
-          <a:p>
-            <a:pPr algn="ctr">
-              <a:buNone/>
-            </a:pPr>
-            <a:endParaRPr lang="en-US" altLang="zh-CN" dirty="0" smtClean="0"/>
-          </a:p>
-          <a:p>
-            <a:pPr algn="ctr">
-              <a:buNone/>
-            </a:pPr>
-            <a:endParaRPr lang="en-US" altLang="zh-CN" dirty="0" smtClean="0"/>
-          </a:p>
-          <a:p>
-            <a:pPr algn="ctr">
-              <a:buNone/>
-            </a:pPr>
-            <a:r>
-              <a:rPr lang="en-US" altLang="zh-CN" dirty="0" smtClean="0"/>
-              <a:t>--END--</a:t>
-            </a:r>
-            <a:endParaRPr lang="zh-CN" altLang="en-US" dirty="0"/>
-          </a:p>
-        </p:txBody>
-      </p:sp>
-      <p:sp>
-        <p:nvSpPr>
-          <p:cNvPr id="3" name="Date Placeholder 2"/>
-          <p:cNvSpPr>
-            <a:spLocks noGrp="1"/>
-          </p:cNvSpPr>
-          <p:nvPr>
-            <p:ph type="dt" sz="half" idx="10"/>
-          </p:nvPr>
-        </p:nvSpPr>
-        <p:spPr/>
-        <p:txBody>
-          <a:bodyPr/>
-          <a:lstStyle/>
-          <a:p>
-            <a:fld id="{BCDD0958-C144-4E3D-A8F5-AAEDA8C9D550}" type="datetime1">
-              <a:rPr lang="zh-TW" altLang="en-US" smtClean="0"/>
-              <a:pPr/>
-              <a:t>2014/10/9</a:t>
-            </a:fld>
-            <a:endParaRPr lang="zh-CN" altLang="en-US"/>
-          </a:p>
-        </p:txBody>
-      </p:sp>
-      <p:sp>
-        <p:nvSpPr>
-          <p:cNvPr id="4" name="Slide Number Placeholder 3"/>
-          <p:cNvSpPr>
-            <a:spLocks noGrp="1"/>
-          </p:cNvSpPr>
-          <p:nvPr>
-            <p:ph type="sldNum" sz="quarter" idx="12"/>
-          </p:nvPr>
-        </p:nvSpPr>
-        <p:spPr/>
-        <p:txBody>
-          <a:bodyPr/>
-          <a:lstStyle/>
-          <a:p>
-            <a:fld id="{28874C86-8C61-448A-906E-93CD94C69BE8}" type="slidenum">
-              <a:rPr lang="zh-CN" altLang="en-US" smtClean="0"/>
-              <a:pPr/>
-              <a:t>18</a:t>
-            </a:fld>
-            <a:endParaRPr lang="zh-CN" altLang="en-US" dirty="0"/>
-          </a:p>
-        </p:txBody>
-      </p:sp>
-    </p:spTree>
-  </p:cSld>
-  <p:clrMapOvr>
-    <a:masterClrMapping/>
-  </p:clrMapOvr>
-  <p:timing>
-    <p:tnLst>
-      <p:par>
-        <p:cTn id="1" dur="indefinite" restart="never" nodeType="tmRoot"/>
-      </p:par>
-    </p:tnLst>
-  </p:timing>
 </p:sld>
 </file>
 
@@ -9865,7 +10004,7 @@
             <a:fld id="{BCDD0958-C144-4E3D-A8F5-AAEDA8C9D550}" type="datetime1">
               <a:rPr lang="zh-TW" altLang="en-US" smtClean="0"/>
               <a:pPr/>
-              <a:t>2014/10/9</a:t>
+              <a:t>2014/10/10</a:t>
             </a:fld>
             <a:endParaRPr lang="zh-CN" altLang="en-US"/>
           </a:p>
@@ -10089,7 +10228,614 @@
 </p:sld>
 </file>
 
+<file path=ppt/slides/slide20.xml><?xml version="1.0" encoding="utf-8"?>
+<p:sld xmlns:a="http://schemas.openxmlformats.org/drawingml/2006/main" xmlns:r="http://schemas.openxmlformats.org/officeDocument/2006/relationships" xmlns:p="http://schemas.openxmlformats.org/presentationml/2006/main">
+  <p:cSld>
+    <p:spTree>
+      <p:nvGrpSpPr>
+        <p:cNvPr id="1" name=""/>
+        <p:cNvGrpSpPr/>
+        <p:nvPr/>
+      </p:nvGrpSpPr>
+      <p:grpSpPr>
+        <a:xfrm>
+          <a:off x="0" y="0"/>
+          <a:ext cx="0" cy="0"/>
+          <a:chOff x="0" y="0"/>
+          <a:chExt cx="0" cy="0"/>
+        </a:xfrm>
+      </p:grpSpPr>
+      <p:sp>
+        <p:nvSpPr>
+          <p:cNvPr id="2" name="Content Placeholder 1"/>
+          <p:cNvSpPr>
+            <a:spLocks noGrp="1"/>
+          </p:cNvSpPr>
+          <p:nvPr>
+            <p:ph idx="1"/>
+          </p:nvPr>
+        </p:nvSpPr>
+        <p:spPr/>
+        <p:txBody>
+          <a:bodyPr/>
+          <a:lstStyle/>
+          <a:p>
+            <a:pPr algn="ctr">
+              <a:buNone/>
+            </a:pPr>
+            <a:endParaRPr lang="en-US" altLang="zh-CN" dirty="0" smtClean="0"/>
+          </a:p>
+          <a:p>
+            <a:pPr algn="ctr">
+              <a:buNone/>
+            </a:pPr>
+            <a:endParaRPr lang="en-US" altLang="zh-CN" dirty="0" smtClean="0"/>
+          </a:p>
+          <a:p>
+            <a:pPr algn="ctr">
+              <a:buNone/>
+            </a:pPr>
+            <a:endParaRPr lang="en-US" altLang="zh-CN" dirty="0" smtClean="0"/>
+          </a:p>
+          <a:p>
+            <a:pPr algn="ctr">
+              <a:buNone/>
+            </a:pPr>
+            <a:r>
+              <a:rPr lang="en-US" altLang="zh-CN" dirty="0" smtClean="0"/>
+              <a:t>--END--</a:t>
+            </a:r>
+            <a:endParaRPr lang="zh-CN" altLang="en-US" dirty="0"/>
+          </a:p>
+        </p:txBody>
+      </p:sp>
+      <p:sp>
+        <p:nvSpPr>
+          <p:cNvPr id="3" name="Date Placeholder 2"/>
+          <p:cNvSpPr>
+            <a:spLocks noGrp="1"/>
+          </p:cNvSpPr>
+          <p:nvPr>
+            <p:ph type="dt" sz="half" idx="10"/>
+          </p:nvPr>
+        </p:nvSpPr>
+        <p:spPr/>
+        <p:txBody>
+          <a:bodyPr/>
+          <a:lstStyle/>
+          <a:p>
+            <a:fld id="{BCDD0958-C144-4E3D-A8F5-AAEDA8C9D550}" type="datetime1">
+              <a:rPr lang="zh-TW" altLang="en-US" smtClean="0"/>
+              <a:pPr/>
+              <a:t>2014/10/10</a:t>
+            </a:fld>
+            <a:endParaRPr lang="zh-CN" altLang="en-US"/>
+          </a:p>
+        </p:txBody>
+      </p:sp>
+      <p:sp>
+        <p:nvSpPr>
+          <p:cNvPr id="4" name="Slide Number Placeholder 3"/>
+          <p:cNvSpPr>
+            <a:spLocks noGrp="1"/>
+          </p:cNvSpPr>
+          <p:nvPr>
+            <p:ph type="sldNum" sz="quarter" idx="12"/>
+          </p:nvPr>
+        </p:nvSpPr>
+        <p:spPr/>
+        <p:txBody>
+          <a:bodyPr/>
+          <a:lstStyle/>
+          <a:p>
+            <a:fld id="{28874C86-8C61-448A-906E-93CD94C69BE8}" type="slidenum">
+              <a:rPr lang="zh-CN" altLang="en-US" smtClean="0"/>
+              <a:pPr/>
+              <a:t>20</a:t>
+            </a:fld>
+            <a:endParaRPr lang="zh-CN" altLang="en-US" dirty="0"/>
+          </a:p>
+        </p:txBody>
+      </p:sp>
+    </p:spTree>
+  </p:cSld>
+  <p:clrMapOvr>
+    <a:masterClrMapping/>
+  </p:clrMapOvr>
+  <p:timing>
+    <p:tnLst>
+      <p:par>
+        <p:cTn id="1" dur="indefinite" restart="never" nodeType="tmRoot"/>
+      </p:par>
+    </p:tnLst>
+  </p:timing>
+</p:sld>
+</file>
+
 <file path=ppt/slides/slide3.xml><?xml version="1.0" encoding="utf-8"?>
+<p:sld xmlns:a="http://schemas.openxmlformats.org/drawingml/2006/main" xmlns:r="http://schemas.openxmlformats.org/officeDocument/2006/relationships" xmlns:p="http://schemas.openxmlformats.org/presentationml/2006/main">
+  <p:cSld>
+    <p:spTree>
+      <p:nvGrpSpPr>
+        <p:cNvPr id="1" name=""/>
+        <p:cNvGrpSpPr/>
+        <p:nvPr/>
+      </p:nvGrpSpPr>
+      <p:grpSpPr>
+        <a:xfrm>
+          <a:off x="0" y="0"/>
+          <a:ext cx="0" cy="0"/>
+          <a:chOff x="0" y="0"/>
+          <a:chExt cx="0" cy="0"/>
+        </a:xfrm>
+      </p:grpSpPr>
+      <p:sp>
+        <p:nvSpPr>
+          <p:cNvPr id="15" name="标题 14"/>
+          <p:cNvSpPr>
+            <a:spLocks noGrp="1"/>
+          </p:cNvSpPr>
+          <p:nvPr>
+            <p:ph type="title"/>
+          </p:nvPr>
+        </p:nvSpPr>
+        <p:spPr>
+          <a:xfrm>
+            <a:off x="428596" y="0"/>
+            <a:ext cx="7859216" cy="1143000"/>
+          </a:xfrm>
+        </p:spPr>
+        <p:txBody>
+          <a:bodyPr>
+            <a:normAutofit/>
+          </a:bodyPr>
+          <a:lstStyle/>
+          <a:p>
+            <a:r>
+              <a:rPr lang="en-US" altLang="zh-CN" dirty="0" smtClean="0"/>
+              <a:t>Download IDR Soft 1</a:t>
+            </a:r>
+            <a:endParaRPr lang="zh-CN" altLang="en-US" dirty="0"/>
+          </a:p>
+        </p:txBody>
+      </p:sp>
+      <p:sp>
+        <p:nvSpPr>
+          <p:cNvPr id="1038" name="Rectangle 14"/>
+          <p:cNvSpPr>
+            <a:spLocks noChangeArrowheads="1"/>
+          </p:cNvSpPr>
+          <p:nvPr/>
+        </p:nvSpPr>
+        <p:spPr bwMode="auto">
+          <a:xfrm>
+            <a:off x="0" y="6781800"/>
+            <a:ext cx="9144000" cy="457200"/>
+          </a:xfrm>
+          <a:prstGeom prst="rect">
+            <a:avLst/>
+          </a:prstGeom>
+          <a:noFill/>
+          <a:ln w="9525">
+            <a:noFill/>
+            <a:miter lim="800000"/>
+            <a:headEnd/>
+            <a:tailEnd/>
+          </a:ln>
+          <a:effectLst/>
+        </p:spPr>
+        <p:txBody>
+          <a:bodyPr vert="horz" wrap="none" lIns="91440" tIns="45720" rIns="91440" bIns="45720" numCol="1" anchor="ctr" anchorCtr="0" compatLnSpc="1">
+            <a:prstTxWarp prst="textNoShape">
+              <a:avLst/>
+            </a:prstTxWarp>
+            <a:spAutoFit/>
+          </a:bodyPr>
+          <a:lstStyle/>
+          <a:p>
+            <a:pPr marL="0" marR="0" lvl="0" indent="0" algn="l" defTabSz="914400" rtl="0" eaLnBrk="1" fontAlgn="base" latinLnBrk="0" hangingPunct="1">
+              <a:lnSpc>
+                <a:spcPct val="100000"/>
+              </a:lnSpc>
+              <a:spcBef>
+                <a:spcPct val="0"/>
+              </a:spcBef>
+              <a:spcAft>
+                <a:spcPct val="0"/>
+              </a:spcAft>
+              <a:buClrTx/>
+              <a:buSzTx/>
+              <a:buFontTx/>
+              <a:buNone/>
+              <a:tabLst/>
+            </a:pPr>
+            <a:r>
+              <a:rPr kumimoji="0" lang="en-US" altLang="zh-CN" sz="1000" b="0" i="0" u="none" strike="noStrike" cap="none" normalizeH="0" baseline="0" smtClean="0">
+                <a:ln>
+                  <a:noFill/>
+                </a:ln>
+                <a:solidFill>
+                  <a:srgbClr val="1F497D"/>
+                </a:solidFill>
+                <a:effectLst/>
+                <a:latin typeface="Calibri" pitchFamily="34" charset="0"/>
+                <a:ea typeface="宋体" pitchFamily="2" charset="-122"/>
+                <a:cs typeface="Calibri" pitchFamily="34" charset="0"/>
+              </a:rPr>
+              <a:t>3.zip idr soft</a:t>
+            </a:r>
+            <a:endParaRPr kumimoji="0" lang="en-US" altLang="zh-CN" sz="1800" b="0" i="0" u="none" strike="noStrike" cap="none" normalizeH="0" baseline="0" smtClean="0">
+              <a:ln>
+                <a:noFill/>
+              </a:ln>
+              <a:solidFill>
+                <a:schemeClr val="tx1"/>
+              </a:solidFill>
+              <a:effectLst/>
+              <a:latin typeface="Arial" pitchFamily="34" charset="0"/>
+              <a:ea typeface="宋体" pitchFamily="2" charset="-122"/>
+              <a:cs typeface="宋体" pitchFamily="2" charset="-122"/>
+            </a:endParaRPr>
+          </a:p>
+        </p:txBody>
+      </p:sp>
+      <p:pic>
+        <p:nvPicPr>
+          <p:cNvPr id="1041" name="图片 1" descr="cid:image001.png@01CFE2E6.9CA63F10"/>
+          <p:cNvPicPr>
+            <a:picLocks noChangeAspect="1" noChangeArrowheads="1"/>
+          </p:cNvPicPr>
+          <p:nvPr/>
+        </p:nvPicPr>
+        <p:blipFill>
+          <a:blip r:embed="rId2" r:link="rId3"/>
+          <a:srcRect t="6122" r="28776"/>
+          <a:stretch>
+            <a:fillRect/>
+          </a:stretch>
+        </p:blipFill>
+        <p:spPr bwMode="auto">
+          <a:xfrm>
+            <a:off x="142844" y="1524003"/>
+            <a:ext cx="4714908" cy="2190749"/>
+          </a:xfrm>
+          <a:prstGeom prst="rect">
+            <a:avLst/>
+          </a:prstGeom>
+          <a:noFill/>
+        </p:spPr>
+      </p:pic>
+      <p:sp>
+        <p:nvSpPr>
+          <p:cNvPr id="28" name="Rectangle 19"/>
+          <p:cNvSpPr>
+            <a:spLocks noChangeArrowheads="1"/>
+          </p:cNvSpPr>
+          <p:nvPr/>
+        </p:nvSpPr>
+        <p:spPr bwMode="auto">
+          <a:xfrm>
+            <a:off x="0" y="1000108"/>
+            <a:ext cx="8358246" cy="523220"/>
+          </a:xfrm>
+          <a:prstGeom prst="rect">
+            <a:avLst/>
+          </a:prstGeom>
+          <a:noFill/>
+          <a:ln w="9525">
+            <a:noFill/>
+            <a:miter lim="800000"/>
+            <a:headEnd/>
+            <a:tailEnd/>
+          </a:ln>
+          <a:effectLst/>
+        </p:spPr>
+        <p:txBody>
+          <a:bodyPr vert="horz" wrap="square" lIns="91440" tIns="45720" rIns="91440" bIns="45720" numCol="1" anchor="ctr" anchorCtr="0" compatLnSpc="1">
+            <a:prstTxWarp prst="textNoShape">
+              <a:avLst/>
+            </a:prstTxWarp>
+            <a:spAutoFit/>
+          </a:bodyPr>
+          <a:lstStyle/>
+          <a:p>
+            <a:pPr marL="0" marR="0" lvl="0" indent="0" algn="l" defTabSz="914400" rtl="0" eaLnBrk="1" fontAlgn="base" latinLnBrk="0" hangingPunct="1">
+              <a:lnSpc>
+                <a:spcPct val="100000"/>
+              </a:lnSpc>
+              <a:spcBef>
+                <a:spcPct val="0"/>
+              </a:spcBef>
+              <a:spcAft>
+                <a:spcPct val="0"/>
+              </a:spcAft>
+              <a:buClrTx/>
+              <a:buSzTx/>
+              <a:buFontTx/>
+              <a:buNone/>
+              <a:tabLst/>
+            </a:pPr>
+            <a:r>
+              <a:rPr kumimoji="0" lang="en-US" altLang="zh-CN" sz="2800" b="0" i="0" u="none" strike="noStrike" cap="none" normalizeH="0" baseline="0" dirty="0" err="1" smtClean="0">
+                <a:ln>
+                  <a:noFill/>
+                </a:ln>
+                <a:solidFill>
+                  <a:srgbClr val="FF0000"/>
+                </a:solidFill>
+                <a:effectLst/>
+                <a:latin typeface="Calibri" pitchFamily="34" charset="0"/>
+                <a:ea typeface="宋体" pitchFamily="2" charset="-122"/>
+                <a:cs typeface="Calibri" pitchFamily="34" charset="0"/>
+              </a:rPr>
+              <a:t>DownLoad</a:t>
+            </a:r>
+            <a:r>
+              <a:rPr kumimoji="0" lang="en-US" altLang="zh-CN" sz="2800" b="0" i="0" u="none" strike="noStrike" cap="none" normalizeH="0" baseline="0" dirty="0" smtClean="0">
+                <a:ln>
+                  <a:noFill/>
+                </a:ln>
+                <a:solidFill>
+                  <a:srgbClr val="FF0000"/>
+                </a:solidFill>
+                <a:effectLst/>
+                <a:latin typeface="Calibri" pitchFamily="34" charset="0"/>
+                <a:ea typeface="宋体" pitchFamily="2" charset="-122"/>
+                <a:cs typeface="Calibri" pitchFamily="34" charset="0"/>
+              </a:rPr>
+              <a:t> URL: </a:t>
+            </a:r>
+            <a:r>
+              <a:rPr kumimoji="0" lang="en-US" altLang="zh-CN" sz="2800" b="0" i="0" u="none" strike="noStrike" cap="none" normalizeH="0" baseline="0" dirty="0" smtClean="0">
+                <a:ln>
+                  <a:noFill/>
+                </a:ln>
+                <a:solidFill>
+                  <a:srgbClr val="FF0000"/>
+                </a:solidFill>
+                <a:effectLst/>
+                <a:latin typeface="Calibri" pitchFamily="34" charset="0"/>
+                <a:ea typeface="宋体" pitchFamily="2" charset="-122"/>
+                <a:cs typeface="Calibri" pitchFamily="34" charset="0"/>
+                <a:hlinkClick r:id="rId4"/>
+              </a:rPr>
+              <a:t>http://142.2.47.149/pisoft/</a:t>
+            </a:r>
+            <a:r>
+              <a:rPr kumimoji="0" lang="en-US" altLang="zh-CN" sz="2800" b="0" i="0" u="none" strike="noStrike" cap="none" normalizeH="0" baseline="0" dirty="0" smtClean="0">
+                <a:ln>
+                  <a:noFill/>
+                </a:ln>
+                <a:solidFill>
+                  <a:srgbClr val="FF0000"/>
+                </a:solidFill>
+                <a:effectLst/>
+                <a:latin typeface="Calibri" pitchFamily="34" charset="0"/>
+                <a:ea typeface="宋体" pitchFamily="2" charset="-122"/>
+                <a:cs typeface="Calibri" pitchFamily="34" charset="0"/>
+              </a:rPr>
+              <a:t> </a:t>
+            </a:r>
+            <a:endParaRPr kumimoji="0" lang="en-US" altLang="zh-CN" sz="2800" b="0" i="0" u="none" strike="noStrike" cap="none" normalizeH="0" baseline="0" dirty="0" smtClean="0">
+              <a:ln>
+                <a:noFill/>
+              </a:ln>
+              <a:solidFill>
+                <a:srgbClr val="FF0000"/>
+              </a:solidFill>
+              <a:effectLst/>
+              <a:latin typeface="Arial" pitchFamily="34" charset="0"/>
+              <a:ea typeface="宋体" pitchFamily="2" charset="-122"/>
+              <a:cs typeface="宋体" pitchFamily="2" charset="-122"/>
+            </a:endParaRPr>
+          </a:p>
+        </p:txBody>
+      </p:sp>
+      <p:pic>
+        <p:nvPicPr>
+          <p:cNvPr id="1044" name="图片 5" descr="image006"/>
+          <p:cNvPicPr>
+            <a:picLocks noChangeAspect="1" noChangeArrowheads="1"/>
+          </p:cNvPicPr>
+          <p:nvPr/>
+        </p:nvPicPr>
+        <p:blipFill>
+          <a:blip r:embed="rId5"/>
+          <a:srcRect t="13044"/>
+          <a:stretch>
+            <a:fillRect/>
+          </a:stretch>
+        </p:blipFill>
+        <p:spPr bwMode="auto">
+          <a:xfrm>
+            <a:off x="128600" y="3714752"/>
+            <a:ext cx="6229350" cy="2857497"/>
+          </a:xfrm>
+          <a:prstGeom prst="rect">
+            <a:avLst/>
+          </a:prstGeom>
+          <a:noFill/>
+          <a:ln w="9525">
+            <a:noFill/>
+            <a:miter lim="800000"/>
+            <a:headEnd/>
+            <a:tailEnd/>
+          </a:ln>
+        </p:spPr>
+      </p:pic>
+    </p:spTree>
+  </p:cSld>
+  <p:clrMapOvr>
+    <a:masterClrMapping/>
+  </p:clrMapOvr>
+</p:sld>
+</file>
+
+<file path=ppt/slides/slide4.xml><?xml version="1.0" encoding="utf-8"?>
+<p:sld xmlns:a="http://schemas.openxmlformats.org/drawingml/2006/main" xmlns:r="http://schemas.openxmlformats.org/officeDocument/2006/relationships" xmlns:p="http://schemas.openxmlformats.org/presentationml/2006/main">
+  <p:cSld>
+    <p:spTree>
+      <p:nvGrpSpPr>
+        <p:cNvPr id="1" name=""/>
+        <p:cNvGrpSpPr/>
+        <p:nvPr/>
+      </p:nvGrpSpPr>
+      <p:grpSpPr>
+        <a:xfrm>
+          <a:off x="0" y="0"/>
+          <a:ext cx="0" cy="0"/>
+          <a:chOff x="0" y="0"/>
+          <a:chExt cx="0" cy="0"/>
+        </a:xfrm>
+      </p:grpSpPr>
+      <p:sp>
+        <p:nvSpPr>
+          <p:cNvPr id="3" name="日期占位符 2"/>
+          <p:cNvSpPr>
+            <a:spLocks noGrp="1"/>
+          </p:cNvSpPr>
+          <p:nvPr>
+            <p:ph type="dt" sz="half" idx="10"/>
+          </p:nvPr>
+        </p:nvSpPr>
+        <p:spPr/>
+        <p:txBody>
+          <a:bodyPr/>
+          <a:lstStyle/>
+          <a:p>
+            <a:fld id="{BCDD0958-C144-4E3D-A8F5-AAEDA8C9D550}" type="datetime1">
+              <a:rPr lang="zh-TW" altLang="en-US" smtClean="0"/>
+              <a:pPr/>
+              <a:t>2014/10/10</a:t>
+            </a:fld>
+            <a:endParaRPr lang="zh-CN" altLang="en-US"/>
+          </a:p>
+        </p:txBody>
+      </p:sp>
+      <p:sp>
+        <p:nvSpPr>
+          <p:cNvPr id="4" name="灯片编号占位符 3"/>
+          <p:cNvSpPr>
+            <a:spLocks noGrp="1"/>
+          </p:cNvSpPr>
+          <p:nvPr>
+            <p:ph type="sldNum" sz="quarter" idx="12"/>
+          </p:nvPr>
+        </p:nvSpPr>
+        <p:spPr/>
+        <p:txBody>
+          <a:bodyPr/>
+          <a:lstStyle/>
+          <a:p>
+            <a:fld id="{28874C86-8C61-448A-906E-93CD94C69BE8}" type="slidenum">
+              <a:rPr lang="zh-CN" altLang="en-US" smtClean="0"/>
+              <a:pPr/>
+              <a:t>4</a:t>
+            </a:fld>
+            <a:endParaRPr lang="zh-CN" altLang="en-US" dirty="0"/>
+          </a:p>
+        </p:txBody>
+      </p:sp>
+      <p:sp>
+        <p:nvSpPr>
+          <p:cNvPr id="5" name="标题 4"/>
+          <p:cNvSpPr>
+            <a:spLocks noGrp="1"/>
+          </p:cNvSpPr>
+          <p:nvPr>
+            <p:ph type="title"/>
+          </p:nvPr>
+        </p:nvSpPr>
+        <p:spPr/>
+        <p:txBody>
+          <a:bodyPr/>
+          <a:lstStyle/>
+          <a:p>
+            <a:r>
+              <a:rPr lang="en-US" altLang="zh-CN" dirty="0" smtClean="0"/>
+              <a:t>Download </a:t>
+            </a:r>
+            <a:r>
+              <a:rPr lang="en-US" altLang="zh-CN" dirty="0" smtClean="0"/>
+              <a:t>IDR Soft</a:t>
+            </a:r>
+            <a:endParaRPr lang="zh-CN" altLang="en-US" dirty="0"/>
+          </a:p>
+        </p:txBody>
+      </p:sp>
+      <p:pic>
+        <p:nvPicPr>
+          <p:cNvPr id="37890" name="图片 3" descr="image007"/>
+          <p:cNvPicPr>
+            <a:picLocks noChangeAspect="1" noChangeArrowheads="1"/>
+          </p:cNvPicPr>
+          <p:nvPr/>
+        </p:nvPicPr>
+        <p:blipFill>
+          <a:blip r:embed="rId2"/>
+          <a:srcRect/>
+          <a:stretch>
+            <a:fillRect/>
+          </a:stretch>
+        </p:blipFill>
+        <p:spPr bwMode="auto">
+          <a:xfrm>
+            <a:off x="285720" y="1357298"/>
+            <a:ext cx="8572560" cy="2247900"/>
+          </a:xfrm>
+          <a:prstGeom prst="rect">
+            <a:avLst/>
+          </a:prstGeom>
+          <a:noFill/>
+          <a:ln w="9525">
+            <a:noFill/>
+            <a:miter lim="800000"/>
+            <a:headEnd/>
+            <a:tailEnd/>
+          </a:ln>
+        </p:spPr>
+      </p:pic>
+      <p:pic>
+        <p:nvPicPr>
+          <p:cNvPr id="37891" name="图片 4" descr="image005"/>
+          <p:cNvPicPr>
+            <a:picLocks noChangeAspect="1" noChangeArrowheads="1"/>
+          </p:cNvPicPr>
+          <p:nvPr/>
+        </p:nvPicPr>
+        <p:blipFill>
+          <a:blip r:embed="rId3"/>
+          <a:srcRect/>
+          <a:stretch>
+            <a:fillRect/>
+          </a:stretch>
+        </p:blipFill>
+        <p:spPr bwMode="auto">
+          <a:xfrm>
+            <a:off x="285720" y="3429000"/>
+            <a:ext cx="8572560" cy="2867025"/>
+          </a:xfrm>
+          <a:prstGeom prst="rect">
+            <a:avLst/>
+          </a:prstGeom>
+          <a:noFill/>
+          <a:ln w="9525">
+            <a:noFill/>
+            <a:miter lim="800000"/>
+            <a:headEnd/>
+            <a:tailEnd/>
+          </a:ln>
+        </p:spPr>
+      </p:pic>
+    </p:spTree>
+  </p:cSld>
+  <p:clrMapOvr>
+    <a:masterClrMapping/>
+  </p:clrMapOvr>
+</p:sld>
+</file>
+
+<file path=ppt/slides/slide5.xml><?xml version="1.0" encoding="utf-8"?>
 <p:sld xmlns:a="http://schemas.openxmlformats.org/drawingml/2006/main" xmlns:r="http://schemas.openxmlformats.org/officeDocument/2006/relationships" xmlns:p="http://schemas.openxmlformats.org/presentationml/2006/main">
   <p:cSld>
     <p:spTree>
@@ -10147,7 +10893,7 @@
             <a:fld id="{BCDD0958-C144-4E3D-A8F5-AAEDA8C9D550}" type="datetime1">
               <a:rPr lang="zh-TW" altLang="en-US" smtClean="0"/>
               <a:pPr/>
-              <a:t>2014/10/9</a:t>
+              <a:t>2014/10/10</a:t>
             </a:fld>
             <a:endParaRPr lang="zh-CN" altLang="en-US"/>
           </a:p>
@@ -10171,7 +10917,7 @@
             <a:fld id="{28874C86-8C61-448A-906E-93CD94C69BE8}" type="slidenum">
               <a:rPr lang="zh-CN" altLang="en-US" smtClean="0"/>
               <a:pPr/>
-              <a:t>3</a:t>
+              <a:t>5</a:t>
             </a:fld>
             <a:endParaRPr lang="zh-CN" altLang="en-US" dirty="0"/>
           </a:p>
@@ -10206,258 +10952,6 @@
               <a:t>(IDR System.exe)</a:t>
             </a:r>
             <a:endParaRPr lang="zh-CN" altLang="en-US" sz="1800" dirty="0"/>
-          </a:p>
-        </p:txBody>
-      </p:sp>
-    </p:spTree>
-  </p:cSld>
-  <p:clrMapOvr>
-    <a:masterClrMapping/>
-  </p:clrMapOvr>
-  <p:timing>
-    <p:tnLst>
-      <p:par>
-        <p:cTn id="1" dur="indefinite" restart="never" nodeType="tmRoot"/>
-      </p:par>
-    </p:tnLst>
-  </p:timing>
-</p:sld>
-</file>
-
-<file path=ppt/slides/slide4.xml><?xml version="1.0" encoding="utf-8"?>
-<p:sld xmlns:a="http://schemas.openxmlformats.org/drawingml/2006/main" xmlns:r="http://schemas.openxmlformats.org/officeDocument/2006/relationships" xmlns:p="http://schemas.openxmlformats.org/presentationml/2006/main">
-  <p:cSld>
-    <p:spTree>
-      <p:nvGrpSpPr>
-        <p:cNvPr id="1" name=""/>
-        <p:cNvGrpSpPr/>
-        <p:nvPr/>
-      </p:nvGrpSpPr>
-      <p:grpSpPr>
-        <a:xfrm>
-          <a:off x="0" y="0"/>
-          <a:ext cx="0" cy="0"/>
-          <a:chOff x="0" y="0"/>
-          <a:chExt cx="0" cy="0"/>
-        </a:xfrm>
-      </p:grpSpPr>
-      <p:sp>
-        <p:nvSpPr>
-          <p:cNvPr id="3" name="日期占位符 2"/>
-          <p:cNvSpPr>
-            <a:spLocks noGrp="1"/>
-          </p:cNvSpPr>
-          <p:nvPr>
-            <p:ph type="dt" sz="half" idx="10"/>
-          </p:nvPr>
-        </p:nvSpPr>
-        <p:spPr/>
-        <p:txBody>
-          <a:bodyPr/>
-          <a:lstStyle/>
-          <a:p>
-            <a:fld id="{BCDD0958-C144-4E3D-A8F5-AAEDA8C9D550}" type="datetime1">
-              <a:rPr lang="zh-TW" altLang="en-US" smtClean="0"/>
-              <a:pPr/>
-              <a:t>2014/10/9</a:t>
-            </a:fld>
-            <a:endParaRPr lang="zh-CN" altLang="en-US"/>
-          </a:p>
-        </p:txBody>
-      </p:sp>
-      <p:sp>
-        <p:nvSpPr>
-          <p:cNvPr id="4" name="灯片编号占位符 3"/>
-          <p:cNvSpPr>
-            <a:spLocks noGrp="1"/>
-          </p:cNvSpPr>
-          <p:nvPr>
-            <p:ph type="sldNum" sz="quarter" idx="12"/>
-          </p:nvPr>
-        </p:nvSpPr>
-        <p:spPr/>
-        <p:txBody>
-          <a:bodyPr/>
-          <a:lstStyle/>
-          <a:p>
-            <a:fld id="{28874C86-8C61-448A-906E-93CD94C69BE8}" type="slidenum">
-              <a:rPr lang="zh-CN" altLang="en-US" smtClean="0"/>
-              <a:pPr/>
-              <a:t>4</a:t>
-            </a:fld>
-            <a:endParaRPr lang="zh-CN" altLang="en-US" dirty="0"/>
-          </a:p>
-        </p:txBody>
-      </p:sp>
-      <p:sp>
-        <p:nvSpPr>
-          <p:cNvPr id="5" name="标题 4"/>
-          <p:cNvSpPr>
-            <a:spLocks noGrp="1"/>
-          </p:cNvSpPr>
-          <p:nvPr>
-            <p:ph type="title"/>
-          </p:nvPr>
-        </p:nvSpPr>
-        <p:spPr/>
-        <p:txBody>
-          <a:bodyPr/>
-          <a:lstStyle/>
-          <a:p>
-            <a:r>
-              <a:rPr lang="en-US" altLang="zh-CN" dirty="0" smtClean="0"/>
-              <a:t>Main View</a:t>
-            </a:r>
-            <a:endParaRPr lang="zh-CN" altLang="en-US" dirty="0"/>
-          </a:p>
-        </p:txBody>
-      </p:sp>
-      <p:pic>
-        <p:nvPicPr>
-          <p:cNvPr id="8" name="内容占位符 7" descr="02home.png"/>
-          <p:cNvPicPr>
-            <a:picLocks noGrp="1" noChangeAspect="1"/>
-          </p:cNvPicPr>
-          <p:nvPr>
-            <p:ph idx="1"/>
-          </p:nvPr>
-        </p:nvPicPr>
-        <p:blipFill>
-          <a:blip r:embed="rId2"/>
-          <a:stretch>
-            <a:fillRect/>
-          </a:stretch>
-        </p:blipFill>
-        <p:spPr>
-          <a:xfrm>
-            <a:off x="1338480" y="1600200"/>
-            <a:ext cx="6097152" cy="4525963"/>
-          </a:xfrm>
-        </p:spPr>
-      </p:pic>
-    </p:spTree>
-  </p:cSld>
-  <p:clrMapOvr>
-    <a:masterClrMapping/>
-  </p:clrMapOvr>
-  <p:timing>
-    <p:tnLst>
-      <p:par>
-        <p:cTn id="1" dur="indefinite" restart="never" nodeType="tmRoot"/>
-      </p:par>
-    </p:tnLst>
-  </p:timing>
-</p:sld>
-</file>
-
-<file path=ppt/slides/slide5.xml><?xml version="1.0" encoding="utf-8"?>
-<p:sld xmlns:a="http://schemas.openxmlformats.org/drawingml/2006/main" xmlns:r="http://schemas.openxmlformats.org/officeDocument/2006/relationships" xmlns:p="http://schemas.openxmlformats.org/presentationml/2006/main">
-  <p:cSld>
-    <p:spTree>
-      <p:nvGrpSpPr>
-        <p:cNvPr id="1" name=""/>
-        <p:cNvGrpSpPr/>
-        <p:nvPr/>
-      </p:nvGrpSpPr>
-      <p:grpSpPr>
-        <a:xfrm>
-          <a:off x="0" y="0"/>
-          <a:ext cx="0" cy="0"/>
-          <a:chOff x="0" y="0"/>
-          <a:chExt cx="0" cy="0"/>
-        </a:xfrm>
-      </p:grpSpPr>
-      <p:graphicFrame>
-        <p:nvGraphicFramePr>
-          <p:cNvPr id="6" name="内容占位符 5"/>
-          <p:cNvGraphicFramePr>
-            <a:graphicFrameLocks noGrp="1"/>
-          </p:cNvGraphicFramePr>
-          <p:nvPr>
-            <p:ph idx="1"/>
-          </p:nvPr>
-        </p:nvGraphicFramePr>
-        <p:xfrm>
-          <a:off x="457200" y="1600200"/>
-          <a:ext cx="7859713" cy="4525963"/>
-        </p:xfrm>
-        <a:graphic>
-          <a:graphicData uri="http://schemas.openxmlformats.org/drawingml/2006/diagram">
-            <dgm:relIds xmlns:dgm="http://schemas.openxmlformats.org/drawingml/2006/diagram" xmlns:r="http://schemas.openxmlformats.org/officeDocument/2006/relationships" r:dm="rId2" r:lo="rId3" r:qs="rId4" r:cs="rId5"/>
-          </a:graphicData>
-        </a:graphic>
-      </p:graphicFrame>
-      <p:sp>
-        <p:nvSpPr>
-          <p:cNvPr id="3" name="日期占位符 2"/>
-          <p:cNvSpPr>
-            <a:spLocks noGrp="1"/>
-          </p:cNvSpPr>
-          <p:nvPr>
-            <p:ph type="dt" sz="half" idx="10"/>
-          </p:nvPr>
-        </p:nvSpPr>
-        <p:spPr/>
-        <p:txBody>
-          <a:bodyPr/>
-          <a:lstStyle/>
-          <a:p>
-            <a:fld id="{BCDD0958-C144-4E3D-A8F5-AAEDA8C9D550}" type="datetime1">
-              <a:rPr lang="zh-TW" altLang="en-US" smtClean="0"/>
-              <a:pPr/>
-              <a:t>2014/10/9</a:t>
-            </a:fld>
-            <a:endParaRPr lang="zh-CN" altLang="en-US"/>
-          </a:p>
-        </p:txBody>
-      </p:sp>
-      <p:sp>
-        <p:nvSpPr>
-          <p:cNvPr id="4" name="灯片编号占位符 3"/>
-          <p:cNvSpPr>
-            <a:spLocks noGrp="1"/>
-          </p:cNvSpPr>
-          <p:nvPr>
-            <p:ph type="sldNum" sz="quarter" idx="12"/>
-          </p:nvPr>
-        </p:nvSpPr>
-        <p:spPr/>
-        <p:txBody>
-          <a:bodyPr/>
-          <a:lstStyle/>
-          <a:p>
-            <a:fld id="{28874C86-8C61-448A-906E-93CD94C69BE8}" type="slidenum">
-              <a:rPr lang="zh-CN" altLang="en-US" smtClean="0"/>
-              <a:pPr/>
-              <a:t>5</a:t>
-            </a:fld>
-            <a:endParaRPr lang="zh-CN" altLang="en-US" dirty="0"/>
-          </a:p>
-        </p:txBody>
-      </p:sp>
-      <p:sp>
-        <p:nvSpPr>
-          <p:cNvPr id="5" name="标题 4"/>
-          <p:cNvSpPr>
-            <a:spLocks noGrp="1"/>
-          </p:cNvSpPr>
-          <p:nvPr>
-            <p:ph type="title"/>
-          </p:nvPr>
-        </p:nvSpPr>
-        <p:spPr/>
-        <p:txBody>
-          <a:bodyPr>
-            <a:normAutofit/>
-          </a:bodyPr>
-          <a:lstStyle/>
-          <a:p>
-            <a:pPr lvl="0"/>
-            <a:r>
-              <a:rPr lang="en-US" altLang="zh-CN" dirty="0" smtClean="0"/>
-              <a:t>Packing List Maintain</a:t>
-            </a:r>
-            <a:endParaRPr lang="zh-CN" altLang="en-US" dirty="0"/>
           </a:p>
         </p:txBody>
       </p:sp>
@@ -10493,9 +10987,80 @@
           <a:chExt cx="0" cy="0"/>
         </a:xfrm>
       </p:grpSpPr>
+      <p:sp>
+        <p:nvSpPr>
+          <p:cNvPr id="3" name="日期占位符 2"/>
+          <p:cNvSpPr>
+            <a:spLocks noGrp="1"/>
+          </p:cNvSpPr>
+          <p:nvPr>
+            <p:ph type="dt" sz="half" idx="10"/>
+          </p:nvPr>
+        </p:nvSpPr>
+        <p:spPr/>
+        <p:txBody>
+          <a:bodyPr/>
+          <a:lstStyle/>
+          <a:p>
+            <a:fld id="{BCDD0958-C144-4E3D-A8F5-AAEDA8C9D550}" type="datetime1">
+              <a:rPr lang="zh-TW" altLang="en-US" smtClean="0"/>
+              <a:pPr/>
+              <a:t>2014/10/10</a:t>
+            </a:fld>
+            <a:endParaRPr lang="zh-CN" altLang="en-US"/>
+          </a:p>
+        </p:txBody>
+      </p:sp>
+      <p:sp>
+        <p:nvSpPr>
+          <p:cNvPr id="4" name="灯片编号占位符 3"/>
+          <p:cNvSpPr>
+            <a:spLocks noGrp="1"/>
+          </p:cNvSpPr>
+          <p:nvPr>
+            <p:ph type="sldNum" sz="quarter" idx="12"/>
+          </p:nvPr>
+        </p:nvSpPr>
+        <p:spPr/>
+        <p:txBody>
+          <a:bodyPr/>
+          <a:lstStyle/>
+          <a:p>
+            <a:fld id="{28874C86-8C61-448A-906E-93CD94C69BE8}" type="slidenum">
+              <a:rPr lang="zh-CN" altLang="en-US" smtClean="0"/>
+              <a:pPr/>
+              <a:t>6</a:t>
+            </a:fld>
+            <a:endParaRPr lang="zh-CN" altLang="en-US" dirty="0"/>
+          </a:p>
+        </p:txBody>
+      </p:sp>
+      <p:sp>
+        <p:nvSpPr>
+          <p:cNvPr id="5" name="标题 4"/>
+          <p:cNvSpPr>
+            <a:spLocks noGrp="1"/>
+          </p:cNvSpPr>
+          <p:nvPr>
+            <p:ph type="title"/>
+          </p:nvPr>
+        </p:nvSpPr>
+        <p:spPr/>
+        <p:txBody>
+          <a:bodyPr/>
+          <a:lstStyle/>
+          <a:p>
+            <a:r>
+              <a:rPr lang="en-US" altLang="zh-CN" dirty="0" smtClean="0"/>
+              <a:t>Main View</a:t>
+            </a:r>
+            <a:endParaRPr lang="zh-CN" altLang="en-US" dirty="0"/>
+          </a:p>
+        </p:txBody>
+      </p:sp>
       <p:pic>
         <p:nvPicPr>
-          <p:cNvPr id="6" name="内容占位符 5" descr="1.1UploadEpackingList.png"/>
+          <p:cNvPr id="8" name="内容占位符 7" descr="02home.png"/>
           <p:cNvPicPr>
             <a:picLocks noGrp="1" noChangeAspect="1"/>
           </p:cNvPicPr>
@@ -10511,85 +11076,11 @@
         </p:blipFill>
         <p:spPr>
           <a:xfrm>
-            <a:off x="714348" y="1600200"/>
-            <a:ext cx="7207147" cy="4525963"/>
+            <a:off x="1338480" y="1600200"/>
+            <a:ext cx="6097152" cy="4525963"/>
           </a:xfrm>
         </p:spPr>
       </p:pic>
-      <p:sp>
-        <p:nvSpPr>
-          <p:cNvPr id="3" name="日期占位符 2"/>
-          <p:cNvSpPr>
-            <a:spLocks noGrp="1"/>
-          </p:cNvSpPr>
-          <p:nvPr>
-            <p:ph type="dt" sz="half" idx="10"/>
-          </p:nvPr>
-        </p:nvSpPr>
-        <p:spPr/>
-        <p:txBody>
-          <a:bodyPr/>
-          <a:lstStyle/>
-          <a:p>
-            <a:fld id="{BCDD0958-C144-4E3D-A8F5-AAEDA8C9D550}" type="datetime1">
-              <a:rPr lang="zh-TW" altLang="en-US" smtClean="0"/>
-              <a:pPr/>
-              <a:t>2014/10/9</a:t>
-            </a:fld>
-            <a:endParaRPr lang="zh-CN" altLang="en-US"/>
-          </a:p>
-        </p:txBody>
-      </p:sp>
-      <p:sp>
-        <p:nvSpPr>
-          <p:cNvPr id="4" name="灯片编号占位符 3"/>
-          <p:cNvSpPr>
-            <a:spLocks noGrp="1"/>
-          </p:cNvSpPr>
-          <p:nvPr>
-            <p:ph type="sldNum" sz="quarter" idx="12"/>
-          </p:nvPr>
-        </p:nvSpPr>
-        <p:spPr/>
-        <p:txBody>
-          <a:bodyPr/>
-          <a:lstStyle/>
-          <a:p>
-            <a:fld id="{28874C86-8C61-448A-906E-93CD94C69BE8}" type="slidenum">
-              <a:rPr lang="zh-CN" altLang="en-US" smtClean="0"/>
-              <a:pPr/>
-              <a:t>6</a:t>
-            </a:fld>
-            <a:endParaRPr lang="zh-CN" altLang="en-US" dirty="0"/>
-          </a:p>
-        </p:txBody>
-      </p:sp>
-      <p:sp>
-        <p:nvSpPr>
-          <p:cNvPr id="5" name="标题 4"/>
-          <p:cNvSpPr>
-            <a:spLocks noGrp="1"/>
-          </p:cNvSpPr>
-          <p:nvPr>
-            <p:ph type="title"/>
-          </p:nvPr>
-        </p:nvSpPr>
-        <p:spPr/>
-        <p:txBody>
-          <a:bodyPr>
-            <a:normAutofit/>
-          </a:bodyPr>
-          <a:lstStyle/>
-          <a:p>
-            <a:pPr lvl="0"/>
-            <a:r>
-              <a:rPr lang="en-US" altLang="zh-CN" dirty="0" smtClean="0"/>
-              <a:t>1. Upload e-Packing List (Excel)</a:t>
-            </a:r>
-            <a:endParaRPr lang="zh-CN" altLang="en-US" dirty="0"/>
-          </a:p>
-        </p:txBody>
-      </p:sp>
     </p:spTree>
   </p:cSld>
   <p:clrMapOvr>
@@ -10622,29 +11113,26 @@
           <a:chExt cx="0" cy="0"/>
         </a:xfrm>
       </p:grpSpPr>
-      <p:pic>
-        <p:nvPicPr>
-          <p:cNvPr id="6" name="内容占位符 5" descr="1.1.1.png"/>
-          <p:cNvPicPr>
-            <a:picLocks noGrp="1" noChangeAspect="1"/>
-          </p:cNvPicPr>
+      <p:graphicFrame>
+        <p:nvGraphicFramePr>
+          <p:cNvPr id="6" name="内容占位符 5"/>
+          <p:cNvGraphicFramePr>
+            <a:graphicFrameLocks noGrp="1"/>
+          </p:cNvGraphicFramePr>
           <p:nvPr>
             <p:ph idx="1"/>
           </p:nvPr>
-        </p:nvPicPr>
-        <p:blipFill>
-          <a:blip r:embed="rId2"/>
-          <a:stretch>
-            <a:fillRect/>
-          </a:stretch>
-        </p:blipFill>
-        <p:spPr>
-          <a:xfrm>
-            <a:off x="1326755" y="1600200"/>
-            <a:ext cx="6120603" cy="4525963"/>
-          </a:xfrm>
-        </p:spPr>
-      </p:pic>
+        </p:nvGraphicFramePr>
+        <p:xfrm>
+          <a:off x="457200" y="1600200"/>
+          <a:ext cx="7859713" cy="4525963"/>
+        </p:xfrm>
+        <a:graphic>
+          <a:graphicData uri="http://schemas.openxmlformats.org/drawingml/2006/diagram">
+            <dgm:relIds xmlns:dgm="http://schemas.openxmlformats.org/drawingml/2006/diagram" xmlns:r="http://schemas.openxmlformats.org/officeDocument/2006/relationships" r:dm="rId2" r:lo="rId3" r:qs="rId4" r:cs="rId5"/>
+          </a:graphicData>
+        </a:graphic>
+      </p:graphicFrame>
       <p:sp>
         <p:nvSpPr>
           <p:cNvPr id="3" name="日期占位符 2"/>
@@ -10663,7 +11151,7 @@
             <a:fld id="{BCDD0958-C144-4E3D-A8F5-AAEDA8C9D550}" type="datetime1">
               <a:rPr lang="zh-TW" altLang="en-US" smtClean="0"/>
               <a:pPr/>
-              <a:t>2014/10/9</a:t>
+              <a:t>2014/10/10</a:t>
             </a:fld>
             <a:endParaRPr lang="zh-CN" altLang="en-US"/>
           </a:p>
@@ -10713,7 +11201,7 @@
             <a:pPr lvl="0"/>
             <a:r>
               <a:rPr lang="en-US" altLang="zh-CN" dirty="0" smtClean="0"/>
-              <a:t>1.1 Upload e-Packing List (Excel)</a:t>
+              <a:t>Packing List Maintain</a:t>
             </a:r>
             <a:endParaRPr lang="zh-CN" altLang="en-US" dirty="0"/>
           </a:p>
@@ -10753,7 +11241,7 @@
       </p:grpSpPr>
       <p:pic>
         <p:nvPicPr>
-          <p:cNvPr id="6" name="内容占位符 5" descr="1.2UploadEpackingList.png"/>
+          <p:cNvPr id="6" name="内容占位符 5" descr="1.1UploadEpackingList.png"/>
           <p:cNvPicPr>
             <a:picLocks noGrp="1" noChangeAspect="1"/>
           </p:cNvPicPr>
@@ -10769,8 +11257,8 @@
         </p:blipFill>
         <p:spPr>
           <a:xfrm>
-            <a:off x="457200" y="1703399"/>
-            <a:ext cx="7859713" cy="4319564"/>
+            <a:off x="714348" y="1600200"/>
+            <a:ext cx="7207147" cy="4525963"/>
           </a:xfrm>
         </p:spPr>
       </p:pic>
@@ -10792,7 +11280,7 @@
             <a:fld id="{BCDD0958-C144-4E3D-A8F5-AAEDA8C9D550}" type="datetime1">
               <a:rPr lang="zh-TW" altLang="en-US" smtClean="0"/>
               <a:pPr/>
-              <a:t>2014/10/9</a:t>
+              <a:t>2014/10/10</a:t>
             </a:fld>
             <a:endParaRPr lang="zh-CN" altLang="en-US"/>
           </a:p>
@@ -10841,8 +11329,8 @@
           <a:p>
             <a:pPr lvl="0"/>
             <a:r>
-              <a:rPr lang="en-US" altLang="en-US" dirty="0" smtClean="0"/>
-              <a:t>1.2. Add New(Edit Batch ID)</a:t>
+              <a:rPr lang="en-US" altLang="zh-CN" dirty="0" smtClean="0"/>
+              <a:t>1. Upload e-Packing List (Excel)</a:t>
             </a:r>
             <a:endParaRPr lang="zh-CN" altLang="en-US" dirty="0"/>
           </a:p>
@@ -10880,90 +11368,9 @@
           <a:chExt cx="0" cy="0"/>
         </a:xfrm>
       </p:grpSpPr>
-      <p:sp>
-        <p:nvSpPr>
-          <p:cNvPr id="3" name="日期占位符 2"/>
-          <p:cNvSpPr>
-            <a:spLocks noGrp="1"/>
-          </p:cNvSpPr>
-          <p:nvPr>
-            <p:ph type="dt" sz="half" idx="10"/>
-          </p:nvPr>
-        </p:nvSpPr>
-        <p:spPr/>
-        <p:txBody>
-          <a:bodyPr/>
-          <a:lstStyle/>
-          <a:p>
-            <a:fld id="{BCDD0958-C144-4E3D-A8F5-AAEDA8C9D550}" type="datetime1">
-              <a:rPr lang="zh-TW" altLang="en-US" smtClean="0"/>
-              <a:pPr/>
-              <a:t>2014/10/9</a:t>
-            </a:fld>
-            <a:endParaRPr lang="zh-CN" altLang="en-US"/>
-          </a:p>
-        </p:txBody>
-      </p:sp>
-      <p:sp>
-        <p:nvSpPr>
-          <p:cNvPr id="4" name="灯片编号占位符 3"/>
-          <p:cNvSpPr>
-            <a:spLocks noGrp="1"/>
-          </p:cNvSpPr>
-          <p:nvPr>
-            <p:ph type="sldNum" sz="quarter" idx="12"/>
-          </p:nvPr>
-        </p:nvSpPr>
-        <p:spPr/>
-        <p:txBody>
-          <a:bodyPr/>
-          <a:lstStyle/>
-          <a:p>
-            <a:fld id="{28874C86-8C61-448A-906E-93CD94C69BE8}" type="slidenum">
-              <a:rPr lang="zh-CN" altLang="en-US" smtClean="0"/>
-              <a:pPr/>
-              <a:t>9</a:t>
-            </a:fld>
-            <a:endParaRPr lang="zh-CN" altLang="en-US" dirty="0"/>
-          </a:p>
-        </p:txBody>
-      </p:sp>
-      <p:sp>
-        <p:nvSpPr>
-          <p:cNvPr id="5" name="标题 4"/>
-          <p:cNvSpPr>
-            <a:spLocks noGrp="1"/>
-          </p:cNvSpPr>
-          <p:nvPr>
-            <p:ph type="title"/>
-          </p:nvPr>
-        </p:nvSpPr>
-        <p:spPr/>
-        <p:txBody>
-          <a:bodyPr>
-            <a:normAutofit/>
-          </a:bodyPr>
-          <a:lstStyle/>
-          <a:p>
-            <a:r>
-              <a:rPr lang="en-US" altLang="en-US" dirty="0" smtClean="0"/>
-              <a:t>1.2.1 </a:t>
-            </a:r>
-            <a:r>
-              <a:rPr lang="en-US" altLang="zh-CN" dirty="0" smtClean="0"/>
-              <a:t>Add a </a:t>
-            </a:r>
-            <a:r>
-              <a:rPr lang="en-US" altLang="zh-CN" smtClean="0"/>
-              <a:t>New Batch ID</a:t>
-            </a:r>
-            <a:endParaRPr lang="zh-CN" altLang="en-US" dirty="0"/>
-          </a:p>
-        </p:txBody>
-      </p:sp>
       <p:pic>
         <p:nvPicPr>
-          <p:cNvPr id="8" name="内容占位符 7" descr="1.2.1UploadEpackingList.png"/>
+          <p:cNvPr id="6" name="内容占位符 5" descr="1.1.1.png"/>
           <p:cNvPicPr>
             <a:picLocks noGrp="1" noChangeAspect="1"/>
           </p:cNvPicPr>
@@ -10979,11 +11386,85 @@
         </p:blipFill>
         <p:spPr>
           <a:xfrm>
-            <a:off x="1206741" y="1600200"/>
-            <a:ext cx="6360631" cy="4525963"/>
+            <a:off x="1326755" y="1600200"/>
+            <a:ext cx="6120603" cy="4525963"/>
           </a:xfrm>
         </p:spPr>
       </p:pic>
+      <p:sp>
+        <p:nvSpPr>
+          <p:cNvPr id="3" name="日期占位符 2"/>
+          <p:cNvSpPr>
+            <a:spLocks noGrp="1"/>
+          </p:cNvSpPr>
+          <p:nvPr>
+            <p:ph type="dt" sz="half" idx="10"/>
+          </p:nvPr>
+        </p:nvSpPr>
+        <p:spPr/>
+        <p:txBody>
+          <a:bodyPr/>
+          <a:lstStyle/>
+          <a:p>
+            <a:fld id="{BCDD0958-C144-4E3D-A8F5-AAEDA8C9D550}" type="datetime1">
+              <a:rPr lang="zh-TW" altLang="en-US" smtClean="0"/>
+              <a:pPr/>
+              <a:t>2014/10/10</a:t>
+            </a:fld>
+            <a:endParaRPr lang="zh-CN" altLang="en-US"/>
+          </a:p>
+        </p:txBody>
+      </p:sp>
+      <p:sp>
+        <p:nvSpPr>
+          <p:cNvPr id="4" name="灯片编号占位符 3"/>
+          <p:cNvSpPr>
+            <a:spLocks noGrp="1"/>
+          </p:cNvSpPr>
+          <p:nvPr>
+            <p:ph type="sldNum" sz="quarter" idx="12"/>
+          </p:nvPr>
+        </p:nvSpPr>
+        <p:spPr/>
+        <p:txBody>
+          <a:bodyPr/>
+          <a:lstStyle/>
+          <a:p>
+            <a:fld id="{28874C86-8C61-448A-906E-93CD94C69BE8}" type="slidenum">
+              <a:rPr lang="zh-CN" altLang="en-US" smtClean="0"/>
+              <a:pPr/>
+              <a:t>9</a:t>
+            </a:fld>
+            <a:endParaRPr lang="zh-CN" altLang="en-US" dirty="0"/>
+          </a:p>
+        </p:txBody>
+      </p:sp>
+      <p:sp>
+        <p:nvSpPr>
+          <p:cNvPr id="5" name="标题 4"/>
+          <p:cNvSpPr>
+            <a:spLocks noGrp="1"/>
+          </p:cNvSpPr>
+          <p:nvPr>
+            <p:ph type="title"/>
+          </p:nvPr>
+        </p:nvSpPr>
+        <p:spPr/>
+        <p:txBody>
+          <a:bodyPr>
+            <a:normAutofit/>
+          </a:bodyPr>
+          <a:lstStyle/>
+          <a:p>
+            <a:pPr lvl="0"/>
+            <a:r>
+              <a:rPr lang="en-US" altLang="zh-CN" dirty="0" smtClean="0"/>
+              <a:t>1.1 Upload e-Packing List (Excel)</a:t>
+            </a:r>
+            <a:endParaRPr lang="zh-CN" altLang="en-US" dirty="0"/>
+          </a:p>
+        </p:txBody>
+      </p:sp>
     </p:spTree>
   </p:cSld>
   <p:clrMapOvr>

</xml_diff>

<commit_message>
update code from 2.0
</commit_message>
<xml_diff>
--- a/FrmPIE/0PackingInformationEntry.pptx
+++ b/FrmPIE/0PackingInformationEntry.pptx
@@ -5,30 +5,32 @@
     <p:sldMasterId id="2147483648" r:id="rId1"/>
   </p:sldMasterIdLst>
   <p:notesMasterIdLst>
-    <p:notesMasterId r:id="rId20"/>
+    <p:notesMasterId r:id="rId22"/>
   </p:notesMasterIdLst>
   <p:handoutMasterIdLst>
-    <p:handoutMasterId r:id="rId21"/>
+    <p:handoutMasterId r:id="rId23"/>
   </p:handoutMasterIdLst>
   <p:sldIdLst>
     <p:sldId id="256" r:id="rId2"/>
     <p:sldId id="341" r:id="rId3"/>
-    <p:sldId id="343" r:id="rId4"/>
-    <p:sldId id="344" r:id="rId5"/>
-    <p:sldId id="342" r:id="rId6"/>
-    <p:sldId id="345" r:id="rId7"/>
-    <p:sldId id="346" r:id="rId8"/>
-    <p:sldId id="347" r:id="rId9"/>
-    <p:sldId id="348" r:id="rId10"/>
-    <p:sldId id="349" r:id="rId11"/>
-    <p:sldId id="351" r:id="rId12"/>
-    <p:sldId id="350" r:id="rId13"/>
-    <p:sldId id="356" r:id="rId14"/>
-    <p:sldId id="352" r:id="rId15"/>
-    <p:sldId id="353" r:id="rId16"/>
-    <p:sldId id="354" r:id="rId17"/>
-    <p:sldId id="355" r:id="rId18"/>
-    <p:sldId id="340" r:id="rId19"/>
+    <p:sldId id="357" r:id="rId4"/>
+    <p:sldId id="358" r:id="rId5"/>
+    <p:sldId id="343" r:id="rId6"/>
+    <p:sldId id="344" r:id="rId7"/>
+    <p:sldId id="342" r:id="rId8"/>
+    <p:sldId id="345" r:id="rId9"/>
+    <p:sldId id="346" r:id="rId10"/>
+    <p:sldId id="347" r:id="rId11"/>
+    <p:sldId id="348" r:id="rId12"/>
+    <p:sldId id="349" r:id="rId13"/>
+    <p:sldId id="351" r:id="rId14"/>
+    <p:sldId id="350" r:id="rId15"/>
+    <p:sldId id="356" r:id="rId16"/>
+    <p:sldId id="352" r:id="rId17"/>
+    <p:sldId id="353" r:id="rId18"/>
+    <p:sldId id="354" r:id="rId19"/>
+    <p:sldId id="355" r:id="rId20"/>
+    <p:sldId id="340" r:id="rId21"/>
   </p:sldIdLst>
   <p:sldSz cx="9144000" cy="6858000" type="screen4x3"/>
   <p:notesSz cx="6813550" cy="9945688"/>
@@ -1684,11 +1686,7 @@
         <a:p>
           <a:r>
             <a:rPr lang="en-US" altLang="en-US" dirty="0" smtClean="0"/>
-            <a:t>Carton ID </a:t>
-          </a:r>
-          <a:r>
-            <a:rPr lang="en-US" altLang="en-US" dirty="0" smtClean="0"/>
-            <a:t>Maintain</a:t>
+            <a:t>Carton ID Maintain</a:t>
           </a:r>
           <a:endParaRPr lang="zh-CN" altLang="en-US" dirty="0"/>
         </a:p>
@@ -4888,7 +4886,7 @@
             <a:fld id="{4D2C590C-463E-4F0C-9134-D7C5128A8EB4}" type="datetimeFigureOut">
               <a:rPr lang="zh-TW" altLang="en-US" smtClean="0"/>
               <a:pPr/>
-              <a:t>2014/10/9</a:t>
+              <a:t>2014/10/10</a:t>
             </a:fld>
             <a:endParaRPr lang="zh-TW" altLang="en-US"/>
           </a:p>
@@ -4984,7 +4982,7 @@
             <a:fld id="{A8BD75ED-5E07-4F67-8C98-12BA1B9B61CE}" type="datetimeFigureOut">
               <a:rPr lang="zh-CN" altLang="en-US" smtClean="0"/>
               <a:pPr/>
-              <a:t>10/09/2014</a:t>
+              <a:t>10/10/2014</a:t>
             </a:fld>
             <a:endParaRPr lang="zh-CN" altLang="en-US" dirty="0"/>
           </a:p>
@@ -5319,7 +5317,7 @@
             <a:fld id="{A8B38BC6-A07A-4D04-A852-6C2ACEAE2FB5}" type="datetime1">
               <a:rPr lang="zh-CN" altLang="en-US" smtClean="0"/>
               <a:pPr/>
-              <a:t>10/09/2014</a:t>
+              <a:t>10/10/2014</a:t>
             </a:fld>
             <a:endParaRPr lang="zh-CN" altLang="en-US" dirty="0"/>
           </a:p>
@@ -5539,7 +5537,7 @@
             <a:fld id="{35A7AC81-696A-4C2A-B918-515844A88C4A}" type="datetime1">
               <a:rPr lang="zh-TW" altLang="en-US" smtClean="0"/>
               <a:pPr/>
-              <a:t>2014/10/9</a:t>
+              <a:t>2014/10/10</a:t>
             </a:fld>
             <a:endParaRPr lang="zh-CN" altLang="en-US"/>
           </a:p>
@@ -5706,7 +5704,7 @@
             <a:fld id="{3A66168E-DF05-4F16-9321-82EF6F7D3409}" type="datetime1">
               <a:rPr lang="zh-TW" altLang="en-US" smtClean="0"/>
               <a:pPr/>
-              <a:t>2014/10/9</a:t>
+              <a:t>2014/10/10</a:t>
             </a:fld>
             <a:endParaRPr lang="zh-CN" altLang="en-US"/>
           </a:p>
@@ -5883,7 +5881,7 @@
             <a:fld id="{292BB50C-E58E-4536-ABBE-FDAF06E55820}" type="datetime1">
               <a:rPr lang="zh-TW" altLang="en-US" smtClean="0"/>
               <a:pPr/>
-              <a:t>2014/10/9</a:t>
+              <a:t>2014/10/10</a:t>
             </a:fld>
             <a:endParaRPr lang="zh-CN" altLang="en-US"/>
           </a:p>
@@ -6027,7 +6025,7 @@
             <a:fld id="{BCDD0958-C144-4E3D-A8F5-AAEDA8C9D550}" type="datetime1">
               <a:rPr lang="zh-TW" altLang="en-US" smtClean="0"/>
               <a:pPr/>
-              <a:t>2014/10/9</a:t>
+              <a:t>2014/10/10</a:t>
             </a:fld>
             <a:endParaRPr lang="zh-CN" altLang="en-US"/>
           </a:p>
@@ -6293,7 +6291,7 @@
             <a:fld id="{C167E0BE-EAE3-45A7-A5A7-57157AC01174}" type="datetime1">
               <a:rPr lang="zh-TW" altLang="en-US" smtClean="0"/>
               <a:pPr/>
-              <a:t>2014/10/9</a:t>
+              <a:t>2014/10/10</a:t>
             </a:fld>
             <a:endParaRPr lang="zh-CN" altLang="en-US"/>
           </a:p>
@@ -6578,7 +6576,7 @@
             <a:fld id="{6AC3B814-8B0B-49DD-90D0-D679CAA248BF}" type="datetime1">
               <a:rPr lang="zh-TW" altLang="en-US" smtClean="0"/>
               <a:pPr/>
-              <a:t>2014/10/9</a:t>
+              <a:t>2014/10/10</a:t>
             </a:fld>
             <a:endParaRPr lang="zh-CN" altLang="en-US"/>
           </a:p>
@@ -6997,7 +6995,7 @@
             <a:fld id="{BF7ED2E8-9E3A-4757-81B5-4DB84D908ACD}" type="datetime1">
               <a:rPr lang="zh-TW" altLang="en-US" smtClean="0"/>
               <a:pPr/>
-              <a:t>2014/10/9</a:t>
+              <a:t>2014/10/10</a:t>
             </a:fld>
             <a:endParaRPr lang="zh-CN" altLang="en-US"/>
           </a:p>
@@ -7112,7 +7110,7 @@
             <a:fld id="{472DB839-8415-4D10-81B3-48A58C5324C2}" type="datetime1">
               <a:rPr lang="zh-TW" altLang="en-US" smtClean="0"/>
               <a:pPr/>
-              <a:t>2014/10/9</a:t>
+              <a:t>2014/10/10</a:t>
             </a:fld>
             <a:endParaRPr lang="zh-CN" altLang="en-US"/>
           </a:p>
@@ -7204,7 +7202,7 @@
             <a:fld id="{6144F512-14EF-46B4-9E70-9E1E0786683C}" type="datetime1">
               <a:rPr lang="zh-TW" altLang="en-US" smtClean="0"/>
               <a:pPr/>
-              <a:t>2014/10/9</a:t>
+              <a:t>2014/10/10</a:t>
             </a:fld>
             <a:endParaRPr lang="zh-CN" altLang="en-US"/>
           </a:p>
@@ -7478,7 +7476,7 @@
             <a:fld id="{B91D2291-1907-4432-B355-638067851FEC}" type="datetime1">
               <a:rPr lang="zh-TW" altLang="en-US" smtClean="0"/>
               <a:pPr/>
-              <a:t>2014/10/9</a:t>
+              <a:t>2014/10/10</a:t>
             </a:fld>
             <a:endParaRPr lang="zh-CN" altLang="en-US"/>
           </a:p>
@@ -7728,7 +7726,7 @@
             <a:fld id="{3CE2A9AE-EA9E-4495-BEFD-EBC4472D3C52}" type="datetime1">
               <a:rPr lang="zh-TW" altLang="en-US" smtClean="0"/>
               <a:pPr/>
-              <a:t>2014/10/9</a:t>
+              <a:t>2014/10/10</a:t>
             </a:fld>
             <a:endParaRPr lang="zh-CN" altLang="en-US"/>
           </a:p>
@@ -7938,7 +7936,7 @@
             <a:fld id="{8A63E226-BC2D-40EF-90E6-0476DBDDD628}" type="datetime1">
               <a:rPr lang="zh-TW" altLang="en-US" smtClean="0"/>
               <a:pPr/>
-              <a:t>2014/10/9</a:t>
+              <a:t>2014/10/10</a:t>
             </a:fld>
             <a:endParaRPr lang="zh-CN" altLang="en-US" dirty="0"/>
           </a:p>
@@ -8552,7 +8550,7 @@
             <a:fld id="{7D36EE62-A1CD-4859-A084-11A1BEE6A9C3}" type="datetime1">
               <a:rPr lang="zh-TW" altLang="en-US" smtClean="0"/>
               <a:pPr/>
-              <a:t>2014/10/9</a:t>
+              <a:t>2014/10/10</a:t>
             </a:fld>
             <a:endParaRPr lang="zh-CN" altLang="en-US"/>
           </a:p>
@@ -8592,7 +8590,7 @@
       </p:grpSpPr>
       <p:pic>
         <p:nvPicPr>
-          <p:cNvPr id="6" name="内容占位符 5" descr="1.2.2Add New(Edit Batch ID).png"/>
+          <p:cNvPr id="6" name="内容占位符 5" descr="1.2UploadEpackingList.png"/>
           <p:cNvPicPr>
             <a:picLocks noGrp="1" noChangeAspect="1"/>
           </p:cNvPicPr>
@@ -8608,8 +8606,8 @@
         </p:blipFill>
         <p:spPr>
           <a:xfrm>
-            <a:off x="1482005" y="1600200"/>
-            <a:ext cx="5810103" cy="4525963"/>
+            <a:off x="457200" y="1703399"/>
+            <a:ext cx="7859713" cy="4319564"/>
           </a:xfrm>
         </p:spPr>
       </p:pic>
@@ -8631,7 +8629,7 @@
             <a:fld id="{BCDD0958-C144-4E3D-A8F5-AAEDA8C9D550}" type="datetime1">
               <a:rPr lang="zh-TW" altLang="en-US" smtClean="0"/>
               <a:pPr/>
-              <a:t>2014/10/9</a:t>
+              <a:t>2014/10/10</a:t>
             </a:fld>
             <a:endParaRPr lang="zh-CN" altLang="en-US"/>
           </a:p>
@@ -8678,13 +8676,10 @@
           </a:bodyPr>
           <a:lstStyle/>
           <a:p>
+            <a:pPr lvl="0"/>
             <a:r>
               <a:rPr lang="en-US" altLang="en-US" dirty="0" smtClean="0"/>
-              <a:t>1.2.2 Edit </a:t>
-            </a:r>
-            <a:r>
-              <a:rPr lang="en-US" altLang="zh-CN" dirty="0" smtClean="0"/>
-              <a:t>Batch ID</a:t>
+              <a:t>1.2. Add New(Edit Batch ID)</a:t>
             </a:r>
             <a:endParaRPr lang="zh-CN" altLang="en-US" dirty="0"/>
           </a:p>
@@ -8740,7 +8735,7 @@
             <a:fld id="{BCDD0958-C144-4E3D-A8F5-AAEDA8C9D550}" type="datetime1">
               <a:rPr lang="zh-TW" altLang="en-US" smtClean="0"/>
               <a:pPr/>
-              <a:t>2014/10/9</a:t>
+              <a:t>2014/10/10</a:t>
             </a:fld>
             <a:endParaRPr lang="zh-CN" altLang="en-US"/>
           </a:p>
@@ -8789,11 +8784,15 @@
           <a:p>
             <a:r>
               <a:rPr lang="en-US" altLang="en-US" dirty="0" smtClean="0"/>
-              <a:t>1.2.3  Search </a:t>
+              <a:t>1.2.1 </a:t>
             </a:r>
             <a:r>
               <a:rPr lang="en-US" altLang="zh-CN" dirty="0" smtClean="0"/>
-              <a:t>Batch ID</a:t>
+              <a:t>Add a </a:t>
+            </a:r>
+            <a:r>
+              <a:rPr lang="en-US" altLang="zh-CN" smtClean="0"/>
+              <a:t>New Batch ID</a:t>
             </a:r>
             <a:endParaRPr lang="zh-CN" altLang="en-US" dirty="0"/>
           </a:p>
@@ -8801,7 +8800,7 @@
       </p:sp>
       <p:pic>
         <p:nvPicPr>
-          <p:cNvPr id="8" name="内容占位符 7" descr="1.2.3Add New(Edit Batch ID).png"/>
+          <p:cNvPr id="8" name="内容占位符 7" descr="1.2.1UploadEpackingList.png"/>
           <p:cNvPicPr>
             <a:picLocks noGrp="1" noChangeAspect="1"/>
           </p:cNvPicPr>
@@ -8817,8 +8816,8 @@
         </p:blipFill>
         <p:spPr>
           <a:xfrm>
-            <a:off x="1315867" y="1600200"/>
-            <a:ext cx="6142378" cy="4525963"/>
+            <a:off x="1206741" y="1600200"/>
+            <a:ext cx="6360631" cy="4525963"/>
           </a:xfrm>
         </p:spPr>
       </p:pic>
@@ -8856,7 +8855,7 @@
       </p:grpSpPr>
       <p:pic>
         <p:nvPicPr>
-          <p:cNvPr id="6" name="内容占位符 5" descr="2. CartonIDMaintain.png"/>
+          <p:cNvPr id="6" name="内容占位符 5" descr="1.2.2Add New(Edit Batch ID).png"/>
           <p:cNvPicPr>
             <a:picLocks noGrp="1" noChangeAspect="1"/>
           </p:cNvPicPr>
@@ -8872,8 +8871,8 @@
         </p:blipFill>
         <p:spPr>
           <a:xfrm>
-            <a:off x="597244" y="1600200"/>
-            <a:ext cx="7579625" cy="4525963"/>
+            <a:off x="1482005" y="1600200"/>
+            <a:ext cx="5810103" cy="4525963"/>
           </a:xfrm>
         </p:spPr>
       </p:pic>
@@ -8895,7 +8894,7 @@
             <a:fld id="{BCDD0958-C144-4E3D-A8F5-AAEDA8C9D550}" type="datetime1">
               <a:rPr lang="zh-TW" altLang="en-US" smtClean="0"/>
               <a:pPr/>
-              <a:t>2014/10/9</a:t>
+              <a:t>2014/10/10</a:t>
             </a:fld>
             <a:endParaRPr lang="zh-CN" altLang="en-US"/>
           </a:p>
@@ -8938,25 +8937,17 @@
         <p:spPr/>
         <p:txBody>
           <a:bodyPr>
-            <a:normAutofit fontScale="90000"/>
+            <a:normAutofit/>
           </a:bodyPr>
           <a:lstStyle/>
           <a:p>
-            <a:pPr lvl="0"/>
+            <a:r>
+              <a:rPr lang="en-US" altLang="en-US" dirty="0" smtClean="0"/>
+              <a:t>1.2.2 Edit </a:t>
+            </a:r>
             <a:r>
               <a:rPr lang="en-US" altLang="zh-CN" dirty="0" smtClean="0"/>
-              <a:t>2.</a:t>
-            </a:r>
-            <a:r>
-              <a:rPr lang="en-US" altLang="en-US" dirty="0" smtClean="0"/>
-              <a:t> Carton ID Maintain</a:t>
-            </a:r>
-            <a:br>
-              <a:rPr lang="en-US" altLang="en-US" dirty="0" smtClean="0"/>
-            </a:br>
-            <a:r>
-              <a:rPr lang="en-US" altLang="en-US" dirty="0" smtClean="0"/>
-              <a:t>(upload to ERP)</a:t>
+              <a:t>Batch ID</a:t>
             </a:r>
             <a:endParaRPr lang="zh-CN" altLang="en-US" dirty="0"/>
           </a:p>
@@ -9012,7 +9003,7 @@
             <a:fld id="{BCDD0958-C144-4E3D-A8F5-AAEDA8C9D550}" type="datetime1">
               <a:rPr lang="zh-TW" altLang="en-US" smtClean="0"/>
               <a:pPr/>
-              <a:t>2014/10/9</a:t>
+              <a:t>2014/10/10</a:t>
             </a:fld>
             <a:endParaRPr lang="zh-CN" altLang="en-US"/>
           </a:p>
@@ -9037,6 +9028,278 @@
               <a:rPr lang="zh-CN" altLang="en-US" smtClean="0"/>
               <a:pPr/>
               <a:t>13</a:t>
+            </a:fld>
+            <a:endParaRPr lang="zh-CN" altLang="en-US" dirty="0"/>
+          </a:p>
+        </p:txBody>
+      </p:sp>
+      <p:sp>
+        <p:nvSpPr>
+          <p:cNvPr id="5" name="标题 4"/>
+          <p:cNvSpPr>
+            <a:spLocks noGrp="1"/>
+          </p:cNvSpPr>
+          <p:nvPr>
+            <p:ph type="title"/>
+          </p:nvPr>
+        </p:nvSpPr>
+        <p:spPr/>
+        <p:txBody>
+          <a:bodyPr>
+            <a:normAutofit/>
+          </a:bodyPr>
+          <a:lstStyle/>
+          <a:p>
+            <a:r>
+              <a:rPr lang="en-US" altLang="en-US" dirty="0" smtClean="0"/>
+              <a:t>1.2.3  Search </a:t>
+            </a:r>
+            <a:r>
+              <a:rPr lang="en-US" altLang="zh-CN" dirty="0" smtClean="0"/>
+              <a:t>Batch ID</a:t>
+            </a:r>
+            <a:endParaRPr lang="zh-CN" altLang="en-US" dirty="0"/>
+          </a:p>
+        </p:txBody>
+      </p:sp>
+      <p:pic>
+        <p:nvPicPr>
+          <p:cNvPr id="8" name="内容占位符 7" descr="1.2.3Add New(Edit Batch ID).png"/>
+          <p:cNvPicPr>
+            <a:picLocks noGrp="1" noChangeAspect="1"/>
+          </p:cNvPicPr>
+          <p:nvPr>
+            <p:ph idx="1"/>
+          </p:nvPr>
+        </p:nvPicPr>
+        <p:blipFill>
+          <a:blip r:embed="rId2"/>
+          <a:stretch>
+            <a:fillRect/>
+          </a:stretch>
+        </p:blipFill>
+        <p:spPr>
+          <a:xfrm>
+            <a:off x="1315867" y="1600200"/>
+            <a:ext cx="6142378" cy="4525963"/>
+          </a:xfrm>
+        </p:spPr>
+      </p:pic>
+    </p:spTree>
+  </p:cSld>
+  <p:clrMapOvr>
+    <a:masterClrMapping/>
+  </p:clrMapOvr>
+  <p:timing>
+    <p:tnLst>
+      <p:par>
+        <p:cTn id="1" dur="indefinite" restart="never" nodeType="tmRoot"/>
+      </p:par>
+    </p:tnLst>
+  </p:timing>
+</p:sld>
+</file>
+
+<file path=ppt/slides/slide14.xml><?xml version="1.0" encoding="utf-8"?>
+<p:sld xmlns:a="http://schemas.openxmlformats.org/drawingml/2006/main" xmlns:r="http://schemas.openxmlformats.org/officeDocument/2006/relationships" xmlns:p="http://schemas.openxmlformats.org/presentationml/2006/main">
+  <p:cSld>
+    <p:spTree>
+      <p:nvGrpSpPr>
+        <p:cNvPr id="1" name=""/>
+        <p:cNvGrpSpPr/>
+        <p:nvPr/>
+      </p:nvGrpSpPr>
+      <p:grpSpPr>
+        <a:xfrm>
+          <a:off x="0" y="0"/>
+          <a:ext cx="0" cy="0"/>
+          <a:chOff x="0" y="0"/>
+          <a:chExt cx="0" cy="0"/>
+        </a:xfrm>
+      </p:grpSpPr>
+      <p:pic>
+        <p:nvPicPr>
+          <p:cNvPr id="6" name="内容占位符 5" descr="2. CartonIDMaintain.png"/>
+          <p:cNvPicPr>
+            <a:picLocks noGrp="1" noChangeAspect="1"/>
+          </p:cNvPicPr>
+          <p:nvPr>
+            <p:ph idx="1"/>
+          </p:nvPr>
+        </p:nvPicPr>
+        <p:blipFill>
+          <a:blip r:embed="rId2"/>
+          <a:stretch>
+            <a:fillRect/>
+          </a:stretch>
+        </p:blipFill>
+        <p:spPr>
+          <a:xfrm>
+            <a:off x="597244" y="1600200"/>
+            <a:ext cx="7579625" cy="4525963"/>
+          </a:xfrm>
+        </p:spPr>
+      </p:pic>
+      <p:sp>
+        <p:nvSpPr>
+          <p:cNvPr id="3" name="日期占位符 2"/>
+          <p:cNvSpPr>
+            <a:spLocks noGrp="1"/>
+          </p:cNvSpPr>
+          <p:nvPr>
+            <p:ph type="dt" sz="half" idx="10"/>
+          </p:nvPr>
+        </p:nvSpPr>
+        <p:spPr/>
+        <p:txBody>
+          <a:bodyPr/>
+          <a:lstStyle/>
+          <a:p>
+            <a:fld id="{BCDD0958-C144-4E3D-A8F5-AAEDA8C9D550}" type="datetime1">
+              <a:rPr lang="zh-TW" altLang="en-US" smtClean="0"/>
+              <a:pPr/>
+              <a:t>2014/10/10</a:t>
+            </a:fld>
+            <a:endParaRPr lang="zh-CN" altLang="en-US"/>
+          </a:p>
+        </p:txBody>
+      </p:sp>
+      <p:sp>
+        <p:nvSpPr>
+          <p:cNvPr id="4" name="灯片编号占位符 3"/>
+          <p:cNvSpPr>
+            <a:spLocks noGrp="1"/>
+          </p:cNvSpPr>
+          <p:nvPr>
+            <p:ph type="sldNum" sz="quarter" idx="12"/>
+          </p:nvPr>
+        </p:nvSpPr>
+        <p:spPr/>
+        <p:txBody>
+          <a:bodyPr/>
+          <a:lstStyle/>
+          <a:p>
+            <a:fld id="{28874C86-8C61-448A-906E-93CD94C69BE8}" type="slidenum">
+              <a:rPr lang="zh-CN" altLang="en-US" smtClean="0"/>
+              <a:pPr/>
+              <a:t>14</a:t>
+            </a:fld>
+            <a:endParaRPr lang="zh-CN" altLang="en-US" dirty="0"/>
+          </a:p>
+        </p:txBody>
+      </p:sp>
+      <p:sp>
+        <p:nvSpPr>
+          <p:cNvPr id="5" name="标题 4"/>
+          <p:cNvSpPr>
+            <a:spLocks noGrp="1"/>
+          </p:cNvSpPr>
+          <p:nvPr>
+            <p:ph type="title"/>
+          </p:nvPr>
+        </p:nvSpPr>
+        <p:spPr/>
+        <p:txBody>
+          <a:bodyPr>
+            <a:normAutofit fontScale="90000"/>
+          </a:bodyPr>
+          <a:lstStyle/>
+          <a:p>
+            <a:pPr lvl="0"/>
+            <a:r>
+              <a:rPr lang="en-US" altLang="zh-CN" dirty="0" smtClean="0"/>
+              <a:t>2.</a:t>
+            </a:r>
+            <a:r>
+              <a:rPr lang="en-US" altLang="en-US" dirty="0" smtClean="0"/>
+              <a:t> Carton ID Maintain</a:t>
+            </a:r>
+            <a:br>
+              <a:rPr lang="en-US" altLang="en-US" dirty="0" smtClean="0"/>
+            </a:br>
+            <a:r>
+              <a:rPr lang="en-US" altLang="en-US" dirty="0" smtClean="0"/>
+              <a:t>(upload to ERP)</a:t>
+            </a:r>
+            <a:endParaRPr lang="zh-CN" altLang="en-US" dirty="0"/>
+          </a:p>
+        </p:txBody>
+      </p:sp>
+    </p:spTree>
+  </p:cSld>
+  <p:clrMapOvr>
+    <a:masterClrMapping/>
+  </p:clrMapOvr>
+  <p:timing>
+    <p:tnLst>
+      <p:par>
+        <p:cTn id="1" dur="indefinite" restart="never" nodeType="tmRoot"/>
+      </p:par>
+    </p:tnLst>
+  </p:timing>
+</p:sld>
+</file>
+
+<file path=ppt/slides/slide15.xml><?xml version="1.0" encoding="utf-8"?>
+<p:sld xmlns:a="http://schemas.openxmlformats.org/drawingml/2006/main" xmlns:r="http://schemas.openxmlformats.org/officeDocument/2006/relationships" xmlns:p="http://schemas.openxmlformats.org/presentationml/2006/main">
+  <p:cSld>
+    <p:spTree>
+      <p:nvGrpSpPr>
+        <p:cNvPr id="1" name=""/>
+        <p:cNvGrpSpPr/>
+        <p:nvPr/>
+      </p:nvGrpSpPr>
+      <p:grpSpPr>
+        <a:xfrm>
+          <a:off x="0" y="0"/>
+          <a:ext cx="0" cy="0"/>
+          <a:chOff x="0" y="0"/>
+          <a:chExt cx="0" cy="0"/>
+        </a:xfrm>
+      </p:grpSpPr>
+      <p:sp>
+        <p:nvSpPr>
+          <p:cNvPr id="3" name="日期占位符 2"/>
+          <p:cNvSpPr>
+            <a:spLocks noGrp="1"/>
+          </p:cNvSpPr>
+          <p:nvPr>
+            <p:ph type="dt" sz="half" idx="10"/>
+          </p:nvPr>
+        </p:nvSpPr>
+        <p:spPr/>
+        <p:txBody>
+          <a:bodyPr/>
+          <a:lstStyle/>
+          <a:p>
+            <a:fld id="{BCDD0958-C144-4E3D-A8F5-AAEDA8C9D550}" type="datetime1">
+              <a:rPr lang="zh-TW" altLang="en-US" smtClean="0"/>
+              <a:pPr/>
+              <a:t>2014/10/10</a:t>
+            </a:fld>
+            <a:endParaRPr lang="zh-CN" altLang="en-US"/>
+          </a:p>
+        </p:txBody>
+      </p:sp>
+      <p:sp>
+        <p:nvSpPr>
+          <p:cNvPr id="4" name="灯片编号占位符 3"/>
+          <p:cNvSpPr>
+            <a:spLocks noGrp="1"/>
+          </p:cNvSpPr>
+          <p:nvPr>
+            <p:ph type="sldNum" sz="quarter" idx="12"/>
+          </p:nvPr>
+        </p:nvSpPr>
+        <p:spPr/>
+        <p:txBody>
+          <a:bodyPr/>
+          <a:lstStyle/>
+          <a:p>
+            <a:fld id="{28874C86-8C61-448A-906E-93CD94C69BE8}" type="slidenum">
+              <a:rPr lang="zh-CN" altLang="en-US" smtClean="0"/>
+              <a:pPr/>
+              <a:t>15</a:t>
             </a:fld>
             <a:endParaRPr lang="zh-CN" altLang="en-US" dirty="0"/>
           </a:p>
@@ -9179,7 +9442,7 @@
 </p:sld>
 </file>
 
-<file path=ppt/slides/slide14.xml><?xml version="1.0" encoding="utf-8"?>
+<file path=ppt/slides/slide16.xml><?xml version="1.0" encoding="utf-8"?>
 <p:sld xmlns:a="http://schemas.openxmlformats.org/drawingml/2006/main" xmlns:r="http://schemas.openxmlformats.org/officeDocument/2006/relationships" xmlns:p="http://schemas.openxmlformats.org/presentationml/2006/main">
   <p:cSld>
     <p:spTree>
@@ -9214,7 +9477,7 @@
             <a:fld id="{BCDD0958-C144-4E3D-A8F5-AAEDA8C9D550}" type="datetime1">
               <a:rPr lang="zh-TW" altLang="en-US" smtClean="0"/>
               <a:pPr/>
-              <a:t>2014/10/9</a:t>
+              <a:t>2014/10/10</a:t>
             </a:fld>
             <a:endParaRPr lang="zh-CN" altLang="en-US"/>
           </a:p>
@@ -9238,7 +9501,7 @@
             <a:fld id="{28874C86-8C61-448A-906E-93CD94C69BE8}" type="slidenum">
               <a:rPr lang="zh-CN" altLang="en-US" smtClean="0"/>
               <a:pPr/>
-              <a:t>14</a:t>
+              <a:t>16</a:t>
             </a:fld>
             <a:endParaRPr lang="zh-CN" altLang="en-US" dirty="0"/>
           </a:p>
@@ -9308,7 +9571,7 @@
 </p:sld>
 </file>
 
-<file path=ppt/slides/slide15.xml><?xml version="1.0" encoding="utf-8"?>
+<file path=ppt/slides/slide17.xml><?xml version="1.0" encoding="utf-8"?>
 <p:sld xmlns:a="http://schemas.openxmlformats.org/drawingml/2006/main" xmlns:r="http://schemas.openxmlformats.org/officeDocument/2006/relationships" xmlns:p="http://schemas.openxmlformats.org/presentationml/2006/main">
   <p:cSld>
     <p:spTree>
@@ -9366,7 +9629,7 @@
             <a:fld id="{BCDD0958-C144-4E3D-A8F5-AAEDA8C9D550}" type="datetime1">
               <a:rPr lang="zh-TW" altLang="en-US" smtClean="0"/>
               <a:pPr/>
-              <a:t>2014/10/9</a:t>
+              <a:t>2014/10/10</a:t>
             </a:fld>
             <a:endParaRPr lang="zh-CN" altLang="en-US"/>
           </a:p>
@@ -9390,7 +9653,7 @@
             <a:fld id="{28874C86-8C61-448A-906E-93CD94C69BE8}" type="slidenum">
               <a:rPr lang="zh-CN" altLang="en-US" smtClean="0"/>
               <a:pPr/>
-              <a:t>15</a:t>
+              <a:t>17</a:t>
             </a:fld>
             <a:endParaRPr lang="zh-CN" altLang="en-US" dirty="0"/>
           </a:p>
@@ -9441,7 +9704,7 @@
 </p:sld>
 </file>
 
-<file path=ppt/slides/slide16.xml><?xml version="1.0" encoding="utf-8"?>
+<file path=ppt/slides/slide18.xml><?xml version="1.0" encoding="utf-8"?>
 <p:sld xmlns:a="http://schemas.openxmlformats.org/drawingml/2006/main" xmlns:r="http://schemas.openxmlformats.org/officeDocument/2006/relationships" xmlns:p="http://schemas.openxmlformats.org/presentationml/2006/main">
   <p:cSld>
     <p:spTree>
@@ -9476,7 +9739,7 @@
             <a:fld id="{BCDD0958-C144-4E3D-A8F5-AAEDA8C9D550}" type="datetime1">
               <a:rPr lang="zh-TW" altLang="en-US" smtClean="0"/>
               <a:pPr/>
-              <a:t>2014/10/9</a:t>
+              <a:t>2014/10/10</a:t>
             </a:fld>
             <a:endParaRPr lang="zh-CN" altLang="en-US"/>
           </a:p>
@@ -9500,7 +9763,7 @@
             <a:fld id="{28874C86-8C61-448A-906E-93CD94C69BE8}" type="slidenum">
               <a:rPr lang="zh-CN" altLang="en-US" smtClean="0"/>
               <a:pPr/>
-              <a:t>16</a:t>
+              <a:t>18</a:t>
             </a:fld>
             <a:endParaRPr lang="zh-CN" altLang="en-US" dirty="0"/>
           </a:p>
@@ -9560,7 +9823,7 @@
 </p:sld>
 </file>
 
-<file path=ppt/slides/slide17.xml><?xml version="1.0" encoding="utf-8"?>
+<file path=ppt/slides/slide19.xml><?xml version="1.0" encoding="utf-8"?>
 <p:sld xmlns:a="http://schemas.openxmlformats.org/drawingml/2006/main" xmlns:r="http://schemas.openxmlformats.org/officeDocument/2006/relationships" xmlns:p="http://schemas.openxmlformats.org/presentationml/2006/main">
   <p:cSld>
     <p:spTree>
@@ -9618,7 +9881,7 @@
             <a:fld id="{BCDD0958-C144-4E3D-A8F5-AAEDA8C9D550}" type="datetime1">
               <a:rPr lang="zh-TW" altLang="en-US" smtClean="0"/>
               <a:pPr/>
-              <a:t>2014/10/9</a:t>
+              <a:t>2014/10/10</a:t>
             </a:fld>
             <a:endParaRPr lang="zh-CN" altLang="en-US"/>
           </a:p>
@@ -9642,7 +9905,7 @@
             <a:fld id="{28874C86-8C61-448A-906E-93CD94C69BE8}" type="slidenum">
               <a:rPr lang="zh-CN" altLang="en-US" smtClean="0"/>
               <a:pPr/>
-              <a:t>17</a:t>
+              <a:t>19</a:t>
             </a:fld>
             <a:endParaRPr lang="zh-CN" altLang="en-US" dirty="0"/>
           </a:p>
@@ -9683,130 +9946,6 @@
   <p:clrMapOvr>
     <a:masterClrMapping/>
   </p:clrMapOvr>
-</p:sld>
-</file>
-
-<file path=ppt/slides/slide18.xml><?xml version="1.0" encoding="utf-8"?>
-<p:sld xmlns:a="http://schemas.openxmlformats.org/drawingml/2006/main" xmlns:r="http://schemas.openxmlformats.org/officeDocument/2006/relationships" xmlns:p="http://schemas.openxmlformats.org/presentationml/2006/main">
-  <p:cSld>
-    <p:spTree>
-      <p:nvGrpSpPr>
-        <p:cNvPr id="1" name=""/>
-        <p:cNvGrpSpPr/>
-        <p:nvPr/>
-      </p:nvGrpSpPr>
-      <p:grpSpPr>
-        <a:xfrm>
-          <a:off x="0" y="0"/>
-          <a:ext cx="0" cy="0"/>
-          <a:chOff x="0" y="0"/>
-          <a:chExt cx="0" cy="0"/>
-        </a:xfrm>
-      </p:grpSpPr>
-      <p:sp>
-        <p:nvSpPr>
-          <p:cNvPr id="2" name="Content Placeholder 1"/>
-          <p:cNvSpPr>
-            <a:spLocks noGrp="1"/>
-          </p:cNvSpPr>
-          <p:nvPr>
-            <p:ph idx="1"/>
-          </p:nvPr>
-        </p:nvSpPr>
-        <p:spPr/>
-        <p:txBody>
-          <a:bodyPr/>
-          <a:lstStyle/>
-          <a:p>
-            <a:pPr algn="ctr">
-              <a:buNone/>
-            </a:pPr>
-            <a:endParaRPr lang="en-US" altLang="zh-CN" dirty="0" smtClean="0"/>
-          </a:p>
-          <a:p>
-            <a:pPr algn="ctr">
-              <a:buNone/>
-            </a:pPr>
-            <a:endParaRPr lang="en-US" altLang="zh-CN" dirty="0" smtClean="0"/>
-          </a:p>
-          <a:p>
-            <a:pPr algn="ctr">
-              <a:buNone/>
-            </a:pPr>
-            <a:endParaRPr lang="en-US" altLang="zh-CN" dirty="0" smtClean="0"/>
-          </a:p>
-          <a:p>
-            <a:pPr algn="ctr">
-              <a:buNone/>
-            </a:pPr>
-            <a:r>
-              <a:rPr lang="en-US" altLang="zh-CN" dirty="0" smtClean="0"/>
-              <a:t>--END--</a:t>
-            </a:r>
-            <a:endParaRPr lang="zh-CN" altLang="en-US" dirty="0"/>
-          </a:p>
-        </p:txBody>
-      </p:sp>
-      <p:sp>
-        <p:nvSpPr>
-          <p:cNvPr id="3" name="Date Placeholder 2"/>
-          <p:cNvSpPr>
-            <a:spLocks noGrp="1"/>
-          </p:cNvSpPr>
-          <p:nvPr>
-            <p:ph type="dt" sz="half" idx="10"/>
-          </p:nvPr>
-        </p:nvSpPr>
-        <p:spPr/>
-        <p:txBody>
-          <a:bodyPr/>
-          <a:lstStyle/>
-          <a:p>
-            <a:fld id="{BCDD0958-C144-4E3D-A8F5-AAEDA8C9D550}" type="datetime1">
-              <a:rPr lang="zh-TW" altLang="en-US" smtClean="0"/>
-              <a:pPr/>
-              <a:t>2014/10/9</a:t>
-            </a:fld>
-            <a:endParaRPr lang="zh-CN" altLang="en-US"/>
-          </a:p>
-        </p:txBody>
-      </p:sp>
-      <p:sp>
-        <p:nvSpPr>
-          <p:cNvPr id="4" name="Slide Number Placeholder 3"/>
-          <p:cNvSpPr>
-            <a:spLocks noGrp="1"/>
-          </p:cNvSpPr>
-          <p:nvPr>
-            <p:ph type="sldNum" sz="quarter" idx="12"/>
-          </p:nvPr>
-        </p:nvSpPr>
-        <p:spPr/>
-        <p:txBody>
-          <a:bodyPr/>
-          <a:lstStyle/>
-          <a:p>
-            <a:fld id="{28874C86-8C61-448A-906E-93CD94C69BE8}" type="slidenum">
-              <a:rPr lang="zh-CN" altLang="en-US" smtClean="0"/>
-              <a:pPr/>
-              <a:t>18</a:t>
-            </a:fld>
-            <a:endParaRPr lang="zh-CN" altLang="en-US" dirty="0"/>
-          </a:p>
-        </p:txBody>
-      </p:sp>
-    </p:spTree>
-  </p:cSld>
-  <p:clrMapOvr>
-    <a:masterClrMapping/>
-  </p:clrMapOvr>
-  <p:timing>
-    <p:tnLst>
-      <p:par>
-        <p:cTn id="1" dur="indefinite" restart="never" nodeType="tmRoot"/>
-      </p:par>
-    </p:tnLst>
-  </p:timing>
 </p:sld>
 </file>
 
@@ -9865,7 +10004,7 @@
             <a:fld id="{BCDD0958-C144-4E3D-A8F5-AAEDA8C9D550}" type="datetime1">
               <a:rPr lang="zh-TW" altLang="en-US" smtClean="0"/>
               <a:pPr/>
-              <a:t>2014/10/9</a:t>
+              <a:t>2014/10/10</a:t>
             </a:fld>
             <a:endParaRPr lang="zh-CN" altLang="en-US"/>
           </a:p>
@@ -10089,7 +10228,614 @@
 </p:sld>
 </file>
 
+<file path=ppt/slides/slide20.xml><?xml version="1.0" encoding="utf-8"?>
+<p:sld xmlns:a="http://schemas.openxmlformats.org/drawingml/2006/main" xmlns:r="http://schemas.openxmlformats.org/officeDocument/2006/relationships" xmlns:p="http://schemas.openxmlformats.org/presentationml/2006/main">
+  <p:cSld>
+    <p:spTree>
+      <p:nvGrpSpPr>
+        <p:cNvPr id="1" name=""/>
+        <p:cNvGrpSpPr/>
+        <p:nvPr/>
+      </p:nvGrpSpPr>
+      <p:grpSpPr>
+        <a:xfrm>
+          <a:off x="0" y="0"/>
+          <a:ext cx="0" cy="0"/>
+          <a:chOff x="0" y="0"/>
+          <a:chExt cx="0" cy="0"/>
+        </a:xfrm>
+      </p:grpSpPr>
+      <p:sp>
+        <p:nvSpPr>
+          <p:cNvPr id="2" name="Content Placeholder 1"/>
+          <p:cNvSpPr>
+            <a:spLocks noGrp="1"/>
+          </p:cNvSpPr>
+          <p:nvPr>
+            <p:ph idx="1"/>
+          </p:nvPr>
+        </p:nvSpPr>
+        <p:spPr/>
+        <p:txBody>
+          <a:bodyPr/>
+          <a:lstStyle/>
+          <a:p>
+            <a:pPr algn="ctr">
+              <a:buNone/>
+            </a:pPr>
+            <a:endParaRPr lang="en-US" altLang="zh-CN" dirty="0" smtClean="0"/>
+          </a:p>
+          <a:p>
+            <a:pPr algn="ctr">
+              <a:buNone/>
+            </a:pPr>
+            <a:endParaRPr lang="en-US" altLang="zh-CN" dirty="0" smtClean="0"/>
+          </a:p>
+          <a:p>
+            <a:pPr algn="ctr">
+              <a:buNone/>
+            </a:pPr>
+            <a:endParaRPr lang="en-US" altLang="zh-CN" dirty="0" smtClean="0"/>
+          </a:p>
+          <a:p>
+            <a:pPr algn="ctr">
+              <a:buNone/>
+            </a:pPr>
+            <a:r>
+              <a:rPr lang="en-US" altLang="zh-CN" dirty="0" smtClean="0"/>
+              <a:t>--END--</a:t>
+            </a:r>
+            <a:endParaRPr lang="zh-CN" altLang="en-US" dirty="0"/>
+          </a:p>
+        </p:txBody>
+      </p:sp>
+      <p:sp>
+        <p:nvSpPr>
+          <p:cNvPr id="3" name="Date Placeholder 2"/>
+          <p:cNvSpPr>
+            <a:spLocks noGrp="1"/>
+          </p:cNvSpPr>
+          <p:nvPr>
+            <p:ph type="dt" sz="half" idx="10"/>
+          </p:nvPr>
+        </p:nvSpPr>
+        <p:spPr/>
+        <p:txBody>
+          <a:bodyPr/>
+          <a:lstStyle/>
+          <a:p>
+            <a:fld id="{BCDD0958-C144-4E3D-A8F5-AAEDA8C9D550}" type="datetime1">
+              <a:rPr lang="zh-TW" altLang="en-US" smtClean="0"/>
+              <a:pPr/>
+              <a:t>2014/10/10</a:t>
+            </a:fld>
+            <a:endParaRPr lang="zh-CN" altLang="en-US"/>
+          </a:p>
+        </p:txBody>
+      </p:sp>
+      <p:sp>
+        <p:nvSpPr>
+          <p:cNvPr id="4" name="Slide Number Placeholder 3"/>
+          <p:cNvSpPr>
+            <a:spLocks noGrp="1"/>
+          </p:cNvSpPr>
+          <p:nvPr>
+            <p:ph type="sldNum" sz="quarter" idx="12"/>
+          </p:nvPr>
+        </p:nvSpPr>
+        <p:spPr/>
+        <p:txBody>
+          <a:bodyPr/>
+          <a:lstStyle/>
+          <a:p>
+            <a:fld id="{28874C86-8C61-448A-906E-93CD94C69BE8}" type="slidenum">
+              <a:rPr lang="zh-CN" altLang="en-US" smtClean="0"/>
+              <a:pPr/>
+              <a:t>20</a:t>
+            </a:fld>
+            <a:endParaRPr lang="zh-CN" altLang="en-US" dirty="0"/>
+          </a:p>
+        </p:txBody>
+      </p:sp>
+    </p:spTree>
+  </p:cSld>
+  <p:clrMapOvr>
+    <a:masterClrMapping/>
+  </p:clrMapOvr>
+  <p:timing>
+    <p:tnLst>
+      <p:par>
+        <p:cTn id="1" dur="indefinite" restart="never" nodeType="tmRoot"/>
+      </p:par>
+    </p:tnLst>
+  </p:timing>
+</p:sld>
+</file>
+
 <file path=ppt/slides/slide3.xml><?xml version="1.0" encoding="utf-8"?>
+<p:sld xmlns:a="http://schemas.openxmlformats.org/drawingml/2006/main" xmlns:r="http://schemas.openxmlformats.org/officeDocument/2006/relationships" xmlns:p="http://schemas.openxmlformats.org/presentationml/2006/main">
+  <p:cSld>
+    <p:spTree>
+      <p:nvGrpSpPr>
+        <p:cNvPr id="1" name=""/>
+        <p:cNvGrpSpPr/>
+        <p:nvPr/>
+      </p:nvGrpSpPr>
+      <p:grpSpPr>
+        <a:xfrm>
+          <a:off x="0" y="0"/>
+          <a:ext cx="0" cy="0"/>
+          <a:chOff x="0" y="0"/>
+          <a:chExt cx="0" cy="0"/>
+        </a:xfrm>
+      </p:grpSpPr>
+      <p:sp>
+        <p:nvSpPr>
+          <p:cNvPr id="15" name="标题 14"/>
+          <p:cNvSpPr>
+            <a:spLocks noGrp="1"/>
+          </p:cNvSpPr>
+          <p:nvPr>
+            <p:ph type="title"/>
+          </p:nvPr>
+        </p:nvSpPr>
+        <p:spPr>
+          <a:xfrm>
+            <a:off x="428596" y="0"/>
+            <a:ext cx="7859216" cy="1143000"/>
+          </a:xfrm>
+        </p:spPr>
+        <p:txBody>
+          <a:bodyPr>
+            <a:normAutofit/>
+          </a:bodyPr>
+          <a:lstStyle/>
+          <a:p>
+            <a:r>
+              <a:rPr lang="en-US" altLang="zh-CN" dirty="0" smtClean="0"/>
+              <a:t>Download IDR Soft 1</a:t>
+            </a:r>
+            <a:endParaRPr lang="zh-CN" altLang="en-US" dirty="0"/>
+          </a:p>
+        </p:txBody>
+      </p:sp>
+      <p:sp>
+        <p:nvSpPr>
+          <p:cNvPr id="1038" name="Rectangle 14"/>
+          <p:cNvSpPr>
+            <a:spLocks noChangeArrowheads="1"/>
+          </p:cNvSpPr>
+          <p:nvPr/>
+        </p:nvSpPr>
+        <p:spPr bwMode="auto">
+          <a:xfrm>
+            <a:off x="0" y="6781800"/>
+            <a:ext cx="9144000" cy="457200"/>
+          </a:xfrm>
+          <a:prstGeom prst="rect">
+            <a:avLst/>
+          </a:prstGeom>
+          <a:noFill/>
+          <a:ln w="9525">
+            <a:noFill/>
+            <a:miter lim="800000"/>
+            <a:headEnd/>
+            <a:tailEnd/>
+          </a:ln>
+          <a:effectLst/>
+        </p:spPr>
+        <p:txBody>
+          <a:bodyPr vert="horz" wrap="none" lIns="91440" tIns="45720" rIns="91440" bIns="45720" numCol="1" anchor="ctr" anchorCtr="0" compatLnSpc="1">
+            <a:prstTxWarp prst="textNoShape">
+              <a:avLst/>
+            </a:prstTxWarp>
+            <a:spAutoFit/>
+          </a:bodyPr>
+          <a:lstStyle/>
+          <a:p>
+            <a:pPr marL="0" marR="0" lvl="0" indent="0" algn="l" defTabSz="914400" rtl="0" eaLnBrk="1" fontAlgn="base" latinLnBrk="0" hangingPunct="1">
+              <a:lnSpc>
+                <a:spcPct val="100000"/>
+              </a:lnSpc>
+              <a:spcBef>
+                <a:spcPct val="0"/>
+              </a:spcBef>
+              <a:spcAft>
+                <a:spcPct val="0"/>
+              </a:spcAft>
+              <a:buClrTx/>
+              <a:buSzTx/>
+              <a:buFontTx/>
+              <a:buNone/>
+              <a:tabLst/>
+            </a:pPr>
+            <a:r>
+              <a:rPr kumimoji="0" lang="en-US" altLang="zh-CN" sz="1000" b="0" i="0" u="none" strike="noStrike" cap="none" normalizeH="0" baseline="0" smtClean="0">
+                <a:ln>
+                  <a:noFill/>
+                </a:ln>
+                <a:solidFill>
+                  <a:srgbClr val="1F497D"/>
+                </a:solidFill>
+                <a:effectLst/>
+                <a:latin typeface="Calibri" pitchFamily="34" charset="0"/>
+                <a:ea typeface="宋体" pitchFamily="2" charset="-122"/>
+                <a:cs typeface="Calibri" pitchFamily="34" charset="0"/>
+              </a:rPr>
+              <a:t>3.zip idr soft</a:t>
+            </a:r>
+            <a:endParaRPr kumimoji="0" lang="en-US" altLang="zh-CN" sz="1800" b="0" i="0" u="none" strike="noStrike" cap="none" normalizeH="0" baseline="0" smtClean="0">
+              <a:ln>
+                <a:noFill/>
+              </a:ln>
+              <a:solidFill>
+                <a:schemeClr val="tx1"/>
+              </a:solidFill>
+              <a:effectLst/>
+              <a:latin typeface="Arial" pitchFamily="34" charset="0"/>
+              <a:ea typeface="宋体" pitchFamily="2" charset="-122"/>
+              <a:cs typeface="宋体" pitchFamily="2" charset="-122"/>
+            </a:endParaRPr>
+          </a:p>
+        </p:txBody>
+      </p:sp>
+      <p:pic>
+        <p:nvPicPr>
+          <p:cNvPr id="1041" name="图片 1" descr="cid:image001.png@01CFE2E6.9CA63F10"/>
+          <p:cNvPicPr>
+            <a:picLocks noChangeAspect="1" noChangeArrowheads="1"/>
+          </p:cNvPicPr>
+          <p:nvPr/>
+        </p:nvPicPr>
+        <p:blipFill>
+          <a:blip r:embed="rId2" r:link="rId3"/>
+          <a:srcRect t="6122" r="28776"/>
+          <a:stretch>
+            <a:fillRect/>
+          </a:stretch>
+        </p:blipFill>
+        <p:spPr bwMode="auto">
+          <a:xfrm>
+            <a:off x="142844" y="1524003"/>
+            <a:ext cx="4714908" cy="2190749"/>
+          </a:xfrm>
+          <a:prstGeom prst="rect">
+            <a:avLst/>
+          </a:prstGeom>
+          <a:noFill/>
+        </p:spPr>
+      </p:pic>
+      <p:sp>
+        <p:nvSpPr>
+          <p:cNvPr id="28" name="Rectangle 19"/>
+          <p:cNvSpPr>
+            <a:spLocks noChangeArrowheads="1"/>
+          </p:cNvSpPr>
+          <p:nvPr/>
+        </p:nvSpPr>
+        <p:spPr bwMode="auto">
+          <a:xfrm>
+            <a:off x="0" y="1000108"/>
+            <a:ext cx="8358246" cy="523220"/>
+          </a:xfrm>
+          <a:prstGeom prst="rect">
+            <a:avLst/>
+          </a:prstGeom>
+          <a:noFill/>
+          <a:ln w="9525">
+            <a:noFill/>
+            <a:miter lim="800000"/>
+            <a:headEnd/>
+            <a:tailEnd/>
+          </a:ln>
+          <a:effectLst/>
+        </p:spPr>
+        <p:txBody>
+          <a:bodyPr vert="horz" wrap="square" lIns="91440" tIns="45720" rIns="91440" bIns="45720" numCol="1" anchor="ctr" anchorCtr="0" compatLnSpc="1">
+            <a:prstTxWarp prst="textNoShape">
+              <a:avLst/>
+            </a:prstTxWarp>
+            <a:spAutoFit/>
+          </a:bodyPr>
+          <a:lstStyle/>
+          <a:p>
+            <a:pPr marL="0" marR="0" lvl="0" indent="0" algn="l" defTabSz="914400" rtl="0" eaLnBrk="1" fontAlgn="base" latinLnBrk="0" hangingPunct="1">
+              <a:lnSpc>
+                <a:spcPct val="100000"/>
+              </a:lnSpc>
+              <a:spcBef>
+                <a:spcPct val="0"/>
+              </a:spcBef>
+              <a:spcAft>
+                <a:spcPct val="0"/>
+              </a:spcAft>
+              <a:buClrTx/>
+              <a:buSzTx/>
+              <a:buFontTx/>
+              <a:buNone/>
+              <a:tabLst/>
+            </a:pPr>
+            <a:r>
+              <a:rPr kumimoji="0" lang="en-US" altLang="zh-CN" sz="2800" b="0" i="0" u="none" strike="noStrike" cap="none" normalizeH="0" baseline="0" dirty="0" err="1" smtClean="0">
+                <a:ln>
+                  <a:noFill/>
+                </a:ln>
+                <a:solidFill>
+                  <a:srgbClr val="FF0000"/>
+                </a:solidFill>
+                <a:effectLst/>
+                <a:latin typeface="Calibri" pitchFamily="34" charset="0"/>
+                <a:ea typeface="宋体" pitchFamily="2" charset="-122"/>
+                <a:cs typeface="Calibri" pitchFamily="34" charset="0"/>
+              </a:rPr>
+              <a:t>DownLoad</a:t>
+            </a:r>
+            <a:r>
+              <a:rPr kumimoji="0" lang="en-US" altLang="zh-CN" sz="2800" b="0" i="0" u="none" strike="noStrike" cap="none" normalizeH="0" baseline="0" dirty="0" smtClean="0">
+                <a:ln>
+                  <a:noFill/>
+                </a:ln>
+                <a:solidFill>
+                  <a:srgbClr val="FF0000"/>
+                </a:solidFill>
+                <a:effectLst/>
+                <a:latin typeface="Calibri" pitchFamily="34" charset="0"/>
+                <a:ea typeface="宋体" pitchFamily="2" charset="-122"/>
+                <a:cs typeface="Calibri" pitchFamily="34" charset="0"/>
+              </a:rPr>
+              <a:t> URL: </a:t>
+            </a:r>
+            <a:r>
+              <a:rPr kumimoji="0" lang="en-US" altLang="zh-CN" sz="2800" b="0" i="0" u="none" strike="noStrike" cap="none" normalizeH="0" baseline="0" dirty="0" smtClean="0">
+                <a:ln>
+                  <a:noFill/>
+                </a:ln>
+                <a:solidFill>
+                  <a:srgbClr val="FF0000"/>
+                </a:solidFill>
+                <a:effectLst/>
+                <a:latin typeface="Calibri" pitchFamily="34" charset="0"/>
+                <a:ea typeface="宋体" pitchFamily="2" charset="-122"/>
+                <a:cs typeface="Calibri" pitchFamily="34" charset="0"/>
+                <a:hlinkClick r:id="rId4"/>
+              </a:rPr>
+              <a:t>http://142.2.47.149/pisoft/</a:t>
+            </a:r>
+            <a:r>
+              <a:rPr kumimoji="0" lang="en-US" altLang="zh-CN" sz="2800" b="0" i="0" u="none" strike="noStrike" cap="none" normalizeH="0" baseline="0" dirty="0" smtClean="0">
+                <a:ln>
+                  <a:noFill/>
+                </a:ln>
+                <a:solidFill>
+                  <a:srgbClr val="FF0000"/>
+                </a:solidFill>
+                <a:effectLst/>
+                <a:latin typeface="Calibri" pitchFamily="34" charset="0"/>
+                <a:ea typeface="宋体" pitchFamily="2" charset="-122"/>
+                <a:cs typeface="Calibri" pitchFamily="34" charset="0"/>
+              </a:rPr>
+              <a:t> </a:t>
+            </a:r>
+            <a:endParaRPr kumimoji="0" lang="en-US" altLang="zh-CN" sz="2800" b="0" i="0" u="none" strike="noStrike" cap="none" normalizeH="0" baseline="0" dirty="0" smtClean="0">
+              <a:ln>
+                <a:noFill/>
+              </a:ln>
+              <a:solidFill>
+                <a:srgbClr val="FF0000"/>
+              </a:solidFill>
+              <a:effectLst/>
+              <a:latin typeface="Arial" pitchFamily="34" charset="0"/>
+              <a:ea typeface="宋体" pitchFamily="2" charset="-122"/>
+              <a:cs typeface="宋体" pitchFamily="2" charset="-122"/>
+            </a:endParaRPr>
+          </a:p>
+        </p:txBody>
+      </p:sp>
+      <p:pic>
+        <p:nvPicPr>
+          <p:cNvPr id="1044" name="图片 5" descr="image006"/>
+          <p:cNvPicPr>
+            <a:picLocks noChangeAspect="1" noChangeArrowheads="1"/>
+          </p:cNvPicPr>
+          <p:nvPr/>
+        </p:nvPicPr>
+        <p:blipFill>
+          <a:blip r:embed="rId5"/>
+          <a:srcRect t="13044"/>
+          <a:stretch>
+            <a:fillRect/>
+          </a:stretch>
+        </p:blipFill>
+        <p:spPr bwMode="auto">
+          <a:xfrm>
+            <a:off x="128600" y="3714752"/>
+            <a:ext cx="6229350" cy="2857497"/>
+          </a:xfrm>
+          <a:prstGeom prst="rect">
+            <a:avLst/>
+          </a:prstGeom>
+          <a:noFill/>
+          <a:ln w="9525">
+            <a:noFill/>
+            <a:miter lim="800000"/>
+            <a:headEnd/>
+            <a:tailEnd/>
+          </a:ln>
+        </p:spPr>
+      </p:pic>
+    </p:spTree>
+  </p:cSld>
+  <p:clrMapOvr>
+    <a:masterClrMapping/>
+  </p:clrMapOvr>
+</p:sld>
+</file>
+
+<file path=ppt/slides/slide4.xml><?xml version="1.0" encoding="utf-8"?>
+<p:sld xmlns:a="http://schemas.openxmlformats.org/drawingml/2006/main" xmlns:r="http://schemas.openxmlformats.org/officeDocument/2006/relationships" xmlns:p="http://schemas.openxmlformats.org/presentationml/2006/main">
+  <p:cSld>
+    <p:spTree>
+      <p:nvGrpSpPr>
+        <p:cNvPr id="1" name=""/>
+        <p:cNvGrpSpPr/>
+        <p:nvPr/>
+      </p:nvGrpSpPr>
+      <p:grpSpPr>
+        <a:xfrm>
+          <a:off x="0" y="0"/>
+          <a:ext cx="0" cy="0"/>
+          <a:chOff x="0" y="0"/>
+          <a:chExt cx="0" cy="0"/>
+        </a:xfrm>
+      </p:grpSpPr>
+      <p:sp>
+        <p:nvSpPr>
+          <p:cNvPr id="3" name="日期占位符 2"/>
+          <p:cNvSpPr>
+            <a:spLocks noGrp="1"/>
+          </p:cNvSpPr>
+          <p:nvPr>
+            <p:ph type="dt" sz="half" idx="10"/>
+          </p:nvPr>
+        </p:nvSpPr>
+        <p:spPr/>
+        <p:txBody>
+          <a:bodyPr/>
+          <a:lstStyle/>
+          <a:p>
+            <a:fld id="{BCDD0958-C144-4E3D-A8F5-AAEDA8C9D550}" type="datetime1">
+              <a:rPr lang="zh-TW" altLang="en-US" smtClean="0"/>
+              <a:pPr/>
+              <a:t>2014/10/10</a:t>
+            </a:fld>
+            <a:endParaRPr lang="zh-CN" altLang="en-US"/>
+          </a:p>
+        </p:txBody>
+      </p:sp>
+      <p:sp>
+        <p:nvSpPr>
+          <p:cNvPr id="4" name="灯片编号占位符 3"/>
+          <p:cNvSpPr>
+            <a:spLocks noGrp="1"/>
+          </p:cNvSpPr>
+          <p:nvPr>
+            <p:ph type="sldNum" sz="quarter" idx="12"/>
+          </p:nvPr>
+        </p:nvSpPr>
+        <p:spPr/>
+        <p:txBody>
+          <a:bodyPr/>
+          <a:lstStyle/>
+          <a:p>
+            <a:fld id="{28874C86-8C61-448A-906E-93CD94C69BE8}" type="slidenum">
+              <a:rPr lang="zh-CN" altLang="en-US" smtClean="0"/>
+              <a:pPr/>
+              <a:t>4</a:t>
+            </a:fld>
+            <a:endParaRPr lang="zh-CN" altLang="en-US" dirty="0"/>
+          </a:p>
+        </p:txBody>
+      </p:sp>
+      <p:sp>
+        <p:nvSpPr>
+          <p:cNvPr id="5" name="标题 4"/>
+          <p:cNvSpPr>
+            <a:spLocks noGrp="1"/>
+          </p:cNvSpPr>
+          <p:nvPr>
+            <p:ph type="title"/>
+          </p:nvPr>
+        </p:nvSpPr>
+        <p:spPr/>
+        <p:txBody>
+          <a:bodyPr/>
+          <a:lstStyle/>
+          <a:p>
+            <a:r>
+              <a:rPr lang="en-US" altLang="zh-CN" dirty="0" smtClean="0"/>
+              <a:t>Download </a:t>
+            </a:r>
+            <a:r>
+              <a:rPr lang="en-US" altLang="zh-CN" dirty="0" smtClean="0"/>
+              <a:t>IDR Soft</a:t>
+            </a:r>
+            <a:endParaRPr lang="zh-CN" altLang="en-US" dirty="0"/>
+          </a:p>
+        </p:txBody>
+      </p:sp>
+      <p:pic>
+        <p:nvPicPr>
+          <p:cNvPr id="37890" name="图片 3" descr="image007"/>
+          <p:cNvPicPr>
+            <a:picLocks noChangeAspect="1" noChangeArrowheads="1"/>
+          </p:cNvPicPr>
+          <p:nvPr/>
+        </p:nvPicPr>
+        <p:blipFill>
+          <a:blip r:embed="rId2"/>
+          <a:srcRect/>
+          <a:stretch>
+            <a:fillRect/>
+          </a:stretch>
+        </p:blipFill>
+        <p:spPr bwMode="auto">
+          <a:xfrm>
+            <a:off x="285720" y="1357298"/>
+            <a:ext cx="8572560" cy="2247900"/>
+          </a:xfrm>
+          <a:prstGeom prst="rect">
+            <a:avLst/>
+          </a:prstGeom>
+          <a:noFill/>
+          <a:ln w="9525">
+            <a:noFill/>
+            <a:miter lim="800000"/>
+            <a:headEnd/>
+            <a:tailEnd/>
+          </a:ln>
+        </p:spPr>
+      </p:pic>
+      <p:pic>
+        <p:nvPicPr>
+          <p:cNvPr id="37891" name="图片 4" descr="image005"/>
+          <p:cNvPicPr>
+            <a:picLocks noChangeAspect="1" noChangeArrowheads="1"/>
+          </p:cNvPicPr>
+          <p:nvPr/>
+        </p:nvPicPr>
+        <p:blipFill>
+          <a:blip r:embed="rId3"/>
+          <a:srcRect/>
+          <a:stretch>
+            <a:fillRect/>
+          </a:stretch>
+        </p:blipFill>
+        <p:spPr bwMode="auto">
+          <a:xfrm>
+            <a:off x="285720" y="3429000"/>
+            <a:ext cx="8572560" cy="2867025"/>
+          </a:xfrm>
+          <a:prstGeom prst="rect">
+            <a:avLst/>
+          </a:prstGeom>
+          <a:noFill/>
+          <a:ln w="9525">
+            <a:noFill/>
+            <a:miter lim="800000"/>
+            <a:headEnd/>
+            <a:tailEnd/>
+          </a:ln>
+        </p:spPr>
+      </p:pic>
+    </p:spTree>
+  </p:cSld>
+  <p:clrMapOvr>
+    <a:masterClrMapping/>
+  </p:clrMapOvr>
+</p:sld>
+</file>
+
+<file path=ppt/slides/slide5.xml><?xml version="1.0" encoding="utf-8"?>
 <p:sld xmlns:a="http://schemas.openxmlformats.org/drawingml/2006/main" xmlns:r="http://schemas.openxmlformats.org/officeDocument/2006/relationships" xmlns:p="http://schemas.openxmlformats.org/presentationml/2006/main">
   <p:cSld>
     <p:spTree>
@@ -10147,7 +10893,7 @@
             <a:fld id="{BCDD0958-C144-4E3D-A8F5-AAEDA8C9D550}" type="datetime1">
               <a:rPr lang="zh-TW" altLang="en-US" smtClean="0"/>
               <a:pPr/>
-              <a:t>2014/10/9</a:t>
+              <a:t>2014/10/10</a:t>
             </a:fld>
             <a:endParaRPr lang="zh-CN" altLang="en-US"/>
           </a:p>
@@ -10171,7 +10917,7 @@
             <a:fld id="{28874C86-8C61-448A-906E-93CD94C69BE8}" type="slidenum">
               <a:rPr lang="zh-CN" altLang="en-US" smtClean="0"/>
               <a:pPr/>
-              <a:t>3</a:t>
+              <a:t>5</a:t>
             </a:fld>
             <a:endParaRPr lang="zh-CN" altLang="en-US" dirty="0"/>
           </a:p>
@@ -10206,258 +10952,6 @@
               <a:t>(IDR System.exe)</a:t>
             </a:r>
             <a:endParaRPr lang="zh-CN" altLang="en-US" sz="1800" dirty="0"/>
-          </a:p>
-        </p:txBody>
-      </p:sp>
-    </p:spTree>
-  </p:cSld>
-  <p:clrMapOvr>
-    <a:masterClrMapping/>
-  </p:clrMapOvr>
-  <p:timing>
-    <p:tnLst>
-      <p:par>
-        <p:cTn id="1" dur="indefinite" restart="never" nodeType="tmRoot"/>
-      </p:par>
-    </p:tnLst>
-  </p:timing>
-</p:sld>
-</file>
-
-<file path=ppt/slides/slide4.xml><?xml version="1.0" encoding="utf-8"?>
-<p:sld xmlns:a="http://schemas.openxmlformats.org/drawingml/2006/main" xmlns:r="http://schemas.openxmlformats.org/officeDocument/2006/relationships" xmlns:p="http://schemas.openxmlformats.org/presentationml/2006/main">
-  <p:cSld>
-    <p:spTree>
-      <p:nvGrpSpPr>
-        <p:cNvPr id="1" name=""/>
-        <p:cNvGrpSpPr/>
-        <p:nvPr/>
-      </p:nvGrpSpPr>
-      <p:grpSpPr>
-        <a:xfrm>
-          <a:off x="0" y="0"/>
-          <a:ext cx="0" cy="0"/>
-          <a:chOff x="0" y="0"/>
-          <a:chExt cx="0" cy="0"/>
-        </a:xfrm>
-      </p:grpSpPr>
-      <p:sp>
-        <p:nvSpPr>
-          <p:cNvPr id="3" name="日期占位符 2"/>
-          <p:cNvSpPr>
-            <a:spLocks noGrp="1"/>
-          </p:cNvSpPr>
-          <p:nvPr>
-            <p:ph type="dt" sz="half" idx="10"/>
-          </p:nvPr>
-        </p:nvSpPr>
-        <p:spPr/>
-        <p:txBody>
-          <a:bodyPr/>
-          <a:lstStyle/>
-          <a:p>
-            <a:fld id="{BCDD0958-C144-4E3D-A8F5-AAEDA8C9D550}" type="datetime1">
-              <a:rPr lang="zh-TW" altLang="en-US" smtClean="0"/>
-              <a:pPr/>
-              <a:t>2014/10/9</a:t>
-            </a:fld>
-            <a:endParaRPr lang="zh-CN" altLang="en-US"/>
-          </a:p>
-        </p:txBody>
-      </p:sp>
-      <p:sp>
-        <p:nvSpPr>
-          <p:cNvPr id="4" name="灯片编号占位符 3"/>
-          <p:cNvSpPr>
-            <a:spLocks noGrp="1"/>
-          </p:cNvSpPr>
-          <p:nvPr>
-            <p:ph type="sldNum" sz="quarter" idx="12"/>
-          </p:nvPr>
-        </p:nvSpPr>
-        <p:spPr/>
-        <p:txBody>
-          <a:bodyPr/>
-          <a:lstStyle/>
-          <a:p>
-            <a:fld id="{28874C86-8C61-448A-906E-93CD94C69BE8}" type="slidenum">
-              <a:rPr lang="zh-CN" altLang="en-US" smtClean="0"/>
-              <a:pPr/>
-              <a:t>4</a:t>
-            </a:fld>
-            <a:endParaRPr lang="zh-CN" altLang="en-US" dirty="0"/>
-          </a:p>
-        </p:txBody>
-      </p:sp>
-      <p:sp>
-        <p:nvSpPr>
-          <p:cNvPr id="5" name="标题 4"/>
-          <p:cNvSpPr>
-            <a:spLocks noGrp="1"/>
-          </p:cNvSpPr>
-          <p:nvPr>
-            <p:ph type="title"/>
-          </p:nvPr>
-        </p:nvSpPr>
-        <p:spPr/>
-        <p:txBody>
-          <a:bodyPr/>
-          <a:lstStyle/>
-          <a:p>
-            <a:r>
-              <a:rPr lang="en-US" altLang="zh-CN" dirty="0" smtClean="0"/>
-              <a:t>Main View</a:t>
-            </a:r>
-            <a:endParaRPr lang="zh-CN" altLang="en-US" dirty="0"/>
-          </a:p>
-        </p:txBody>
-      </p:sp>
-      <p:pic>
-        <p:nvPicPr>
-          <p:cNvPr id="8" name="内容占位符 7" descr="02home.png"/>
-          <p:cNvPicPr>
-            <a:picLocks noGrp="1" noChangeAspect="1"/>
-          </p:cNvPicPr>
-          <p:nvPr>
-            <p:ph idx="1"/>
-          </p:nvPr>
-        </p:nvPicPr>
-        <p:blipFill>
-          <a:blip r:embed="rId2"/>
-          <a:stretch>
-            <a:fillRect/>
-          </a:stretch>
-        </p:blipFill>
-        <p:spPr>
-          <a:xfrm>
-            <a:off x="1338480" y="1600200"/>
-            <a:ext cx="6097152" cy="4525963"/>
-          </a:xfrm>
-        </p:spPr>
-      </p:pic>
-    </p:spTree>
-  </p:cSld>
-  <p:clrMapOvr>
-    <a:masterClrMapping/>
-  </p:clrMapOvr>
-  <p:timing>
-    <p:tnLst>
-      <p:par>
-        <p:cTn id="1" dur="indefinite" restart="never" nodeType="tmRoot"/>
-      </p:par>
-    </p:tnLst>
-  </p:timing>
-</p:sld>
-</file>
-
-<file path=ppt/slides/slide5.xml><?xml version="1.0" encoding="utf-8"?>
-<p:sld xmlns:a="http://schemas.openxmlformats.org/drawingml/2006/main" xmlns:r="http://schemas.openxmlformats.org/officeDocument/2006/relationships" xmlns:p="http://schemas.openxmlformats.org/presentationml/2006/main">
-  <p:cSld>
-    <p:spTree>
-      <p:nvGrpSpPr>
-        <p:cNvPr id="1" name=""/>
-        <p:cNvGrpSpPr/>
-        <p:nvPr/>
-      </p:nvGrpSpPr>
-      <p:grpSpPr>
-        <a:xfrm>
-          <a:off x="0" y="0"/>
-          <a:ext cx="0" cy="0"/>
-          <a:chOff x="0" y="0"/>
-          <a:chExt cx="0" cy="0"/>
-        </a:xfrm>
-      </p:grpSpPr>
-      <p:graphicFrame>
-        <p:nvGraphicFramePr>
-          <p:cNvPr id="6" name="内容占位符 5"/>
-          <p:cNvGraphicFramePr>
-            <a:graphicFrameLocks noGrp="1"/>
-          </p:cNvGraphicFramePr>
-          <p:nvPr>
-            <p:ph idx="1"/>
-          </p:nvPr>
-        </p:nvGraphicFramePr>
-        <p:xfrm>
-          <a:off x="457200" y="1600200"/>
-          <a:ext cx="7859713" cy="4525963"/>
-        </p:xfrm>
-        <a:graphic>
-          <a:graphicData uri="http://schemas.openxmlformats.org/drawingml/2006/diagram">
-            <dgm:relIds xmlns:dgm="http://schemas.openxmlformats.org/drawingml/2006/diagram" xmlns:r="http://schemas.openxmlformats.org/officeDocument/2006/relationships" r:dm="rId2" r:lo="rId3" r:qs="rId4" r:cs="rId5"/>
-          </a:graphicData>
-        </a:graphic>
-      </p:graphicFrame>
-      <p:sp>
-        <p:nvSpPr>
-          <p:cNvPr id="3" name="日期占位符 2"/>
-          <p:cNvSpPr>
-            <a:spLocks noGrp="1"/>
-          </p:cNvSpPr>
-          <p:nvPr>
-            <p:ph type="dt" sz="half" idx="10"/>
-          </p:nvPr>
-        </p:nvSpPr>
-        <p:spPr/>
-        <p:txBody>
-          <a:bodyPr/>
-          <a:lstStyle/>
-          <a:p>
-            <a:fld id="{BCDD0958-C144-4E3D-A8F5-AAEDA8C9D550}" type="datetime1">
-              <a:rPr lang="zh-TW" altLang="en-US" smtClean="0"/>
-              <a:pPr/>
-              <a:t>2014/10/9</a:t>
-            </a:fld>
-            <a:endParaRPr lang="zh-CN" altLang="en-US"/>
-          </a:p>
-        </p:txBody>
-      </p:sp>
-      <p:sp>
-        <p:nvSpPr>
-          <p:cNvPr id="4" name="灯片编号占位符 3"/>
-          <p:cNvSpPr>
-            <a:spLocks noGrp="1"/>
-          </p:cNvSpPr>
-          <p:nvPr>
-            <p:ph type="sldNum" sz="quarter" idx="12"/>
-          </p:nvPr>
-        </p:nvSpPr>
-        <p:spPr/>
-        <p:txBody>
-          <a:bodyPr/>
-          <a:lstStyle/>
-          <a:p>
-            <a:fld id="{28874C86-8C61-448A-906E-93CD94C69BE8}" type="slidenum">
-              <a:rPr lang="zh-CN" altLang="en-US" smtClean="0"/>
-              <a:pPr/>
-              <a:t>5</a:t>
-            </a:fld>
-            <a:endParaRPr lang="zh-CN" altLang="en-US" dirty="0"/>
-          </a:p>
-        </p:txBody>
-      </p:sp>
-      <p:sp>
-        <p:nvSpPr>
-          <p:cNvPr id="5" name="标题 4"/>
-          <p:cNvSpPr>
-            <a:spLocks noGrp="1"/>
-          </p:cNvSpPr>
-          <p:nvPr>
-            <p:ph type="title"/>
-          </p:nvPr>
-        </p:nvSpPr>
-        <p:spPr/>
-        <p:txBody>
-          <a:bodyPr>
-            <a:normAutofit/>
-          </a:bodyPr>
-          <a:lstStyle/>
-          <a:p>
-            <a:pPr lvl="0"/>
-            <a:r>
-              <a:rPr lang="en-US" altLang="zh-CN" dirty="0" smtClean="0"/>
-              <a:t>Packing List Maintain</a:t>
-            </a:r>
-            <a:endParaRPr lang="zh-CN" altLang="en-US" dirty="0"/>
           </a:p>
         </p:txBody>
       </p:sp>
@@ -10493,9 +10987,80 @@
           <a:chExt cx="0" cy="0"/>
         </a:xfrm>
       </p:grpSpPr>
+      <p:sp>
+        <p:nvSpPr>
+          <p:cNvPr id="3" name="日期占位符 2"/>
+          <p:cNvSpPr>
+            <a:spLocks noGrp="1"/>
+          </p:cNvSpPr>
+          <p:nvPr>
+            <p:ph type="dt" sz="half" idx="10"/>
+          </p:nvPr>
+        </p:nvSpPr>
+        <p:spPr/>
+        <p:txBody>
+          <a:bodyPr/>
+          <a:lstStyle/>
+          <a:p>
+            <a:fld id="{BCDD0958-C144-4E3D-A8F5-AAEDA8C9D550}" type="datetime1">
+              <a:rPr lang="zh-TW" altLang="en-US" smtClean="0"/>
+              <a:pPr/>
+              <a:t>2014/10/10</a:t>
+            </a:fld>
+            <a:endParaRPr lang="zh-CN" altLang="en-US"/>
+          </a:p>
+        </p:txBody>
+      </p:sp>
+      <p:sp>
+        <p:nvSpPr>
+          <p:cNvPr id="4" name="灯片编号占位符 3"/>
+          <p:cNvSpPr>
+            <a:spLocks noGrp="1"/>
+          </p:cNvSpPr>
+          <p:nvPr>
+            <p:ph type="sldNum" sz="quarter" idx="12"/>
+          </p:nvPr>
+        </p:nvSpPr>
+        <p:spPr/>
+        <p:txBody>
+          <a:bodyPr/>
+          <a:lstStyle/>
+          <a:p>
+            <a:fld id="{28874C86-8C61-448A-906E-93CD94C69BE8}" type="slidenum">
+              <a:rPr lang="zh-CN" altLang="en-US" smtClean="0"/>
+              <a:pPr/>
+              <a:t>6</a:t>
+            </a:fld>
+            <a:endParaRPr lang="zh-CN" altLang="en-US" dirty="0"/>
+          </a:p>
+        </p:txBody>
+      </p:sp>
+      <p:sp>
+        <p:nvSpPr>
+          <p:cNvPr id="5" name="标题 4"/>
+          <p:cNvSpPr>
+            <a:spLocks noGrp="1"/>
+          </p:cNvSpPr>
+          <p:nvPr>
+            <p:ph type="title"/>
+          </p:nvPr>
+        </p:nvSpPr>
+        <p:spPr/>
+        <p:txBody>
+          <a:bodyPr/>
+          <a:lstStyle/>
+          <a:p>
+            <a:r>
+              <a:rPr lang="en-US" altLang="zh-CN" dirty="0" smtClean="0"/>
+              <a:t>Main View</a:t>
+            </a:r>
+            <a:endParaRPr lang="zh-CN" altLang="en-US" dirty="0"/>
+          </a:p>
+        </p:txBody>
+      </p:sp>
       <p:pic>
         <p:nvPicPr>
-          <p:cNvPr id="6" name="内容占位符 5" descr="1.1UploadEpackingList.png"/>
+          <p:cNvPr id="8" name="内容占位符 7" descr="02home.png"/>
           <p:cNvPicPr>
             <a:picLocks noGrp="1" noChangeAspect="1"/>
           </p:cNvPicPr>
@@ -10511,85 +11076,11 @@
         </p:blipFill>
         <p:spPr>
           <a:xfrm>
-            <a:off x="714348" y="1600200"/>
-            <a:ext cx="7207147" cy="4525963"/>
+            <a:off x="1338480" y="1600200"/>
+            <a:ext cx="6097152" cy="4525963"/>
           </a:xfrm>
         </p:spPr>
       </p:pic>
-      <p:sp>
-        <p:nvSpPr>
-          <p:cNvPr id="3" name="日期占位符 2"/>
-          <p:cNvSpPr>
-            <a:spLocks noGrp="1"/>
-          </p:cNvSpPr>
-          <p:nvPr>
-            <p:ph type="dt" sz="half" idx="10"/>
-          </p:nvPr>
-        </p:nvSpPr>
-        <p:spPr/>
-        <p:txBody>
-          <a:bodyPr/>
-          <a:lstStyle/>
-          <a:p>
-            <a:fld id="{BCDD0958-C144-4E3D-A8F5-AAEDA8C9D550}" type="datetime1">
-              <a:rPr lang="zh-TW" altLang="en-US" smtClean="0"/>
-              <a:pPr/>
-              <a:t>2014/10/9</a:t>
-            </a:fld>
-            <a:endParaRPr lang="zh-CN" altLang="en-US"/>
-          </a:p>
-        </p:txBody>
-      </p:sp>
-      <p:sp>
-        <p:nvSpPr>
-          <p:cNvPr id="4" name="灯片编号占位符 3"/>
-          <p:cNvSpPr>
-            <a:spLocks noGrp="1"/>
-          </p:cNvSpPr>
-          <p:nvPr>
-            <p:ph type="sldNum" sz="quarter" idx="12"/>
-          </p:nvPr>
-        </p:nvSpPr>
-        <p:spPr/>
-        <p:txBody>
-          <a:bodyPr/>
-          <a:lstStyle/>
-          <a:p>
-            <a:fld id="{28874C86-8C61-448A-906E-93CD94C69BE8}" type="slidenum">
-              <a:rPr lang="zh-CN" altLang="en-US" smtClean="0"/>
-              <a:pPr/>
-              <a:t>6</a:t>
-            </a:fld>
-            <a:endParaRPr lang="zh-CN" altLang="en-US" dirty="0"/>
-          </a:p>
-        </p:txBody>
-      </p:sp>
-      <p:sp>
-        <p:nvSpPr>
-          <p:cNvPr id="5" name="标题 4"/>
-          <p:cNvSpPr>
-            <a:spLocks noGrp="1"/>
-          </p:cNvSpPr>
-          <p:nvPr>
-            <p:ph type="title"/>
-          </p:nvPr>
-        </p:nvSpPr>
-        <p:spPr/>
-        <p:txBody>
-          <a:bodyPr>
-            <a:normAutofit/>
-          </a:bodyPr>
-          <a:lstStyle/>
-          <a:p>
-            <a:pPr lvl="0"/>
-            <a:r>
-              <a:rPr lang="en-US" altLang="zh-CN" dirty="0" smtClean="0"/>
-              <a:t>1. Upload e-Packing List (Excel)</a:t>
-            </a:r>
-            <a:endParaRPr lang="zh-CN" altLang="en-US" dirty="0"/>
-          </a:p>
-        </p:txBody>
-      </p:sp>
     </p:spTree>
   </p:cSld>
   <p:clrMapOvr>
@@ -10622,29 +11113,26 @@
           <a:chExt cx="0" cy="0"/>
         </a:xfrm>
       </p:grpSpPr>
-      <p:pic>
-        <p:nvPicPr>
-          <p:cNvPr id="6" name="内容占位符 5" descr="1.1.1.png"/>
-          <p:cNvPicPr>
-            <a:picLocks noGrp="1" noChangeAspect="1"/>
-          </p:cNvPicPr>
+      <p:graphicFrame>
+        <p:nvGraphicFramePr>
+          <p:cNvPr id="6" name="内容占位符 5"/>
+          <p:cNvGraphicFramePr>
+            <a:graphicFrameLocks noGrp="1"/>
+          </p:cNvGraphicFramePr>
           <p:nvPr>
             <p:ph idx="1"/>
           </p:nvPr>
-        </p:nvPicPr>
-        <p:blipFill>
-          <a:blip r:embed="rId2"/>
-          <a:stretch>
-            <a:fillRect/>
-          </a:stretch>
-        </p:blipFill>
-        <p:spPr>
-          <a:xfrm>
-            <a:off x="1326755" y="1600200"/>
-            <a:ext cx="6120603" cy="4525963"/>
-          </a:xfrm>
-        </p:spPr>
-      </p:pic>
+        </p:nvGraphicFramePr>
+        <p:xfrm>
+          <a:off x="457200" y="1600200"/>
+          <a:ext cx="7859713" cy="4525963"/>
+        </p:xfrm>
+        <a:graphic>
+          <a:graphicData uri="http://schemas.openxmlformats.org/drawingml/2006/diagram">
+            <dgm:relIds xmlns:dgm="http://schemas.openxmlformats.org/drawingml/2006/diagram" xmlns:r="http://schemas.openxmlformats.org/officeDocument/2006/relationships" r:dm="rId2" r:lo="rId3" r:qs="rId4" r:cs="rId5"/>
+          </a:graphicData>
+        </a:graphic>
+      </p:graphicFrame>
       <p:sp>
         <p:nvSpPr>
           <p:cNvPr id="3" name="日期占位符 2"/>
@@ -10663,7 +11151,7 @@
             <a:fld id="{BCDD0958-C144-4E3D-A8F5-AAEDA8C9D550}" type="datetime1">
               <a:rPr lang="zh-TW" altLang="en-US" smtClean="0"/>
               <a:pPr/>
-              <a:t>2014/10/9</a:t>
+              <a:t>2014/10/10</a:t>
             </a:fld>
             <a:endParaRPr lang="zh-CN" altLang="en-US"/>
           </a:p>
@@ -10713,7 +11201,7 @@
             <a:pPr lvl="0"/>
             <a:r>
               <a:rPr lang="en-US" altLang="zh-CN" dirty="0" smtClean="0"/>
-              <a:t>1.1 Upload e-Packing List (Excel)</a:t>
+              <a:t>Packing List Maintain</a:t>
             </a:r>
             <a:endParaRPr lang="zh-CN" altLang="en-US" dirty="0"/>
           </a:p>
@@ -10753,7 +11241,7 @@
       </p:grpSpPr>
       <p:pic>
         <p:nvPicPr>
-          <p:cNvPr id="6" name="内容占位符 5" descr="1.2UploadEpackingList.png"/>
+          <p:cNvPr id="6" name="内容占位符 5" descr="1.1UploadEpackingList.png"/>
           <p:cNvPicPr>
             <a:picLocks noGrp="1" noChangeAspect="1"/>
           </p:cNvPicPr>
@@ -10769,8 +11257,8 @@
         </p:blipFill>
         <p:spPr>
           <a:xfrm>
-            <a:off x="457200" y="1703399"/>
-            <a:ext cx="7859713" cy="4319564"/>
+            <a:off x="714348" y="1600200"/>
+            <a:ext cx="7207147" cy="4525963"/>
           </a:xfrm>
         </p:spPr>
       </p:pic>
@@ -10792,7 +11280,7 @@
             <a:fld id="{BCDD0958-C144-4E3D-A8F5-AAEDA8C9D550}" type="datetime1">
               <a:rPr lang="zh-TW" altLang="en-US" smtClean="0"/>
               <a:pPr/>
-              <a:t>2014/10/9</a:t>
+              <a:t>2014/10/10</a:t>
             </a:fld>
             <a:endParaRPr lang="zh-CN" altLang="en-US"/>
           </a:p>
@@ -10841,8 +11329,8 @@
           <a:p>
             <a:pPr lvl="0"/>
             <a:r>
-              <a:rPr lang="en-US" altLang="en-US" dirty="0" smtClean="0"/>
-              <a:t>1.2. Add New(Edit Batch ID)</a:t>
+              <a:rPr lang="en-US" altLang="zh-CN" dirty="0" smtClean="0"/>
+              <a:t>1. Upload e-Packing List (Excel)</a:t>
             </a:r>
             <a:endParaRPr lang="zh-CN" altLang="en-US" dirty="0"/>
           </a:p>
@@ -10880,90 +11368,9 @@
           <a:chExt cx="0" cy="0"/>
         </a:xfrm>
       </p:grpSpPr>
-      <p:sp>
-        <p:nvSpPr>
-          <p:cNvPr id="3" name="日期占位符 2"/>
-          <p:cNvSpPr>
-            <a:spLocks noGrp="1"/>
-          </p:cNvSpPr>
-          <p:nvPr>
-            <p:ph type="dt" sz="half" idx="10"/>
-          </p:nvPr>
-        </p:nvSpPr>
-        <p:spPr/>
-        <p:txBody>
-          <a:bodyPr/>
-          <a:lstStyle/>
-          <a:p>
-            <a:fld id="{BCDD0958-C144-4E3D-A8F5-AAEDA8C9D550}" type="datetime1">
-              <a:rPr lang="zh-TW" altLang="en-US" smtClean="0"/>
-              <a:pPr/>
-              <a:t>2014/10/9</a:t>
-            </a:fld>
-            <a:endParaRPr lang="zh-CN" altLang="en-US"/>
-          </a:p>
-        </p:txBody>
-      </p:sp>
-      <p:sp>
-        <p:nvSpPr>
-          <p:cNvPr id="4" name="灯片编号占位符 3"/>
-          <p:cNvSpPr>
-            <a:spLocks noGrp="1"/>
-          </p:cNvSpPr>
-          <p:nvPr>
-            <p:ph type="sldNum" sz="quarter" idx="12"/>
-          </p:nvPr>
-        </p:nvSpPr>
-        <p:spPr/>
-        <p:txBody>
-          <a:bodyPr/>
-          <a:lstStyle/>
-          <a:p>
-            <a:fld id="{28874C86-8C61-448A-906E-93CD94C69BE8}" type="slidenum">
-              <a:rPr lang="zh-CN" altLang="en-US" smtClean="0"/>
-              <a:pPr/>
-              <a:t>9</a:t>
-            </a:fld>
-            <a:endParaRPr lang="zh-CN" altLang="en-US" dirty="0"/>
-          </a:p>
-        </p:txBody>
-      </p:sp>
-      <p:sp>
-        <p:nvSpPr>
-          <p:cNvPr id="5" name="标题 4"/>
-          <p:cNvSpPr>
-            <a:spLocks noGrp="1"/>
-          </p:cNvSpPr>
-          <p:nvPr>
-            <p:ph type="title"/>
-          </p:nvPr>
-        </p:nvSpPr>
-        <p:spPr/>
-        <p:txBody>
-          <a:bodyPr>
-            <a:normAutofit/>
-          </a:bodyPr>
-          <a:lstStyle/>
-          <a:p>
-            <a:r>
-              <a:rPr lang="en-US" altLang="en-US" dirty="0" smtClean="0"/>
-              <a:t>1.2.1 </a:t>
-            </a:r>
-            <a:r>
-              <a:rPr lang="en-US" altLang="zh-CN" dirty="0" smtClean="0"/>
-              <a:t>Add a </a:t>
-            </a:r>
-            <a:r>
-              <a:rPr lang="en-US" altLang="zh-CN" smtClean="0"/>
-              <a:t>New Batch ID</a:t>
-            </a:r>
-            <a:endParaRPr lang="zh-CN" altLang="en-US" dirty="0"/>
-          </a:p>
-        </p:txBody>
-      </p:sp>
       <p:pic>
         <p:nvPicPr>
-          <p:cNvPr id="8" name="内容占位符 7" descr="1.2.1UploadEpackingList.png"/>
+          <p:cNvPr id="6" name="内容占位符 5" descr="1.1.1.png"/>
           <p:cNvPicPr>
             <a:picLocks noGrp="1" noChangeAspect="1"/>
           </p:cNvPicPr>
@@ -10979,11 +11386,85 @@
         </p:blipFill>
         <p:spPr>
           <a:xfrm>
-            <a:off x="1206741" y="1600200"/>
-            <a:ext cx="6360631" cy="4525963"/>
+            <a:off x="1326755" y="1600200"/>
+            <a:ext cx="6120603" cy="4525963"/>
           </a:xfrm>
         </p:spPr>
       </p:pic>
+      <p:sp>
+        <p:nvSpPr>
+          <p:cNvPr id="3" name="日期占位符 2"/>
+          <p:cNvSpPr>
+            <a:spLocks noGrp="1"/>
+          </p:cNvSpPr>
+          <p:nvPr>
+            <p:ph type="dt" sz="half" idx="10"/>
+          </p:nvPr>
+        </p:nvSpPr>
+        <p:spPr/>
+        <p:txBody>
+          <a:bodyPr/>
+          <a:lstStyle/>
+          <a:p>
+            <a:fld id="{BCDD0958-C144-4E3D-A8F5-AAEDA8C9D550}" type="datetime1">
+              <a:rPr lang="zh-TW" altLang="en-US" smtClean="0"/>
+              <a:pPr/>
+              <a:t>2014/10/10</a:t>
+            </a:fld>
+            <a:endParaRPr lang="zh-CN" altLang="en-US"/>
+          </a:p>
+        </p:txBody>
+      </p:sp>
+      <p:sp>
+        <p:nvSpPr>
+          <p:cNvPr id="4" name="灯片编号占位符 3"/>
+          <p:cNvSpPr>
+            <a:spLocks noGrp="1"/>
+          </p:cNvSpPr>
+          <p:nvPr>
+            <p:ph type="sldNum" sz="quarter" idx="12"/>
+          </p:nvPr>
+        </p:nvSpPr>
+        <p:spPr/>
+        <p:txBody>
+          <a:bodyPr/>
+          <a:lstStyle/>
+          <a:p>
+            <a:fld id="{28874C86-8C61-448A-906E-93CD94C69BE8}" type="slidenum">
+              <a:rPr lang="zh-CN" altLang="en-US" smtClean="0"/>
+              <a:pPr/>
+              <a:t>9</a:t>
+            </a:fld>
+            <a:endParaRPr lang="zh-CN" altLang="en-US" dirty="0"/>
+          </a:p>
+        </p:txBody>
+      </p:sp>
+      <p:sp>
+        <p:nvSpPr>
+          <p:cNvPr id="5" name="标题 4"/>
+          <p:cNvSpPr>
+            <a:spLocks noGrp="1"/>
+          </p:cNvSpPr>
+          <p:nvPr>
+            <p:ph type="title"/>
+          </p:nvPr>
+        </p:nvSpPr>
+        <p:spPr/>
+        <p:txBody>
+          <a:bodyPr>
+            <a:normAutofit/>
+          </a:bodyPr>
+          <a:lstStyle/>
+          <a:p>
+            <a:pPr lvl="0"/>
+            <a:r>
+              <a:rPr lang="en-US" altLang="zh-CN" dirty="0" smtClean="0"/>
+              <a:t>1.1 Upload e-Packing List (Excel)</a:t>
+            </a:r>
+            <a:endParaRPr lang="zh-CN" altLang="en-US" dirty="0"/>
+          </a:p>
+        </p:txBody>
+      </p:sp>
     </p:spTree>
   </p:cSld>
   <p:clrMapOvr>

</xml_diff>